<commit_message>
Changes in powerpoint presentation - updated SAS file and added image of graph.
</commit_message>
<xml_diff>
--- a/Presentations/SAS and R and SAS (MiSUG, 2021_08_25, CSTAT Layout).pptx
+++ b/Presentations/SAS and R and SAS (MiSUG, 2021_08_25, CSTAT Layout).pptx
@@ -301,7 +301,7 @@
 <file path=ppt/revisionInfo.xml><?xml version="1.0" encoding="utf-8"?>
 <p1510:revInfo xmlns:a="http://schemas.openxmlformats.org/drawingml/2006/main" xmlns:r="http://schemas.openxmlformats.org/officeDocument/2006/relationships" xmlns:p1510="http://schemas.microsoft.com/office/powerpoint/2015/10/main">
   <p1510:revLst>
-    <p1510:client id="{CEECA33A-0581-4F3F-8D79-931A967D789A}" v="13" dt="2021-08-25T13:22:04.544"/>
+    <p1510:client id="{CEECA33A-0581-4F3F-8D79-931A967D789A}" v="14" dt="2021-08-25T17:13:05.276"/>
   </p1510:revLst>
 </p1510:revInfo>
 </file>
@@ -311,7 +311,7 @@
   <pc:docChgLst>
     <pc:chgData name="DeCicco, Barry" userId="598d2070-81f9-4814-a3fd-315cf73b76ef" providerId="ADAL" clId="{CEECA33A-0581-4F3F-8D79-931A967D789A}"/>
     <pc:docChg chg="undo custSel addSld delSld modSld sldOrd addSection delSection modSection">
-      <pc:chgData name="DeCicco, Barry" userId="598d2070-81f9-4814-a3fd-315cf73b76ef" providerId="ADAL" clId="{CEECA33A-0581-4F3F-8D79-931A967D789A}" dt="2021-08-25T13:26:19.386" v="924" actId="20577"/>
+      <pc:chgData name="DeCicco, Barry" userId="598d2070-81f9-4814-a3fd-315cf73b76ef" providerId="ADAL" clId="{CEECA33A-0581-4F3F-8D79-931A967D789A}" dt="2021-08-25T17:13:24.163" v="1334" actId="20577"/>
       <pc:docMkLst>
         <pc:docMk/>
       </pc:docMkLst>
@@ -427,13 +427,13 @@
         </pc:sldMkLst>
       </pc:sldChg>
       <pc:sldChg chg="modSp mod">
-        <pc:chgData name="DeCicco, Barry" userId="598d2070-81f9-4814-a3fd-315cf73b76ef" providerId="ADAL" clId="{CEECA33A-0581-4F3F-8D79-931A967D789A}" dt="2021-08-25T12:48:59.119" v="187" actId="113"/>
+        <pc:chgData name="DeCicco, Barry" userId="598d2070-81f9-4814-a3fd-315cf73b76ef" providerId="ADAL" clId="{CEECA33A-0581-4F3F-8D79-931A967D789A}" dt="2021-08-25T16:59:31.301" v="998" actId="313"/>
         <pc:sldMkLst>
           <pc:docMk/>
           <pc:sldMk cId="0" sldId="263"/>
         </pc:sldMkLst>
         <pc:spChg chg="mod">
-          <ac:chgData name="DeCicco, Barry" userId="598d2070-81f9-4814-a3fd-315cf73b76ef" providerId="ADAL" clId="{CEECA33A-0581-4F3F-8D79-931A967D789A}" dt="2021-08-25T12:48:59.119" v="187" actId="113"/>
+          <ac:chgData name="DeCicco, Barry" userId="598d2070-81f9-4814-a3fd-315cf73b76ef" providerId="ADAL" clId="{CEECA33A-0581-4F3F-8D79-931A967D789A}" dt="2021-08-25T16:59:31.301" v="998" actId="313"/>
           <ac:spMkLst>
             <pc:docMk/>
             <pc:sldMk cId="0" sldId="263"/>
@@ -471,13 +471,13 @@
         </pc:sldMkLst>
       </pc:sldChg>
       <pc:sldChg chg="modSp mod">
-        <pc:chgData name="DeCicco, Barry" userId="598d2070-81f9-4814-a3fd-315cf73b76ef" providerId="ADAL" clId="{CEECA33A-0581-4F3F-8D79-931A967D789A}" dt="2021-08-25T12:49:51.696" v="213" actId="1076"/>
+        <pc:chgData name="DeCicco, Barry" userId="598d2070-81f9-4814-a3fd-315cf73b76ef" providerId="ADAL" clId="{CEECA33A-0581-4F3F-8D79-931A967D789A}" dt="2021-08-25T17:00:23.418" v="1029" actId="113"/>
         <pc:sldMkLst>
           <pc:docMk/>
           <pc:sldMk cId="0" sldId="265"/>
         </pc:sldMkLst>
         <pc:spChg chg="mod">
-          <ac:chgData name="DeCicco, Barry" userId="598d2070-81f9-4814-a3fd-315cf73b76ef" providerId="ADAL" clId="{CEECA33A-0581-4F3F-8D79-931A967D789A}" dt="2021-08-25T12:49:51.696" v="213" actId="1076"/>
+          <ac:chgData name="DeCicco, Barry" userId="598d2070-81f9-4814-a3fd-315cf73b76ef" providerId="ADAL" clId="{CEECA33A-0581-4F3F-8D79-931A967D789A}" dt="2021-08-25T17:00:23.418" v="1029" actId="113"/>
           <ac:spMkLst>
             <pc:docMk/>
             <pc:sldMk cId="0" sldId="265"/>
@@ -523,7 +523,7 @@
         </pc:sldMkLst>
       </pc:sldChg>
       <pc:sldChg chg="addSp delSp modSp mod">
-        <pc:chgData name="DeCicco, Barry" userId="598d2070-81f9-4814-a3fd-315cf73b76ef" providerId="ADAL" clId="{CEECA33A-0581-4F3F-8D79-931A967D789A}" dt="2021-08-25T12:54:22.088" v="249" actId="6549"/>
+        <pc:chgData name="DeCicco, Barry" userId="598d2070-81f9-4814-a3fd-315cf73b76ef" providerId="ADAL" clId="{CEECA33A-0581-4F3F-8D79-931A967D789A}" dt="2021-08-25T17:01:16.343" v="1042" actId="6549"/>
         <pc:sldMkLst>
           <pc:docMk/>
           <pc:sldMk cId="0" sldId="267"/>
@@ -545,7 +545,7 @@
           </ac:spMkLst>
         </pc:spChg>
         <pc:spChg chg="add del mod">
-          <ac:chgData name="DeCicco, Barry" userId="598d2070-81f9-4814-a3fd-315cf73b76ef" providerId="ADAL" clId="{CEECA33A-0581-4F3F-8D79-931A967D789A}" dt="2021-08-25T12:54:22.088" v="249" actId="6549"/>
+          <ac:chgData name="DeCicco, Barry" userId="598d2070-81f9-4814-a3fd-315cf73b76ef" providerId="ADAL" clId="{CEECA33A-0581-4F3F-8D79-931A967D789A}" dt="2021-08-25T17:01:16.343" v="1042" actId="6549"/>
           <ac:spMkLst>
             <pc:docMk/>
             <pc:sldMk cId="0" sldId="267"/>
@@ -561,7 +561,7 @@
         </pc:sldMkLst>
       </pc:sldChg>
       <pc:sldChg chg="modSp mod">
-        <pc:chgData name="DeCicco, Barry" userId="598d2070-81f9-4814-a3fd-315cf73b76ef" providerId="ADAL" clId="{CEECA33A-0581-4F3F-8D79-931A967D789A}" dt="2021-08-25T12:55:16.199" v="356" actId="6549"/>
+        <pc:chgData name="DeCicco, Barry" userId="598d2070-81f9-4814-a3fd-315cf73b76ef" providerId="ADAL" clId="{CEECA33A-0581-4F3F-8D79-931A967D789A}" dt="2021-08-25T17:04:54.971" v="1136" actId="20577"/>
         <pc:sldMkLst>
           <pc:docMk/>
           <pc:sldMk cId="0" sldId="268"/>
@@ -575,7 +575,7 @@
           </ac:spMkLst>
         </pc:spChg>
         <pc:spChg chg="mod">
-          <ac:chgData name="DeCicco, Barry" userId="598d2070-81f9-4814-a3fd-315cf73b76ef" providerId="ADAL" clId="{CEECA33A-0581-4F3F-8D79-931A967D789A}" dt="2021-08-25T12:55:16.199" v="356" actId="6549"/>
+          <ac:chgData name="DeCicco, Barry" userId="598d2070-81f9-4814-a3fd-315cf73b76ef" providerId="ADAL" clId="{CEECA33A-0581-4F3F-8D79-931A967D789A}" dt="2021-08-25T17:04:54.971" v="1136" actId="20577"/>
           <ac:spMkLst>
             <pc:docMk/>
             <pc:sldMk cId="0" sldId="268"/>
@@ -590,12 +590,20 @@
           <pc:sldMk cId="2778535612" sldId="268"/>
         </pc:sldMkLst>
       </pc:sldChg>
-      <pc:sldChg chg="modSp mod">
-        <pc:chgData name="DeCicco, Barry" userId="598d2070-81f9-4814-a3fd-315cf73b76ef" providerId="ADAL" clId="{CEECA33A-0581-4F3F-8D79-931A967D789A}" dt="2021-08-25T12:56:13.083" v="359" actId="6549"/>
+      <pc:sldChg chg="addSp delSp modSp mod">
+        <pc:chgData name="DeCicco, Barry" userId="598d2070-81f9-4814-a3fd-315cf73b76ef" providerId="ADAL" clId="{CEECA33A-0581-4F3F-8D79-931A967D789A}" dt="2021-08-25T17:07:37.747" v="1297" actId="6549"/>
         <pc:sldMkLst>
           <pc:docMk/>
           <pc:sldMk cId="0" sldId="269"/>
         </pc:sldMkLst>
+        <pc:spChg chg="add del">
+          <ac:chgData name="DeCicco, Barry" userId="598d2070-81f9-4814-a3fd-315cf73b76ef" providerId="ADAL" clId="{CEECA33A-0581-4F3F-8D79-931A967D789A}" dt="2021-08-25T17:06:26.314" v="1162" actId="22"/>
+          <ac:spMkLst>
+            <pc:docMk/>
+            <pc:sldMk cId="0" sldId="269"/>
+            <ac:spMk id="5" creationId="{D864354D-7602-49C8-8973-97FB0B8F72B1}"/>
+          </ac:spMkLst>
+        </pc:spChg>
         <pc:spChg chg="mod">
           <ac:chgData name="DeCicco, Barry" userId="598d2070-81f9-4814-a3fd-315cf73b76ef" providerId="ADAL" clId="{CEECA33A-0581-4F3F-8D79-931A967D789A}" dt="2021-08-25T12:45:31.749" v="147" actId="27636"/>
           <ac:spMkLst>
@@ -605,7 +613,7 @@
           </ac:spMkLst>
         </pc:spChg>
         <pc:spChg chg="mod">
-          <ac:chgData name="DeCicco, Barry" userId="598d2070-81f9-4814-a3fd-315cf73b76ef" providerId="ADAL" clId="{CEECA33A-0581-4F3F-8D79-931A967D789A}" dt="2021-08-25T12:56:13.083" v="359" actId="6549"/>
+          <ac:chgData name="DeCicco, Barry" userId="598d2070-81f9-4814-a3fd-315cf73b76ef" providerId="ADAL" clId="{CEECA33A-0581-4F3F-8D79-931A967D789A}" dt="2021-08-25T17:07:37.747" v="1297" actId="6549"/>
           <ac:spMkLst>
             <pc:docMk/>
             <pc:sldMk cId="0" sldId="269"/>
@@ -643,12 +651,44 @@
           <pc:sldMk cId="63152241" sldId="270"/>
         </pc:sldMkLst>
       </pc:sldChg>
-      <pc:sldChg chg="del ord modNotes">
-        <pc:chgData name="DeCicco, Barry" userId="598d2070-81f9-4814-a3fd-315cf73b76ef" providerId="ADAL" clId="{CEECA33A-0581-4F3F-8D79-931A967D789A}" dt="2021-08-25T13:06:11.468" v="568" actId="2696"/>
+      <pc:sldChg chg="addSp delSp modSp del mod ord modNotes">
+        <pc:chgData name="DeCicco, Barry" userId="598d2070-81f9-4814-a3fd-315cf73b76ef" providerId="ADAL" clId="{CEECA33A-0581-4F3F-8D79-931A967D789A}" dt="2021-08-25T17:13:24.163" v="1334" actId="20577"/>
         <pc:sldMkLst>
           <pc:docMk/>
-          <pc:sldMk cId="0" sldId="271"/>
+          <pc:sldMk cId="2276257500" sldId="271"/>
         </pc:sldMkLst>
+        <pc:spChg chg="mod">
+          <ac:chgData name="DeCicco, Barry" userId="598d2070-81f9-4814-a3fd-315cf73b76ef" providerId="ADAL" clId="{CEECA33A-0581-4F3F-8D79-931A967D789A}" dt="2021-08-25T17:13:24.163" v="1334" actId="20577"/>
+          <ac:spMkLst>
+            <pc:docMk/>
+            <pc:sldMk cId="2276257500" sldId="271"/>
+            <ac:spMk id="228" creationId="{00000000-0000-0000-0000-000000000000}"/>
+          </ac:spMkLst>
+        </pc:spChg>
+        <pc:picChg chg="add del mod">
+          <ac:chgData name="DeCicco, Barry" userId="598d2070-81f9-4814-a3fd-315cf73b76ef" providerId="ADAL" clId="{CEECA33A-0581-4F3F-8D79-931A967D789A}" dt="2021-08-25T17:10:32.045" v="1311" actId="478"/>
+          <ac:picMkLst>
+            <pc:docMk/>
+            <pc:sldMk cId="2276257500" sldId="271"/>
+            <ac:picMk id="3" creationId="{CE12C7F6-49C7-4B14-9782-2D20DE874190}"/>
+          </ac:picMkLst>
+        </pc:picChg>
+        <pc:picChg chg="add mod">
+          <ac:chgData name="DeCicco, Barry" userId="598d2070-81f9-4814-a3fd-315cf73b76ef" providerId="ADAL" clId="{CEECA33A-0581-4F3F-8D79-931A967D789A}" dt="2021-08-25T17:13:18.713" v="1330" actId="1076"/>
+          <ac:picMkLst>
+            <pc:docMk/>
+            <pc:sldMk cId="2276257500" sldId="271"/>
+            <ac:picMk id="7" creationId="{6525387D-FF24-4F05-BABF-C259215EE4B9}"/>
+          </ac:picMkLst>
+        </pc:picChg>
+        <pc:picChg chg="del">
+          <ac:chgData name="DeCicco, Barry" userId="598d2070-81f9-4814-a3fd-315cf73b76ef" providerId="ADAL" clId="{CEECA33A-0581-4F3F-8D79-931A967D789A}" dt="2021-08-25T17:09:55.520" v="1309" actId="478"/>
+          <ac:picMkLst>
+            <pc:docMk/>
+            <pc:sldMk cId="2276257500" sldId="271"/>
+            <ac:picMk id="230" creationId="{00000000-0000-0000-0000-000000000000}"/>
+          </ac:picMkLst>
+        </pc:picChg>
       </pc:sldChg>
       <pc:sldChg chg="del">
         <pc:chgData name="DeCicco, Barry" userId="598d2070-81f9-4814-a3fd-315cf73b76ef" providerId="ADAL" clId="{CEECA33A-0581-4F3F-8D79-931A967D789A}" dt="2021-08-25T12:37:37.462" v="65" actId="2696"/>
@@ -657,15 +697,15 @@
           <pc:sldMk cId="2348426457" sldId="271"/>
         </pc:sldMkLst>
       </pc:sldChg>
+      <pc:sldChg chg="add">
+        <pc:chgData name="DeCicco, Barry" userId="598d2070-81f9-4814-a3fd-315cf73b76ef" providerId="ADAL" clId="{CEECA33A-0581-4F3F-8D79-931A967D789A}" dt="2021-08-25T13:07:00.619" v="578"/>
+        <pc:sldMkLst>
+          <pc:docMk/>
+          <pc:sldMk cId="2401539533" sldId="272"/>
+        </pc:sldMkLst>
+      </pc:sldChg>
       <pc:sldChg chg="del ord modNotes">
         <pc:chgData name="DeCicco, Barry" userId="598d2070-81f9-4814-a3fd-315cf73b76ef" providerId="ADAL" clId="{CEECA33A-0581-4F3F-8D79-931A967D789A}" dt="2021-08-25T13:06:50.002" v="577" actId="2696"/>
-        <pc:sldMkLst>
-          <pc:docMk/>
-          <pc:sldMk cId="0" sldId="272"/>
-        </pc:sldMkLst>
-      </pc:sldChg>
-      <pc:sldChg chg="add">
-        <pc:chgData name="DeCicco, Barry" userId="598d2070-81f9-4814-a3fd-315cf73b76ef" providerId="ADAL" clId="{CEECA33A-0581-4F3F-8D79-931A967D789A}" dt="2021-08-25T13:07:00.619" v="578"/>
         <pc:sldMkLst>
           <pc:docMk/>
           <pc:sldMk cId="2401539533" sldId="272"/>
@@ -682,7 +722,7 @@
         <pc:chgData name="DeCicco, Barry" userId="598d2070-81f9-4814-a3fd-315cf73b76ef" providerId="ADAL" clId="{CEECA33A-0581-4F3F-8D79-931A967D789A}" dt="2021-08-25T13:06:50.002" v="577" actId="2696"/>
         <pc:sldMkLst>
           <pc:docMk/>
-          <pc:sldMk cId="0" sldId="273"/>
+          <pc:sldMk cId="1331875796" sldId="273"/>
         </pc:sldMkLst>
       </pc:sldChg>
       <pc:sldChg chg="modSp add mod">
@@ -707,13 +747,6 @@
           <pc:sldMk cId="1740130629" sldId="273"/>
         </pc:sldMkLst>
       </pc:sldChg>
-      <pc:sldChg chg="del ord modNotes">
-        <pc:chgData name="DeCicco, Barry" userId="598d2070-81f9-4814-a3fd-315cf73b76ef" providerId="ADAL" clId="{CEECA33A-0581-4F3F-8D79-931A967D789A}" dt="2021-08-25T13:06:50.002" v="577" actId="2696"/>
-        <pc:sldMkLst>
-          <pc:docMk/>
-          <pc:sldMk cId="0" sldId="274"/>
-        </pc:sldMkLst>
-      </pc:sldChg>
       <pc:sldChg chg="del">
         <pc:chgData name="DeCicco, Barry" userId="598d2070-81f9-4814-a3fd-315cf73b76ef" providerId="ADAL" clId="{CEECA33A-0581-4F3F-8D79-931A967D789A}" dt="2021-08-25T12:37:37.762" v="74" actId="2696"/>
         <pc:sldMkLst>
@@ -732,7 +765,7 @@
         <pc:chgData name="DeCicco, Barry" userId="598d2070-81f9-4814-a3fd-315cf73b76ef" providerId="ADAL" clId="{CEECA33A-0581-4F3F-8D79-931A967D789A}" dt="2021-08-25T13:06:50.002" v="577" actId="2696"/>
         <pc:sldMkLst>
           <pc:docMk/>
-          <pc:sldMk cId="0" sldId="275"/>
+          <pc:sldMk cId="3699623725" sldId="274"/>
         </pc:sldMkLst>
       </pc:sldChg>
       <pc:sldChg chg="del">
@@ -742,6 +775,13 @@
           <pc:sldMk cId="1329172725" sldId="275"/>
         </pc:sldMkLst>
       </pc:sldChg>
+      <pc:sldChg chg="del ord modNotes">
+        <pc:chgData name="DeCicco, Barry" userId="598d2070-81f9-4814-a3fd-315cf73b76ef" providerId="ADAL" clId="{CEECA33A-0581-4F3F-8D79-931A967D789A}" dt="2021-08-25T13:06:50.002" v="577" actId="2696"/>
+        <pc:sldMkLst>
+          <pc:docMk/>
+          <pc:sldMk cId="4249388028" sldId="275"/>
+        </pc:sldMkLst>
+      </pc:sldChg>
       <pc:sldChg chg="add">
         <pc:chgData name="DeCicco, Barry" userId="598d2070-81f9-4814-a3fd-315cf73b76ef" providerId="ADAL" clId="{CEECA33A-0581-4F3F-8D79-931A967D789A}" dt="2021-08-25T13:07:00.619" v="578"/>
         <pc:sldMkLst>
@@ -749,15 +789,15 @@
           <pc:sldMk cId="4249388028" sldId="275"/>
         </pc:sldMkLst>
       </pc:sldChg>
+      <pc:sldChg chg="add">
+        <pc:chgData name="DeCicco, Barry" userId="598d2070-81f9-4814-a3fd-315cf73b76ef" providerId="ADAL" clId="{CEECA33A-0581-4F3F-8D79-931A967D789A}" dt="2021-08-25T13:07:00.619" v="578"/>
+        <pc:sldMkLst>
+          <pc:docMk/>
+          <pc:sldMk cId="383992275" sldId="276"/>
+        </pc:sldMkLst>
+      </pc:sldChg>
       <pc:sldChg chg="del ord modNotes">
         <pc:chgData name="DeCicco, Barry" userId="598d2070-81f9-4814-a3fd-315cf73b76ef" providerId="ADAL" clId="{CEECA33A-0581-4F3F-8D79-931A967D789A}" dt="2021-08-25T13:06:50.002" v="577" actId="2696"/>
-        <pc:sldMkLst>
-          <pc:docMk/>
-          <pc:sldMk cId="0" sldId="276"/>
-        </pc:sldMkLst>
-      </pc:sldChg>
-      <pc:sldChg chg="add">
-        <pc:chgData name="DeCicco, Barry" userId="598d2070-81f9-4814-a3fd-315cf73b76ef" providerId="ADAL" clId="{CEECA33A-0581-4F3F-8D79-931A967D789A}" dt="2021-08-25T13:07:00.619" v="578"/>
         <pc:sldMkLst>
           <pc:docMk/>
           <pc:sldMk cId="383992275" sldId="276"/>
@@ -1380,13 +1420,13 @@
         </pc:spChg>
       </pc:sldChg>
       <pc:sldChg chg="modSp add mod">
-        <pc:chgData name="DeCicco, Barry" userId="598d2070-81f9-4814-a3fd-315cf73b76ef" providerId="ADAL" clId="{CEECA33A-0581-4F3F-8D79-931A967D789A}" dt="2021-08-25T13:26:19.386" v="924" actId="20577"/>
+        <pc:chgData name="DeCicco, Barry" userId="598d2070-81f9-4814-a3fd-315cf73b76ef" providerId="ADAL" clId="{CEECA33A-0581-4F3F-8D79-931A967D789A}" dt="2021-08-25T17:00:50.269" v="1037" actId="20577"/>
         <pc:sldMkLst>
           <pc:docMk/>
           <pc:sldMk cId="1078495302" sldId="358"/>
         </pc:sldMkLst>
         <pc:spChg chg="mod">
-          <ac:chgData name="DeCicco, Barry" userId="598d2070-81f9-4814-a3fd-315cf73b76ef" providerId="ADAL" clId="{CEECA33A-0581-4F3F-8D79-931A967D789A}" dt="2021-08-25T13:26:19.386" v="924" actId="20577"/>
+          <ac:chgData name="DeCicco, Barry" userId="598d2070-81f9-4814-a3fd-315cf73b76ef" providerId="ADAL" clId="{CEECA33A-0581-4F3F-8D79-931A967D789A}" dt="2021-08-25T17:00:50.269" v="1037" actId="20577"/>
           <ac:spMkLst>
             <pc:docMk/>
             <pc:sldMk cId="1078495302" sldId="358"/>
@@ -1402,13 +1442,13 @@
         </pc:sldMkLst>
       </pc:sldChg>
       <pc:sldChg chg="modSp add mod">
-        <pc:chgData name="DeCicco, Barry" userId="598d2070-81f9-4814-a3fd-315cf73b76ef" providerId="ADAL" clId="{CEECA33A-0581-4F3F-8D79-931A967D789A}" dt="2021-08-25T12:54:27.957" v="250" actId="6549"/>
+        <pc:chgData name="DeCicco, Barry" userId="598d2070-81f9-4814-a3fd-315cf73b76ef" providerId="ADAL" clId="{CEECA33A-0581-4F3F-8D79-931A967D789A}" dt="2021-08-25T17:04:20.493" v="1130" actId="6549"/>
         <pc:sldMkLst>
           <pc:docMk/>
           <pc:sldMk cId="3934822154" sldId="359"/>
         </pc:sldMkLst>
         <pc:spChg chg="mod">
-          <ac:chgData name="DeCicco, Barry" userId="598d2070-81f9-4814-a3fd-315cf73b76ef" providerId="ADAL" clId="{CEECA33A-0581-4F3F-8D79-931A967D789A}" dt="2021-08-25T12:54:27.957" v="250" actId="6549"/>
+          <ac:chgData name="DeCicco, Barry" userId="598d2070-81f9-4814-a3fd-315cf73b76ef" providerId="ADAL" clId="{CEECA33A-0581-4F3F-8D79-931A967D789A}" dt="2021-08-25T17:04:20.493" v="1130" actId="6549"/>
           <ac:spMkLst>
             <pc:docMk/>
             <pc:sldMk cId="3934822154" sldId="359"/>
@@ -1424,13 +1464,13 @@
         </pc:sldMkLst>
       </pc:sldChg>
       <pc:sldChg chg="modSp add mod">
-        <pc:chgData name="DeCicco, Barry" userId="598d2070-81f9-4814-a3fd-315cf73b76ef" providerId="ADAL" clId="{CEECA33A-0581-4F3F-8D79-931A967D789A}" dt="2021-08-25T12:55:23.158" v="357" actId="6549"/>
+        <pc:chgData name="DeCicco, Barry" userId="598d2070-81f9-4814-a3fd-315cf73b76ef" providerId="ADAL" clId="{CEECA33A-0581-4F3F-8D79-931A967D789A}" dt="2021-08-25T17:06:27.464" v="1164" actId="20577"/>
         <pc:sldMkLst>
           <pc:docMk/>
           <pc:sldMk cId="3697956102" sldId="360"/>
         </pc:sldMkLst>
         <pc:spChg chg="mod">
-          <ac:chgData name="DeCicco, Barry" userId="598d2070-81f9-4814-a3fd-315cf73b76ef" providerId="ADAL" clId="{CEECA33A-0581-4F3F-8D79-931A967D789A}" dt="2021-08-25T12:55:23.158" v="357" actId="6549"/>
+          <ac:chgData name="DeCicco, Barry" userId="598d2070-81f9-4814-a3fd-315cf73b76ef" providerId="ADAL" clId="{CEECA33A-0581-4F3F-8D79-931A967D789A}" dt="2021-08-25T17:06:27.464" v="1164" actId="20577"/>
           <ac:spMkLst>
             <pc:docMk/>
             <pc:sldMk cId="3697956102" sldId="360"/>
@@ -1452,20 +1492,28 @@
           <pc:sldMk cId="746649843" sldId="362"/>
         </pc:sldMkLst>
       </pc:sldChg>
-      <pc:sldChg chg="modSp add mod">
-        <pc:chgData name="DeCicco, Barry" userId="598d2070-81f9-4814-a3fd-315cf73b76ef" providerId="ADAL" clId="{CEECA33A-0581-4F3F-8D79-931A967D789A}" dt="2021-08-25T13:00:03.177" v="514" actId="1076"/>
+      <pc:sldChg chg="addSp delSp modSp add mod">
+        <pc:chgData name="DeCicco, Barry" userId="598d2070-81f9-4814-a3fd-315cf73b76ef" providerId="ADAL" clId="{CEECA33A-0581-4F3F-8D79-931A967D789A}" dt="2021-08-25T17:13:00.948" v="1322" actId="21"/>
         <pc:sldMkLst>
           <pc:docMk/>
           <pc:sldMk cId="3986345007" sldId="362"/>
         </pc:sldMkLst>
         <pc:spChg chg="mod">
-          <ac:chgData name="DeCicco, Barry" userId="598d2070-81f9-4814-a3fd-315cf73b76ef" providerId="ADAL" clId="{CEECA33A-0581-4F3F-8D79-931A967D789A}" dt="2021-08-25T13:00:03.177" v="514" actId="1076"/>
+          <ac:chgData name="DeCicco, Barry" userId="598d2070-81f9-4814-a3fd-315cf73b76ef" providerId="ADAL" clId="{CEECA33A-0581-4F3F-8D79-931A967D789A}" dt="2021-08-25T17:10:57.393" v="1320" actId="20577"/>
           <ac:spMkLst>
             <pc:docMk/>
             <pc:sldMk cId="3986345007" sldId="362"/>
             <ac:spMk id="217" creationId="{00000000-0000-0000-0000-000000000000}"/>
           </ac:spMkLst>
         </pc:spChg>
+        <pc:picChg chg="add del mod">
+          <ac:chgData name="DeCicco, Barry" userId="598d2070-81f9-4814-a3fd-315cf73b76ef" providerId="ADAL" clId="{CEECA33A-0581-4F3F-8D79-931A967D789A}" dt="2021-08-25T17:13:00.948" v="1322" actId="21"/>
+          <ac:picMkLst>
+            <pc:docMk/>
+            <pc:sldMk cId="3986345007" sldId="362"/>
+            <ac:picMk id="3" creationId="{50F1AB6D-C9F6-471C-BB6D-ABB34847046E}"/>
+          </ac:picMkLst>
+        </pc:picChg>
       </pc:sldChg>
       <pc:sldChg chg="modSp add mod">
         <pc:chgData name="DeCicco, Barry" userId="598d2070-81f9-4814-a3fd-315cf73b76ef" providerId="ADAL" clId="{CEECA33A-0581-4F3F-8D79-931A967D789A}" dt="2021-08-25T12:57:00.220" v="433" actId="20577"/>
@@ -9786,7 +9834,7 @@
                   <a:schemeClr val="dk1"/>
                 </a:solidFill>
               </a:rPr>
-              <a:t>(SAS-data-set, </a:t>
+              <a:t>(“SAS-data-set”, “</a:t>
             </a:r>
             <a:r>
               <a:rPr lang="en-US" sz="2100" b="1" dirty="0" err="1">
@@ -9802,7 +9850,7 @@
                   <a:schemeClr val="dk1"/>
                 </a:solidFill>
               </a:rPr>
-              <a:t>);</a:t>
+              <a:t>”);</a:t>
             </a:r>
             <a:endParaRPr sz="2100" b="1" dirty="0">
               <a:solidFill>
@@ -10411,7 +10459,7 @@
                   <a:schemeClr val="dk1"/>
                 </a:solidFill>
               </a:rPr>
-              <a:t>&lt;-</a:t>
+              <a:t> &lt;- </a:t>
             </a:r>
             <a:r>
               <a:rPr lang="en-US" sz="1950" b="1" dirty="0" err="1">
@@ -10427,22 +10475,37 @@
                   <a:schemeClr val="dk1"/>
                 </a:solidFill>
               </a:rPr>
-              <a:t>("C:/Users/Barry/Desktop")</a:t>
-            </a:r>
-          </a:p>
-          <a:p>
-            <a:pPr lvl="1" indent="-342900">
-              <a:spcBef>
-                <a:spcPts val="840"/>
-              </a:spcBef>
-              <a:spcAft>
-                <a:spcPts val="0"/>
-              </a:spcAft>
-              <a:buSzPts val="2080"/>
-              <a:buFont typeface="Courier New" panose="02070309020205020404" pitchFamily="49" charset="0"/>
-              <a:buChar char="o"/>
-            </a:pPr>
-            <a:endParaRPr dirty="0"/>
+              <a:t>("C:/Users/decicco1/OneDrive - Michigan State University/</a:t>
+            </a:r>
+            <a:r>
+              <a:rPr lang="en-US" sz="1950" b="1" dirty="0" err="1">
+                <a:solidFill>
+                  <a:schemeClr val="dk1"/>
+                </a:solidFill>
+              </a:rPr>
+              <a:t>CSTATRedirects</a:t>
+            </a:r>
+            <a:r>
+              <a:rPr lang="en-US" sz="1950" b="1" dirty="0">
+                <a:solidFill>
+                  <a:schemeClr val="dk1"/>
+                </a:solidFill>
+              </a:rPr>
+              <a:t>/Documents/CSTAT/Workshops/SAS and R and SAS/Data Sets")   </a:t>
+            </a:r>
+            <a:r>
+              <a:rPr lang="en-US" sz="1950" b="1" dirty="0">
+                <a:solidFill>
+                  <a:srgbClr val="FF0000"/>
+                </a:solidFill>
+              </a:rPr>
+              <a:t># USE / not \</a:t>
+            </a:r>
+            <a:endParaRPr b="1" dirty="0">
+              <a:solidFill>
+                <a:srgbClr val="FF0000"/>
+              </a:solidFill>
+            </a:endParaRPr>
           </a:p>
           <a:p>
             <a:pPr>
@@ -10538,12 +10601,20 @@
               <a:buSzPts val="2240"/>
             </a:pPr>
             <a:r>
+              <a:rPr lang="en-US" sz="2100" b="1" dirty="0">
+                <a:solidFill>
+                  <a:schemeClr val="dk1"/>
+                </a:solidFill>
+              </a:rPr>
+              <a:t>#</a:t>
+            </a:r>
+            <a:r>
               <a:rPr lang="en-US" sz="2100" dirty="0">
                 <a:solidFill>
                   <a:schemeClr val="dk1"/>
                 </a:solidFill>
               </a:rPr>
-              <a:t># this is how comments are done in R</a:t>
+              <a:t> this is how comments are done in R</a:t>
             </a:r>
             <a:endParaRPr sz="2100" dirty="0">
               <a:solidFill>
@@ -11025,14 +11096,11 @@
               <a:buSzPts val="1440"/>
               <a:buNone/>
             </a:pPr>
-            <a:r>
-              <a:rPr lang="en-US" sz="2000" b="1" dirty="0">
-                <a:solidFill>
-                  <a:schemeClr val="dk1"/>
-                </a:solidFill>
-              </a:rPr>
-              <a:t>	title "Statistic in R (integration with SAS)";</a:t>
-            </a:r>
+            <a:endParaRPr lang="en-US" sz="2000" b="1" dirty="0">
+              <a:solidFill>
+                <a:schemeClr val="dk1"/>
+              </a:solidFill>
+            </a:endParaRPr>
           </a:p>
           <a:p>
             <a:pPr marL="0" indent="0">
@@ -11046,40 +11114,12 @@
               <a:buNone/>
             </a:pPr>
             <a:r>
-              <a:rPr lang="en-US" sz="2000" b="1">
-                <a:solidFill>
-                  <a:schemeClr val="dk1"/>
-                </a:solidFill>
-              </a:rPr>
-              <a:t>run</a:t>
-            </a:r>
-            <a:r>
               <a:rPr lang="en-US" sz="2000" b="1" dirty="0">
                 <a:solidFill>
                   <a:schemeClr val="dk1"/>
                 </a:solidFill>
               </a:rPr>
-              <a:t>;</a:t>
-            </a:r>
-          </a:p>
-          <a:p>
-            <a:pPr marL="0" indent="0">
-              <a:spcBef>
-                <a:spcPts val="720"/>
-              </a:spcBef>
-              <a:spcAft>
-                <a:spcPts val="0"/>
-              </a:spcAft>
-              <a:buSzPts val="1440"/>
-              <a:buNone/>
-            </a:pPr>
-            <a:r>
-              <a:rPr lang="en-US" sz="2000" b="1" dirty="0">
-                <a:solidFill>
-                  <a:schemeClr val="dk1"/>
-                </a:solidFill>
-              </a:rPr>
-              <a:t> </a:t>
+              <a:t>Call </a:t>
             </a:r>
             <a:r>
               <a:rPr lang="en-US" sz="2000" b="1" dirty="0" err="1">
@@ -11241,8 +11281,8 @@
         </p:nvSpPr>
         <p:spPr>
           <a:xfrm>
-            <a:off x="1243484" y="2776654"/>
-            <a:ext cx="6414990" cy="2732469"/>
+            <a:off x="814039" y="2776654"/>
+            <a:ext cx="7672039" cy="3412273"/>
           </a:xfrm>
           <a:prstGeom prst="rect">
             <a:avLst/>
@@ -11270,18 +11310,58 @@
                   <a:schemeClr val="dk1"/>
                 </a:solidFill>
               </a:rPr>
-              <a:t>#_______Beginning of R code_________</a:t>
+              <a:t>#______Beginning of R code_________</a:t>
             </a:r>
             <a:endParaRPr sz="1800" dirty="0"/>
           </a:p>
           <a:p>
-            <a:pPr marL="68580" indent="0">
+            <a:pPr marL="0" indent="0">
               <a:spcBef>
                 <a:spcPts val="720"/>
               </a:spcBef>
+              <a:spcAft>
+                <a:spcPts val="0"/>
+              </a:spcAft>
+              <a:buSzPts val="1440"/>
               <a:buNone/>
             </a:pPr>
-            <a:endParaRPr b="1" dirty="0">
+            <a:r>
+              <a:rPr lang="en-US" b="1" dirty="0">
+                <a:solidFill>
+                  <a:schemeClr val="dk1"/>
+                </a:solidFill>
+              </a:rPr>
+              <a:t># Change the working directory, saving the old one in ‘</a:t>
+            </a:r>
+            <a:r>
+              <a:rPr lang="en-US" b="1" dirty="0" err="1">
+                <a:solidFill>
+                  <a:schemeClr val="dk1"/>
+                </a:solidFill>
+              </a:rPr>
+              <a:t>old_wd</a:t>
+            </a:r>
+            <a:r>
+              <a:rPr lang="en-US" b="1" dirty="0">
+                <a:solidFill>
+                  <a:schemeClr val="dk1"/>
+                </a:solidFill>
+              </a:rPr>
+              <a:t>’:</a:t>
+            </a:r>
+          </a:p>
+          <a:p>
+            <a:pPr marL="0" indent="0">
+              <a:spcBef>
+                <a:spcPts val="720"/>
+              </a:spcBef>
+              <a:spcAft>
+                <a:spcPts val="0"/>
+              </a:spcAft>
+              <a:buSzPts val="1440"/>
+              <a:buNone/>
+            </a:pPr>
+            <a:endParaRPr lang="en-US" b="1" dirty="0">
               <a:solidFill>
                 <a:schemeClr val="dk1"/>
               </a:solidFill>
@@ -11299,73 +11379,76 @@
               <a:buNone/>
             </a:pPr>
             <a:r>
-              <a:rPr lang="en-US" b="1" dirty="0">
-                <a:solidFill>
-                  <a:schemeClr val="dk1"/>
-                </a:solidFill>
-              </a:rPr>
-              <a:t># Change the working directory, saving the old one in ‘</a:t>
-            </a:r>
-            <a:r>
-              <a:rPr lang="en-US" b="1" dirty="0" err="1">
-                <a:solidFill>
-                  <a:schemeClr val="dk1"/>
+              <a:rPr lang="en-US" dirty="0" err="1">
+                <a:solidFill>
+                  <a:schemeClr val="tx1"/>
                 </a:solidFill>
               </a:rPr>
               <a:t>old_wd</a:t>
             </a:r>
             <a:r>
-              <a:rPr lang="en-US" b="1" dirty="0">
-                <a:solidFill>
-                  <a:schemeClr val="dk1"/>
-                </a:solidFill>
-              </a:rPr>
-              <a:t>’:</a:t>
-            </a:r>
-            <a:endParaRPr sz="1800" dirty="0"/>
-          </a:p>
-          <a:p>
-            <a:pPr marL="0" indent="0">
-              <a:spcBef>
-                <a:spcPts val="720"/>
-              </a:spcBef>
-              <a:spcAft>
-                <a:spcPts val="0"/>
-              </a:spcAft>
-              <a:buSzPts val="1440"/>
-              <a:buNone/>
-            </a:pPr>
-            <a:r>
-              <a:rPr lang="en-US" b="1" dirty="0" err="1">
-                <a:solidFill>
-                  <a:schemeClr val="dk1"/>
-                </a:solidFill>
-              </a:rPr>
-              <a:t>old_wd</a:t>
-            </a:r>
-            <a:r>
-              <a:rPr lang="en-US" b="1" dirty="0">
-                <a:solidFill>
-                  <a:schemeClr val="dk1"/>
-                </a:solidFill>
-              </a:rPr>
-              <a:t>&lt;-</a:t>
-            </a:r>
-            <a:r>
-              <a:rPr lang="en-US" b="1" dirty="0" err="1">
-                <a:solidFill>
-                  <a:schemeClr val="dk1"/>
+              <a:rPr lang="en-US" dirty="0">
+                <a:solidFill>
+                  <a:schemeClr val="tx1"/>
+                </a:solidFill>
+              </a:rPr>
+              <a:t> &lt;- </a:t>
+            </a:r>
+            <a:r>
+              <a:rPr lang="en-US" dirty="0" err="1">
+                <a:solidFill>
+                  <a:schemeClr val="tx1"/>
                 </a:solidFill>
               </a:rPr>
               <a:t>setwd</a:t>
             </a:r>
             <a:r>
-              <a:rPr lang="en-US" b="1" dirty="0">
-                <a:solidFill>
-                  <a:schemeClr val="dk1"/>
-                </a:solidFill>
-              </a:rPr>
-              <a:t>("C:/Users/Barry/Desktop")</a:t>
+              <a:rPr lang="en-US" dirty="0">
+                <a:solidFill>
+                  <a:schemeClr val="tx1"/>
+                </a:solidFill>
+              </a:rPr>
+              <a:t>("C:/Users/decicco1/OneDrive - Michigan State University/</a:t>
+            </a:r>
+            <a:r>
+              <a:rPr lang="en-US" dirty="0" err="1">
+                <a:solidFill>
+                  <a:schemeClr val="tx1"/>
+                </a:solidFill>
+              </a:rPr>
+              <a:t>CSTATRedirects</a:t>
+            </a:r>
+            <a:r>
+              <a:rPr lang="en-US" dirty="0">
+                <a:solidFill>
+                  <a:schemeClr val="tx1"/>
+                </a:solidFill>
+              </a:rPr>
+              <a:t>/Documents/R Studio Projects/</a:t>
+            </a:r>
+            <a:r>
+              <a:rPr lang="en-US" dirty="0" err="1">
+                <a:solidFill>
+                  <a:schemeClr val="tx1"/>
+                </a:solidFill>
+              </a:rPr>
+              <a:t>SASandRandSAS</a:t>
+            </a:r>
+            <a:r>
+              <a:rPr lang="en-US" dirty="0">
+                <a:solidFill>
+                  <a:schemeClr val="tx1"/>
+                </a:solidFill>
+              </a:rPr>
+              <a:t>") </a:t>
+            </a:r>
+            <a:r>
+              <a:rPr lang="en-US" sz="2800" b="1" dirty="0">
+                <a:solidFill>
+                  <a:srgbClr val="FF0000"/>
+                </a:solidFill>
+              </a:rPr>
+              <a:t># USE / not \</a:t>
             </a:r>
             <a:endParaRPr sz="1800" dirty="0"/>
           </a:p>
@@ -11483,8 +11566,8 @@
         </p:nvSpPr>
         <p:spPr>
           <a:xfrm>
-            <a:off x="1243484" y="2063052"/>
-            <a:ext cx="6414990" cy="3446071"/>
+            <a:off x="1364505" y="2576150"/>
+            <a:ext cx="7132724" cy="3446071"/>
           </a:xfrm>
           <a:prstGeom prst="rect">
             <a:avLst/>
@@ -11506,6 +11589,46 @@
               </a:spcBef>
               <a:buNone/>
             </a:pPr>
+            <a:r>
+              <a:rPr lang="en-US" b="1" dirty="0">
+                <a:solidFill>
+                  <a:schemeClr val="dk1"/>
+                </a:solidFill>
+              </a:rPr>
+              <a:t>Confirm the working directory by printing it: </a:t>
+            </a:r>
+          </a:p>
+          <a:p>
+            <a:pPr marL="68580" indent="0">
+              <a:spcBef>
+                <a:spcPts val="720"/>
+              </a:spcBef>
+              <a:buNone/>
+            </a:pPr>
+            <a:r>
+              <a:rPr lang="en-US" b="1" dirty="0" err="1">
+                <a:solidFill>
+                  <a:schemeClr val="dk1"/>
+                </a:solidFill>
+              </a:rPr>
+              <a:t>getwd</a:t>
+            </a:r>
+            <a:r>
+              <a:rPr lang="en-US" b="1" dirty="0">
+                <a:solidFill>
+                  <a:schemeClr val="dk1"/>
+                </a:solidFill>
+              </a:rPr>
+              <a:t>()</a:t>
+            </a:r>
+          </a:p>
+          <a:p>
+            <a:pPr marL="68580" indent="0">
+              <a:spcBef>
+                <a:spcPts val="720"/>
+              </a:spcBef>
+              <a:buNone/>
+            </a:pPr>
             <a:endParaRPr b="1" dirty="0">
               <a:solidFill>
                 <a:schemeClr val="dk1"/>
@@ -11529,24 +11652,20 @@
                   <a:schemeClr val="dk1"/>
                 </a:solidFill>
               </a:rPr>
-              <a:t># Load the ‘</a:t>
-            </a:r>
-            <a:r>
-              <a:rPr lang="en-US" b="1" dirty="0" err="1">
-                <a:solidFill>
-                  <a:schemeClr val="dk1"/>
-                </a:solidFill>
-              </a:rPr>
-              <a:t>qicharts</a:t>
-            </a:r>
-            <a:r>
-              <a:rPr lang="en-US" b="1" dirty="0">
-                <a:solidFill>
-                  <a:schemeClr val="dk1"/>
-                </a:solidFill>
-              </a:rPr>
-              <a:t>’ module (package), so that it can be used.</a:t>
-            </a:r>
+              <a:t># Load the ‘ggplot2’ module (package), so that it can be used for plotting.</a:t>
+            </a:r>
+          </a:p>
+          <a:p>
+            <a:pPr marL="0" indent="0">
+              <a:spcBef>
+                <a:spcPts val="720"/>
+              </a:spcBef>
+              <a:spcAft>
+                <a:spcPts val="0"/>
+              </a:spcAft>
+              <a:buSzPts val="1440"/>
+              <a:buNone/>
+            </a:pPr>
             <a:endParaRPr b="1" dirty="0">
               <a:solidFill>
                 <a:schemeClr val="dk1"/>
@@ -11570,33 +11689,8 @@
                   <a:schemeClr val="dk1"/>
                 </a:solidFill>
               </a:rPr>
-              <a:t>library(</a:t>
-            </a:r>
-            <a:r>
-              <a:rPr lang="en-US" b="1" dirty="0" err="1">
-                <a:solidFill>
-                  <a:schemeClr val="dk1"/>
-                </a:solidFill>
-              </a:rPr>
-              <a:t>qicharts</a:t>
-            </a:r>
-            <a:r>
-              <a:rPr lang="en-US" b="1" dirty="0">
-                <a:solidFill>
-                  <a:schemeClr val="dk1"/>
-                </a:solidFill>
-              </a:rPr>
-              <a:t>) </a:t>
-            </a:r>
-            <a:endParaRPr sz="1800" dirty="0"/>
-          </a:p>
-          <a:p>
-            <a:pPr marL="68580" indent="0">
-              <a:spcBef>
-                <a:spcPts val="720"/>
-              </a:spcBef>
-              <a:buNone/>
-            </a:pPr>
+              <a:t>library(ggplot2) </a:t>
+            </a:r>
             <a:endParaRPr b="1" dirty="0">
               <a:solidFill>
                 <a:schemeClr val="dk1"/>
@@ -11709,8 +11803,8 @@
         </p:nvSpPr>
         <p:spPr>
           <a:xfrm>
-            <a:off x="1249262" y="2515656"/>
-            <a:ext cx="6401675" cy="3038684"/>
+            <a:off x="691375" y="2951586"/>
+            <a:ext cx="7761249" cy="3038684"/>
           </a:xfrm>
           <a:prstGeom prst="rect">
             <a:avLst/>
@@ -11742,26 +11836,9 @@
                   <a:schemeClr val="dk1"/>
                 </a:solidFill>
               </a:rPr>
-              <a:t># Create a data frame (data set)</a:t>
+              <a:t># Create a data frame (data set):</a:t>
             </a:r>
             <a:endParaRPr sz="1800" dirty="0"/>
-          </a:p>
-          <a:p>
-            <a:pPr marL="68580" indent="0">
-              <a:spcBef>
-                <a:spcPts val="720"/>
-              </a:spcBef>
-              <a:spcAft>
-                <a:spcPts val="0"/>
-              </a:spcAft>
-              <a:buSzPts val="1440"/>
-              <a:buNone/>
-            </a:pPr>
-            <a:endParaRPr b="1" dirty="0">
-              <a:solidFill>
-                <a:schemeClr val="dk1"/>
-              </a:solidFill>
-            </a:endParaRPr>
           </a:p>
           <a:p>
             <a:pPr marL="0" indent="0">
@@ -12163,7 +12240,7 @@
               </a:rPr>
               <a:t>d2$y[132:144] &lt;- d2$y[132:144] * 3</a:t>
             </a:r>
-            <a:endParaRPr sz="1800" dirty="0"/>
+            <a:endParaRPr lang="en-US" sz="1800" dirty="0"/>
           </a:p>
           <a:p>
             <a:pPr marL="68580" indent="0">
@@ -12435,8 +12512,8 @@
         </p:nvSpPr>
         <p:spPr>
           <a:xfrm>
-            <a:off x="978279" y="2423679"/>
-            <a:ext cx="6401700" cy="3062700"/>
+            <a:off x="599137" y="2680157"/>
+            <a:ext cx="7697370" cy="3062700"/>
           </a:xfrm>
           <a:prstGeom prst="rect">
             <a:avLst/>
@@ -12470,6 +12547,170 @@
               </a:rPr>
               <a:t># Run a chart.</a:t>
             </a:r>
+          </a:p>
+          <a:p>
+            <a:pPr marL="0" indent="0">
+              <a:spcBef>
+                <a:spcPts val="0"/>
+              </a:spcBef>
+              <a:spcAft>
+                <a:spcPts val="0"/>
+              </a:spcAft>
+              <a:buSzPts val="1440"/>
+              <a:buNone/>
+            </a:pPr>
+            <a:r>
+              <a:rPr lang="en-US" b="1" dirty="0" err="1">
+                <a:solidFill>
+                  <a:schemeClr val="dk1"/>
+                </a:solidFill>
+              </a:rPr>
+              <a:t>ggplot</a:t>
+            </a:r>
+            <a:r>
+              <a:rPr lang="en-US" b="1" dirty="0">
+                <a:solidFill>
+                  <a:schemeClr val="dk1"/>
+                </a:solidFill>
+              </a:rPr>
+              <a:t>(d2, </a:t>
+            </a:r>
+            <a:r>
+              <a:rPr lang="en-US" b="1" dirty="0" err="1">
+                <a:solidFill>
+                  <a:schemeClr val="dk1"/>
+                </a:solidFill>
+              </a:rPr>
+              <a:t>aes</a:t>
+            </a:r>
+            <a:r>
+              <a:rPr lang="en-US" b="1" dirty="0">
+                <a:solidFill>
+                  <a:schemeClr val="dk1"/>
+                </a:solidFill>
+              </a:rPr>
+              <a:t>(x=x, y=y)) +</a:t>
+            </a:r>
+          </a:p>
+          <a:p>
+            <a:pPr marL="0" indent="0">
+              <a:spcBef>
+                <a:spcPts val="0"/>
+              </a:spcBef>
+              <a:spcAft>
+                <a:spcPts val="0"/>
+              </a:spcAft>
+              <a:buSzPts val="1440"/>
+              <a:buNone/>
+            </a:pPr>
+            <a:r>
+              <a:rPr lang="en-US" b="1" dirty="0">
+                <a:solidFill>
+                  <a:schemeClr val="dk1"/>
+                </a:solidFill>
+              </a:rPr>
+              <a:t>  </a:t>
+            </a:r>
+            <a:r>
+              <a:rPr lang="en-US" b="1" dirty="0" err="1">
+                <a:solidFill>
+                  <a:schemeClr val="dk1"/>
+                </a:solidFill>
+              </a:rPr>
+              <a:t>geom_line</a:t>
+            </a:r>
+            <a:r>
+              <a:rPr lang="en-US" b="1" dirty="0">
+                <a:solidFill>
+                  <a:schemeClr val="dk1"/>
+                </a:solidFill>
+              </a:rPr>
+              <a:t>() +</a:t>
+            </a:r>
+          </a:p>
+          <a:p>
+            <a:pPr marL="0" indent="0">
+              <a:spcBef>
+                <a:spcPts val="0"/>
+              </a:spcBef>
+              <a:spcAft>
+                <a:spcPts val="0"/>
+              </a:spcAft>
+              <a:buSzPts val="1440"/>
+              <a:buNone/>
+            </a:pPr>
+            <a:r>
+              <a:rPr lang="en-US" b="1" dirty="0">
+                <a:solidFill>
+                  <a:schemeClr val="dk1"/>
+                </a:solidFill>
+              </a:rPr>
+              <a:t>  </a:t>
+            </a:r>
+            <a:r>
+              <a:rPr lang="en-US" b="1" dirty="0" err="1">
+                <a:solidFill>
+                  <a:schemeClr val="dk1"/>
+                </a:solidFill>
+              </a:rPr>
+              <a:t>geom_point</a:t>
+            </a:r>
+            <a:r>
+              <a:rPr lang="en-US" b="1" dirty="0">
+                <a:solidFill>
+                  <a:schemeClr val="dk1"/>
+                </a:solidFill>
+              </a:rPr>
+              <a:t>() +</a:t>
+            </a:r>
+          </a:p>
+          <a:p>
+            <a:pPr marL="0" indent="0">
+              <a:spcBef>
+                <a:spcPts val="0"/>
+              </a:spcBef>
+              <a:spcAft>
+                <a:spcPts val="0"/>
+              </a:spcAft>
+              <a:buSzPts val="1440"/>
+              <a:buNone/>
+            </a:pPr>
+            <a:r>
+              <a:rPr lang="en-US" b="1" dirty="0">
+                <a:solidFill>
+                  <a:schemeClr val="dk1"/>
+                </a:solidFill>
+              </a:rPr>
+              <a:t>  </a:t>
+            </a:r>
+            <a:r>
+              <a:rPr lang="en-US" b="1" dirty="0" err="1">
+                <a:solidFill>
+                  <a:schemeClr val="dk1"/>
+                </a:solidFill>
+              </a:rPr>
+              <a:t>facet_wrap</a:t>
+            </a:r>
+            <a:r>
+              <a:rPr lang="en-US" b="1" dirty="0">
+                <a:solidFill>
+                  <a:schemeClr val="dk1"/>
+                </a:solidFill>
+              </a:rPr>
+              <a:t>(g1 ~ g2)</a:t>
+            </a:r>
+          </a:p>
+          <a:p>
+            <a:pPr marL="68580" indent="0">
+              <a:spcBef>
+                <a:spcPts val="720"/>
+              </a:spcBef>
+              <a:spcAft>
+                <a:spcPts val="0"/>
+              </a:spcAft>
+              <a:buSzPts val="1440"/>
+              <a:buNone/>
+            </a:pPr>
             <a:endParaRPr b="1" dirty="0">
               <a:solidFill>
                 <a:schemeClr val="dk1"/>
@@ -12477,7 +12718,7 @@
             </a:endParaRPr>
           </a:p>
           <a:p>
-            <a:pPr marL="0" indent="0">
+            <a:pPr marL="68580" indent="0">
               <a:spcBef>
                 <a:spcPts val="720"/>
               </a:spcBef>
@@ -12488,12 +12729,20 @@
               <a:buNone/>
             </a:pPr>
             <a:r>
+              <a:rPr lang="en-US" b="1" dirty="0">
+                <a:solidFill>
+                  <a:schemeClr val="dk1"/>
+                </a:solidFill>
+              </a:rPr>
+              <a:t>‘</a:t>
+            </a:r>
+            <a:r>
               <a:rPr lang="en-US" b="1" dirty="0" err="1">
                 <a:solidFill>
                   <a:schemeClr val="dk1"/>
                 </a:solidFill>
               </a:rPr>
-              <a:t>trc</a:t>
+              <a:t>facet_wrap</a:t>
             </a:r>
             <a:r>
               <a:rPr lang="en-US" b="1" dirty="0">
@@ -12501,7 +12750,7 @@
                   <a:schemeClr val="dk1"/>
                 </a:solidFill>
               </a:rPr>
-              <a:t>(y ~ x | g1 + g2, data = d2, main = 'Trellis run chart', chart = '</a:t>
+              <a:t>’ is a way of breaking a chart into </a:t>
             </a:r>
             <a:r>
               <a:rPr lang="en-US" b="1" dirty="0" err="1">
@@ -12509,7 +12758,7 @@
                   <a:schemeClr val="dk1"/>
                 </a:solidFill>
               </a:rPr>
-              <a:t>i</a:t>
+              <a:t>multipl</a:t>
             </a:r>
             <a:r>
               <a:rPr lang="en-US" b="1" dirty="0">
@@ -12517,38 +12766,8 @@
                   <a:schemeClr val="dk1"/>
                 </a:solidFill>
               </a:rPr>
-              <a:t>')</a:t>
-            </a:r>
-            <a:endParaRPr sz="1800" dirty="0"/>
-          </a:p>
-          <a:p>
-            <a:pPr marL="68580" indent="0">
-              <a:spcBef>
-                <a:spcPts val="720"/>
-              </a:spcBef>
-              <a:spcAft>
-                <a:spcPts val="0"/>
-              </a:spcAft>
-              <a:buSzPts val="1440"/>
-              <a:buNone/>
-            </a:pPr>
-            <a:endParaRPr b="1" dirty="0">
-              <a:solidFill>
-                <a:schemeClr val="dk1"/>
-              </a:solidFill>
-            </a:endParaRPr>
-          </a:p>
-          <a:p>
-            <a:pPr marL="68580" indent="0">
-              <a:spcBef>
-                <a:spcPts val="720"/>
-              </a:spcBef>
-              <a:spcAft>
-                <a:spcPts val="0"/>
-              </a:spcAft>
-              <a:buSzPts val="1440"/>
-              <a:buNone/>
-            </a:pPr>
+              <a:t> charts, using variables – a great ggplot2 feature!</a:t>
+            </a:r>
             <a:endParaRPr b="1" dirty="0">
               <a:solidFill>
                 <a:schemeClr val="dk1"/>
@@ -12746,7 +12965,7 @@
                   <a:schemeClr val="dk1"/>
                 </a:solidFill>
               </a:rPr>
-              <a:t>pdf,'myplot.pdf',width</a:t>
+              <a:t>png</a:t>
             </a:r>
             <a:r>
               <a:rPr lang="en-US" b="1" dirty="0">
@@ -12754,7 +12973,23 @@
                   <a:schemeClr val="dk1"/>
                 </a:solidFill>
               </a:rPr>
-              <a:t>=6,height=4 )</a:t>
+              <a:t>,’Figures/myplot.</a:t>
+            </a:r>
+            <a:r>
+              <a:rPr lang="en-US" b="1" dirty="0" err="1">
+                <a:solidFill>
+                  <a:schemeClr val="dk1"/>
+                </a:solidFill>
+              </a:rPr>
+              <a:t>png</a:t>
+            </a:r>
+            <a:r>
+              <a:rPr lang="en-US" b="1" dirty="0">
+                <a:solidFill>
+                  <a:schemeClr val="dk1"/>
+                </a:solidFill>
+              </a:rPr>
+              <a:t>',width=6,height=4 )</a:t>
             </a:r>
             <a:endParaRPr sz="1800" dirty="0"/>
           </a:p>
@@ -13636,8 +13871,8 @@
               <a:buSzPts val="3600"/>
             </a:pPr>
             <a:r>
-              <a:rPr lang="en-US" b="1" dirty="0"/>
-              <a:t>RESULT – FIX ME</a:t>
+              <a:rPr lang="en-US" b="1"/>
+              <a:t>RESULTS</a:t>
             </a:r>
             <a:endParaRPr b="1" dirty="0"/>
           </a:p>
@@ -13702,29 +13937,32 @@
       </p:sp>
       <p:pic>
         <p:nvPicPr>
-          <p:cNvPr id="230" name="Google Shape;230;p16"/>
-          <p:cNvPicPr preferRelativeResize="0"/>
+          <p:cNvPr id="7" name="Picture 6">
+            <a:extLst>
+              <a:ext uri="{FF2B5EF4-FFF2-40B4-BE49-F238E27FC236}">
+                <a16:creationId xmlns:a16="http://schemas.microsoft.com/office/drawing/2014/main" id="{6525387D-FF24-4F05-BABF-C259215EE4B9}"/>
+              </a:ext>
+            </a:extLst>
+          </p:cNvPr>
+          <p:cNvPicPr>
+            <a:picLocks noChangeAspect="1"/>
+          </p:cNvPicPr>
           <p:nvPr/>
         </p:nvPicPr>
-        <p:blipFill rotWithShape="1">
-          <a:blip r:embed="rId3">
-            <a:alphaModFix/>
-          </a:blip>
-          <a:srcRect l="15087" t="14090" r="16136" b="5152"/>
-          <a:stretch/>
+        <p:blipFill>
+          <a:blip r:embed="rId3"/>
+          <a:stretch>
+            <a:fillRect/>
+          </a:stretch>
         </p:blipFill>
         <p:spPr>
           <a:xfrm>
-            <a:off x="1349786" y="1683328"/>
-            <a:ext cx="6289098" cy="4153766"/>
+            <a:off x="2319454" y="2022802"/>
+            <a:ext cx="3724508" cy="3724508"/>
           </a:xfrm>
           <a:prstGeom prst="rect">
             <a:avLst/>
           </a:prstGeom>
-          <a:noFill/>
-          <a:ln>
-            <a:noFill/>
-          </a:ln>
         </p:spPr>
       </p:pic>
     </p:spTree>

</xml_diff>

<commit_message>
Final version for presentation on Thursday.
</commit_message>
<xml_diff>
--- a/Presentations/SAS and R and SAS (MiSUG, 2021_08_25, CSTAT Layout).pptx
+++ b/Presentations/SAS and R and SAS (MiSUG, 2021_08_25, CSTAT Layout).pptx
@@ -5,7 +5,7 @@
     <p:sldMasterId id="2147483648" r:id="rId1"/>
   </p:sldMasterIdLst>
   <p:notesMasterIdLst>
-    <p:notesMasterId r:id="rId58"/>
+    <p:notesMasterId r:id="rId53"/>
   </p:notesMasterIdLst>
   <p:sldIdLst>
     <p:sldId id="256" r:id="rId2"/>
@@ -52,35 +52,30 @@
     <p:sldId id="376" r:id="rId43"/>
     <p:sldId id="375" r:id="rId44"/>
     <p:sldId id="374" r:id="rId45"/>
-    <p:sldId id="369" r:id="rId46"/>
-    <p:sldId id="281" r:id="rId47"/>
-    <p:sldId id="370" r:id="rId48"/>
-    <p:sldId id="283" r:id="rId49"/>
-    <p:sldId id="284" r:id="rId50"/>
-    <p:sldId id="307" r:id="rId51"/>
-    <p:sldId id="304" r:id="rId52"/>
-    <p:sldId id="286" r:id="rId53"/>
-    <p:sldId id="365" r:id="rId54"/>
-    <p:sldId id="287" r:id="rId55"/>
-    <p:sldId id="288" r:id="rId56"/>
-    <p:sldId id="354" r:id="rId57"/>
+    <p:sldId id="307" r:id="rId46"/>
+    <p:sldId id="304" r:id="rId47"/>
+    <p:sldId id="286" r:id="rId48"/>
+    <p:sldId id="365" r:id="rId49"/>
+    <p:sldId id="287" r:id="rId50"/>
+    <p:sldId id="288" r:id="rId51"/>
+    <p:sldId id="354" r:id="rId52"/>
   </p:sldIdLst>
   <p:sldSz cx="9144000" cy="6858000" type="screen4x3"/>
   <p:notesSz cx="6858000" cy="9144000"/>
   <p:embeddedFontLst>
     <p:embeddedFont>
       <p:font typeface="Calibri" panose="020F0502020204030204" pitchFamily="34" charset="0"/>
-      <p:regular r:id="rId59"/>
-      <p:bold r:id="rId60"/>
-      <p:italic r:id="rId61"/>
-      <p:boldItalic r:id="rId62"/>
+      <p:regular r:id="rId54"/>
+      <p:bold r:id="rId55"/>
+      <p:italic r:id="rId56"/>
+      <p:boldItalic r:id="rId57"/>
     </p:embeddedFont>
     <p:embeddedFont>
       <p:font typeface="Century Gothic" panose="020B0502020202020204" pitchFamily="34" charset="0"/>
-      <p:regular r:id="rId63"/>
-      <p:bold r:id="rId64"/>
-      <p:italic r:id="rId65"/>
-      <p:boldItalic r:id="rId66"/>
+      <p:regular r:id="rId58"/>
+      <p:bold r:id="rId59"/>
+      <p:italic r:id="rId60"/>
+      <p:boldItalic r:id="rId61"/>
     </p:embeddedFont>
   </p:embeddedFontLst>
   <p:defaultTextStyle>
@@ -269,11 +264,6 @@
             <p14:sldId id="376"/>
             <p14:sldId id="375"/>
             <p14:sldId id="374"/>
-            <p14:sldId id="369"/>
-            <p14:sldId id="281"/>
-            <p14:sldId id="370"/>
-            <p14:sldId id="283"/>
-            <p14:sldId id="284"/>
             <p14:sldId id="307"/>
           </p14:sldIdLst>
         </p14:section>
@@ -327,7 +317,7 @@
 <file path=ppt/revisionInfo.xml><?xml version="1.0" encoding="utf-8"?>
 <p1510:revInfo xmlns:a="http://schemas.openxmlformats.org/drawingml/2006/main" xmlns:r="http://schemas.openxmlformats.org/officeDocument/2006/relationships" xmlns:p1510="http://schemas.microsoft.com/office/powerpoint/2015/10/main">
   <p1510:revLst>
-    <p1510:client id="{CEECA33A-0581-4F3F-8D79-931A967D789A}" v="22" dt="2021-08-25T19:10:44.122"/>
+    <p1510:client id="{CEECA33A-0581-4F3F-8D79-931A967D789A}" v="26" dt="2021-08-25T19:46:16.470"/>
   </p1510:revLst>
 </p1510:revInfo>
 </file>
@@ -337,7 +327,7 @@
   <pc:docChgLst>
     <pc:chgData name="DeCicco, Barry" userId="598d2070-81f9-4814-a3fd-315cf73b76ef" providerId="ADAL" clId="{CEECA33A-0581-4F3F-8D79-931A967D789A}"/>
     <pc:docChg chg="undo custSel addSld delSld modSld sldOrd addSection delSection modSection">
-      <pc:chgData name="DeCicco, Barry" userId="598d2070-81f9-4814-a3fd-315cf73b76ef" providerId="ADAL" clId="{CEECA33A-0581-4F3F-8D79-931A967D789A}" dt="2021-08-25T19:11:17.715" v="3127" actId="14100"/>
+      <pc:chgData name="DeCicco, Barry" userId="598d2070-81f9-4814-a3fd-315cf73b76ef" providerId="ADAL" clId="{CEECA33A-0581-4F3F-8D79-931A967D789A}" dt="2021-08-25T19:51:37.600" v="3566" actId="20577"/>
       <pc:docMkLst>
         <pc:docMk/>
       </pc:docMkLst>
@@ -818,13 +808,13 @@
         </pc:sldMkLst>
       </pc:sldChg>
       <pc:sldChg chg="modSp mod">
-        <pc:chgData name="DeCicco, Barry" userId="598d2070-81f9-4814-a3fd-315cf73b76ef" providerId="ADAL" clId="{CEECA33A-0581-4F3F-8D79-931A967D789A}" dt="2021-08-25T18:23:19.991" v="1471" actId="20577"/>
+        <pc:chgData name="DeCicco, Barry" userId="598d2070-81f9-4814-a3fd-315cf73b76ef" providerId="ADAL" clId="{CEECA33A-0581-4F3F-8D79-931A967D789A}" dt="2021-08-25T19:51:37.600" v="3566" actId="20577"/>
         <pc:sldMkLst>
           <pc:docMk/>
           <pc:sldMk cId="0" sldId="277"/>
         </pc:sldMkLst>
         <pc:spChg chg="mod">
-          <ac:chgData name="DeCicco, Barry" userId="598d2070-81f9-4814-a3fd-315cf73b76ef" providerId="ADAL" clId="{CEECA33A-0581-4F3F-8D79-931A967D789A}" dt="2021-08-25T18:23:19.991" v="1471" actId="20577"/>
+          <ac:chgData name="DeCicco, Barry" userId="598d2070-81f9-4814-a3fd-315cf73b76ef" providerId="ADAL" clId="{CEECA33A-0581-4F3F-8D79-931A967D789A}" dt="2021-08-25T19:51:37.600" v="3566" actId="20577"/>
           <ac:spMkLst>
             <pc:docMk/>
             <pc:sldMk cId="0" sldId="277"/>
@@ -978,8 +968,8 @@
           <pc:sldMk cId="2702762404" sldId="280"/>
         </pc:sldMkLst>
       </pc:sldChg>
-      <pc:sldChg chg="modSp mod">
-        <pc:chgData name="DeCicco, Barry" userId="598d2070-81f9-4814-a3fd-315cf73b76ef" providerId="ADAL" clId="{CEECA33A-0581-4F3F-8D79-931A967D789A}" dt="2021-08-25T13:08:09.850" v="590" actId="27636"/>
+      <pc:sldChg chg="modSp del mod">
+        <pc:chgData name="DeCicco, Barry" userId="598d2070-81f9-4814-a3fd-315cf73b76ef" providerId="ADAL" clId="{CEECA33A-0581-4F3F-8D79-931A967D789A}" dt="2021-08-25T19:33:31.677" v="3378" actId="2696"/>
         <pc:sldMkLst>
           <pc:docMk/>
           <pc:sldMk cId="0" sldId="281"/>
@@ -1040,8 +1030,8 @@
           </ac:cxnSpMkLst>
         </pc:cxnChg>
       </pc:sldChg>
-      <pc:sldChg chg="modSp mod">
-        <pc:chgData name="DeCicco, Barry" userId="598d2070-81f9-4814-a3fd-315cf73b76ef" providerId="ADAL" clId="{CEECA33A-0581-4F3F-8D79-931A967D789A}" dt="2021-08-25T13:08:09.864" v="591" actId="27636"/>
+      <pc:sldChg chg="modSp del mod">
+        <pc:chgData name="DeCicco, Barry" userId="598d2070-81f9-4814-a3fd-315cf73b76ef" providerId="ADAL" clId="{CEECA33A-0581-4F3F-8D79-931A967D789A}" dt="2021-08-25T19:33:39.965" v="3380" actId="47"/>
         <pc:sldMkLst>
           <pc:docMk/>
           <pc:sldMk cId="0" sldId="283"/>
@@ -1062,8 +1052,8 @@
           <pc:sldMk cId="2380580409" sldId="283"/>
         </pc:sldMkLst>
       </pc:sldChg>
-      <pc:sldChg chg="modSp mod">
-        <pc:chgData name="DeCicco, Barry" userId="598d2070-81f9-4814-a3fd-315cf73b76ef" providerId="ADAL" clId="{CEECA33A-0581-4F3F-8D79-931A967D789A}" dt="2021-08-25T13:08:09.867" v="592" actId="27636"/>
+      <pc:sldChg chg="modSp del mod">
+        <pc:chgData name="DeCicco, Barry" userId="598d2070-81f9-4814-a3fd-315cf73b76ef" providerId="ADAL" clId="{CEECA33A-0581-4F3F-8D79-931A967D789A}" dt="2021-08-25T19:33:39.965" v="3380" actId="47"/>
         <pc:sldMkLst>
           <pc:docMk/>
           <pc:sldMk cId="0" sldId="284"/>
@@ -1717,13 +1707,13 @@
         </pc:sldMkLst>
       </pc:sldChg>
       <pc:sldChg chg="modSp add mod">
-        <pc:chgData name="DeCicco, Barry" userId="598d2070-81f9-4814-a3fd-315cf73b76ef" providerId="ADAL" clId="{CEECA33A-0581-4F3F-8D79-931A967D789A}" dt="2021-08-25T13:00:35.441" v="547" actId="20577"/>
+        <pc:chgData name="DeCicco, Barry" userId="598d2070-81f9-4814-a3fd-315cf73b76ef" providerId="ADAL" clId="{CEECA33A-0581-4F3F-8D79-931A967D789A}" dt="2021-08-25T19:50:04.865" v="3561" actId="1076"/>
         <pc:sldMkLst>
           <pc:docMk/>
           <pc:sldMk cId="199356324" sldId="364"/>
         </pc:sldMkLst>
         <pc:spChg chg="mod">
-          <ac:chgData name="DeCicco, Barry" userId="598d2070-81f9-4814-a3fd-315cf73b76ef" providerId="ADAL" clId="{CEECA33A-0581-4F3F-8D79-931A967D789A}" dt="2021-08-25T13:00:35.441" v="547" actId="20577"/>
+          <ac:chgData name="DeCicco, Barry" userId="598d2070-81f9-4814-a3fd-315cf73b76ef" providerId="ADAL" clId="{CEECA33A-0581-4F3F-8D79-931A967D789A}" dt="2021-08-25T19:50:04.865" v="3561" actId="1076"/>
           <ac:spMkLst>
             <pc:docMk/>
             <pc:sldMk cId="199356324" sldId="364"/>
@@ -1842,8 +1832,8 @@
           <pc:sldMk cId="2919566998" sldId="368"/>
         </pc:sldMkLst>
       </pc:sldChg>
-      <pc:sldChg chg="add">
-        <pc:chgData name="DeCicco, Barry" userId="598d2070-81f9-4814-a3fd-315cf73b76ef" providerId="ADAL" clId="{CEECA33A-0581-4F3F-8D79-931A967D789A}" dt="2021-08-25T18:35:54.329" v="2141" actId="2890"/>
+      <pc:sldChg chg="add del">
+        <pc:chgData name="DeCicco, Barry" userId="598d2070-81f9-4814-a3fd-315cf73b76ef" providerId="ADAL" clId="{CEECA33A-0581-4F3F-8D79-931A967D789A}" dt="2021-08-25T19:33:28.953" v="3377" actId="2696"/>
         <pc:sldMkLst>
           <pc:docMk/>
           <pc:sldMk cId="3392076918" sldId="369"/>
@@ -1856,15 +1846,15 @@
           <pc:sldMk cId="768281028" sldId="370"/>
         </pc:sldMkLst>
       </pc:sldChg>
-      <pc:sldChg chg="add">
-        <pc:chgData name="DeCicco, Barry" userId="598d2070-81f9-4814-a3fd-315cf73b76ef" providerId="ADAL" clId="{CEECA33A-0581-4F3F-8D79-931A967D789A}" dt="2021-08-25T18:46:00.877" v="2254" actId="2890"/>
+      <pc:sldChg chg="add del">
+        <pc:chgData name="DeCicco, Barry" userId="598d2070-81f9-4814-a3fd-315cf73b76ef" providerId="ADAL" clId="{CEECA33A-0581-4F3F-8D79-931A967D789A}" dt="2021-08-25T19:33:35.690" v="3379" actId="2696"/>
         <pc:sldMkLst>
           <pc:docMk/>
           <pc:sldMk cId="2539329128" sldId="370"/>
         </pc:sldMkLst>
       </pc:sldChg>
       <pc:sldChg chg="addSp delSp modSp add mod">
-        <pc:chgData name="DeCicco, Barry" userId="598d2070-81f9-4814-a3fd-315cf73b76ef" providerId="ADAL" clId="{CEECA33A-0581-4F3F-8D79-931A967D789A}" dt="2021-08-25T19:05:50.362" v="2988" actId="21"/>
+        <pc:chgData name="DeCicco, Barry" userId="598d2070-81f9-4814-a3fd-315cf73b76ef" providerId="ADAL" clId="{CEECA33A-0581-4F3F-8D79-931A967D789A}" dt="2021-08-25T19:34:05.753" v="3414" actId="6549"/>
         <pc:sldMkLst>
           <pc:docMk/>
           <pc:sldMk cId="1560526531" sldId="371"/>
@@ -1902,7 +1892,7 @@
           </ac:spMkLst>
         </pc:spChg>
         <pc:spChg chg="mod">
-          <ac:chgData name="DeCicco, Barry" userId="598d2070-81f9-4814-a3fd-315cf73b76ef" providerId="ADAL" clId="{CEECA33A-0581-4F3F-8D79-931A967D789A}" dt="2021-08-25T19:05:50.362" v="2988" actId="21"/>
+          <ac:chgData name="DeCicco, Barry" userId="598d2070-81f9-4814-a3fd-315cf73b76ef" providerId="ADAL" clId="{CEECA33A-0581-4F3F-8D79-931A967D789A}" dt="2021-08-25T19:34:05.753" v="3414" actId="6549"/>
           <ac:spMkLst>
             <pc:docMk/>
             <pc:sldMk cId="1560526531" sldId="371"/>
@@ -1964,7 +1954,7 @@
         </pc:spChg>
       </pc:sldChg>
       <pc:sldChg chg="addSp delSp modSp add mod">
-        <pc:chgData name="DeCicco, Barry" userId="598d2070-81f9-4814-a3fd-315cf73b76ef" providerId="ADAL" clId="{CEECA33A-0581-4F3F-8D79-931A967D789A}" dt="2021-08-25T18:59:04.835" v="2661" actId="122"/>
+        <pc:chgData name="DeCicco, Barry" userId="598d2070-81f9-4814-a3fd-315cf73b76ef" providerId="ADAL" clId="{CEECA33A-0581-4F3F-8D79-931A967D789A}" dt="2021-08-25T19:22:48.800" v="3150" actId="20577"/>
         <pc:sldMkLst>
           <pc:docMk/>
           <pc:sldMk cId="3172554485" sldId="373"/>
@@ -1986,7 +1976,7 @@
           </ac:spMkLst>
         </pc:spChg>
         <pc:spChg chg="mod">
-          <ac:chgData name="DeCicco, Barry" userId="598d2070-81f9-4814-a3fd-315cf73b76ef" providerId="ADAL" clId="{CEECA33A-0581-4F3F-8D79-931A967D789A}" dt="2021-08-25T18:59:04.835" v="2661" actId="122"/>
+          <ac:chgData name="DeCicco, Barry" userId="598d2070-81f9-4814-a3fd-315cf73b76ef" providerId="ADAL" clId="{CEECA33A-0581-4F3F-8D79-931A967D789A}" dt="2021-08-25T19:22:48.800" v="3150" actId="20577"/>
           <ac:spMkLst>
             <pc:docMk/>
             <pc:sldMk cId="3172554485" sldId="373"/>
@@ -2002,7 +1992,15 @@
           </ac:spMkLst>
         </pc:spChg>
         <pc:picChg chg="add mod">
-          <ac:chgData name="DeCicco, Barry" userId="598d2070-81f9-4814-a3fd-315cf73b76ef" providerId="ADAL" clId="{CEECA33A-0581-4F3F-8D79-931A967D789A}" dt="2021-08-25T18:58:56.387" v="2659" actId="1076"/>
+          <ac:chgData name="DeCicco, Barry" userId="598d2070-81f9-4814-a3fd-315cf73b76ef" providerId="ADAL" clId="{CEECA33A-0581-4F3F-8D79-931A967D789A}" dt="2021-08-25T19:22:41.625" v="3133" actId="1076"/>
+          <ac:picMkLst>
+            <pc:docMk/>
+            <pc:sldMk cId="3172554485" sldId="373"/>
+            <ac:picMk id="3" creationId="{DA14A2B2-D394-4A41-BCFF-F8AF2D6D23DF}"/>
+          </ac:picMkLst>
+        </pc:picChg>
+        <pc:picChg chg="add del mod">
+          <ac:chgData name="DeCicco, Barry" userId="598d2070-81f9-4814-a3fd-315cf73b76ef" providerId="ADAL" clId="{CEECA33A-0581-4F3F-8D79-931A967D789A}" dt="2021-08-25T19:22:27.315" v="3128" actId="478"/>
           <ac:picMkLst>
             <pc:docMk/>
             <pc:sldMk cId="3172554485" sldId="373"/>
@@ -2024,20 +2022,44 @@
           <pc:sldMk cId="2347529687" sldId="374"/>
         </pc:sldMkLst>
       </pc:sldChg>
-      <pc:sldChg chg="modSp new mod">
-        <pc:chgData name="DeCicco, Barry" userId="598d2070-81f9-4814-a3fd-315cf73b76ef" providerId="ADAL" clId="{CEECA33A-0581-4F3F-8D79-931A967D789A}" dt="2021-08-25T19:03:26.808" v="2819" actId="27636"/>
+      <pc:sldChg chg="addSp delSp modSp new mod">
+        <pc:chgData name="DeCicco, Barry" userId="598d2070-81f9-4814-a3fd-315cf73b76ef" providerId="ADAL" clId="{CEECA33A-0581-4F3F-8D79-931A967D789A}" dt="2021-08-25T19:43:37.234" v="3498" actId="1076"/>
         <pc:sldMkLst>
           <pc:docMk/>
           <pc:sldMk cId="4207455809" sldId="374"/>
         </pc:sldMkLst>
         <pc:spChg chg="mod">
-          <ac:chgData name="DeCicco, Barry" userId="598d2070-81f9-4814-a3fd-315cf73b76ef" providerId="ADAL" clId="{CEECA33A-0581-4F3F-8D79-931A967D789A}" dt="2021-08-25T19:03:26.808" v="2819" actId="27636"/>
+          <ac:chgData name="DeCicco, Barry" userId="598d2070-81f9-4814-a3fd-315cf73b76ef" providerId="ADAL" clId="{CEECA33A-0581-4F3F-8D79-931A967D789A}" dt="2021-08-25T19:37:55.249" v="3432" actId="122"/>
           <ac:spMkLst>
             <pc:docMk/>
             <pc:sldMk cId="4207455809" sldId="374"/>
             <ac:spMk id="2" creationId="{4706F774-9C24-4451-8B7C-0234BA2E924D}"/>
           </ac:spMkLst>
         </pc:spChg>
+        <pc:spChg chg="del mod">
+          <ac:chgData name="DeCicco, Barry" userId="598d2070-81f9-4814-a3fd-315cf73b76ef" providerId="ADAL" clId="{CEECA33A-0581-4F3F-8D79-931A967D789A}" dt="2021-08-25T19:37:57.988" v="3434" actId="478"/>
+          <ac:spMkLst>
+            <pc:docMk/>
+            <pc:sldMk cId="4207455809" sldId="374"/>
+            <ac:spMk id="3" creationId="{3DEC58C5-A6AC-4D74-9314-23FAAC95018A}"/>
+          </ac:spMkLst>
+        </pc:spChg>
+        <pc:picChg chg="add del mod">
+          <ac:chgData name="DeCicco, Barry" userId="598d2070-81f9-4814-a3fd-315cf73b76ef" providerId="ADAL" clId="{CEECA33A-0581-4F3F-8D79-931A967D789A}" dt="2021-08-25T19:43:19.969" v="3495" actId="478"/>
+          <ac:picMkLst>
+            <pc:docMk/>
+            <pc:sldMk cId="4207455809" sldId="374"/>
+            <ac:picMk id="5" creationId="{526721C4-76B9-447B-BD0A-5D6EC254CD62}"/>
+          </ac:picMkLst>
+        </pc:picChg>
+        <pc:picChg chg="add mod">
+          <ac:chgData name="DeCicco, Barry" userId="598d2070-81f9-4814-a3fd-315cf73b76ef" providerId="ADAL" clId="{CEECA33A-0581-4F3F-8D79-931A967D789A}" dt="2021-08-25T19:43:37.234" v="3498" actId="1076"/>
+          <ac:picMkLst>
+            <pc:docMk/>
+            <pc:sldMk cId="4207455809" sldId="374"/>
+            <ac:picMk id="7" creationId="{F89BEF42-A67A-49CC-ADC1-5587D8FF1BF0}"/>
+          </ac:picMkLst>
+        </pc:picChg>
       </pc:sldChg>
       <pc:sldChg chg="del">
         <pc:chgData name="DeCicco, Barry" userId="598d2070-81f9-4814-a3fd-315cf73b76ef" providerId="ADAL" clId="{CEECA33A-0581-4F3F-8D79-931A967D789A}" dt="2021-08-25T12:37:36.333" v="50" actId="2696"/>
@@ -2046,14 +2068,38 @@
           <pc:sldMk cId="101958565" sldId="375"/>
         </pc:sldMkLst>
       </pc:sldChg>
-      <pc:sldChg chg="modSp add mod">
-        <pc:chgData name="DeCicco, Barry" userId="598d2070-81f9-4814-a3fd-315cf73b76ef" providerId="ADAL" clId="{CEECA33A-0581-4F3F-8D79-931A967D789A}" dt="2021-08-25T19:11:17.715" v="3127" actId="14100"/>
+      <pc:sldChg chg="addSp delSp modSp add mod">
+        <pc:chgData name="DeCicco, Barry" userId="598d2070-81f9-4814-a3fd-315cf73b76ef" providerId="ADAL" clId="{CEECA33A-0581-4F3F-8D79-931A967D789A}" dt="2021-08-25T19:39:07.520" v="3491" actId="14100"/>
         <pc:sldMkLst>
           <pc:docMk/>
           <pc:sldMk cId="3810788076" sldId="375"/>
         </pc:sldMkLst>
+        <pc:spChg chg="add mod">
+          <ac:chgData name="DeCicco, Barry" userId="598d2070-81f9-4814-a3fd-315cf73b76ef" providerId="ADAL" clId="{CEECA33A-0581-4F3F-8D79-931A967D789A}" dt="2021-08-25T19:32:47.466" v="3330" actId="1076"/>
+          <ac:spMkLst>
+            <pc:docMk/>
+            <pc:sldMk cId="3810788076" sldId="375"/>
+            <ac:spMk id="6" creationId="{802D4297-BBBE-43EB-9C12-453C0BC270B5}"/>
+          </ac:spMkLst>
+        </pc:spChg>
+        <pc:spChg chg="del mod">
+          <ac:chgData name="DeCicco, Barry" userId="598d2070-81f9-4814-a3fd-315cf73b76ef" providerId="ADAL" clId="{CEECA33A-0581-4F3F-8D79-931A967D789A}" dt="2021-08-25T19:32:15.615" v="3321" actId="478"/>
+          <ac:spMkLst>
+            <pc:docMk/>
+            <pc:sldMk cId="3810788076" sldId="375"/>
+            <ac:spMk id="8" creationId="{BC718B1D-36EB-4475-9B5F-60DE9E871765}"/>
+          </ac:spMkLst>
+        </pc:spChg>
         <pc:spChg chg="mod">
-          <ac:chgData name="DeCicco, Barry" userId="598d2070-81f9-4814-a3fd-315cf73b76ef" providerId="ADAL" clId="{CEECA33A-0581-4F3F-8D79-931A967D789A}" dt="2021-08-25T19:11:17.715" v="3127" actId="14100"/>
+          <ac:chgData name="DeCicco, Barry" userId="598d2070-81f9-4814-a3fd-315cf73b76ef" providerId="ADAL" clId="{CEECA33A-0581-4F3F-8D79-931A967D789A}" dt="2021-08-25T19:33:49.572" v="3393" actId="6549"/>
+          <ac:spMkLst>
+            <pc:docMk/>
+            <pc:sldMk cId="3810788076" sldId="375"/>
+            <ac:spMk id="304" creationId="{00000000-0000-0000-0000-000000000000}"/>
+          </ac:spMkLst>
+        </pc:spChg>
+        <pc:spChg chg="mod">
+          <ac:chgData name="DeCicco, Barry" userId="598d2070-81f9-4814-a3fd-315cf73b76ef" providerId="ADAL" clId="{CEECA33A-0581-4F3F-8D79-931A967D789A}" dt="2021-08-25T19:39:07.520" v="3491" actId="14100"/>
           <ac:spMkLst>
             <pc:docMk/>
             <pc:sldMk cId="3810788076" sldId="375"/>
@@ -2069,7 +2115,7 @@
         </pc:sldMkLst>
       </pc:sldChg>
       <pc:sldChg chg="addSp delSp modSp add mod">
-        <pc:chgData name="DeCicco, Barry" userId="598d2070-81f9-4814-a3fd-315cf73b76ef" providerId="ADAL" clId="{CEECA33A-0581-4F3F-8D79-931A967D789A}" dt="2021-08-25T19:11:05.900" v="3126" actId="14100"/>
+        <pc:chgData name="DeCicco, Barry" userId="598d2070-81f9-4814-a3fd-315cf73b76ef" providerId="ADAL" clId="{CEECA33A-0581-4F3F-8D79-931A967D789A}" dt="2021-08-25T19:31:27.396" v="3304" actId="14100"/>
         <pc:sldMkLst>
           <pc:docMk/>
           <pc:sldMk cId="2320815007" sldId="376"/>
@@ -2083,7 +2129,7 @@
           </ac:spMkLst>
         </pc:spChg>
         <pc:spChg chg="mod ord">
-          <ac:chgData name="DeCicco, Barry" userId="598d2070-81f9-4814-a3fd-315cf73b76ef" providerId="ADAL" clId="{CEECA33A-0581-4F3F-8D79-931A967D789A}" dt="2021-08-25T19:10:26.694" v="3087" actId="20577"/>
+          <ac:chgData name="DeCicco, Barry" userId="598d2070-81f9-4814-a3fd-315cf73b76ef" providerId="ADAL" clId="{CEECA33A-0581-4F3F-8D79-931A967D789A}" dt="2021-08-25T19:30:22.882" v="3159" actId="20577"/>
           <ac:spMkLst>
             <pc:docMk/>
             <pc:sldMk cId="2320815007" sldId="376"/>
@@ -2091,7 +2137,7 @@
           </ac:spMkLst>
         </pc:spChg>
         <pc:spChg chg="mod">
-          <ac:chgData name="DeCicco, Barry" userId="598d2070-81f9-4814-a3fd-315cf73b76ef" providerId="ADAL" clId="{CEECA33A-0581-4F3F-8D79-931A967D789A}" dt="2021-08-25T19:10:49.503" v="3121" actId="1076"/>
+          <ac:chgData name="DeCicco, Barry" userId="598d2070-81f9-4814-a3fd-315cf73b76ef" providerId="ADAL" clId="{CEECA33A-0581-4F3F-8D79-931A967D789A}" dt="2021-08-25T19:31:24.310" v="3303" actId="6549"/>
           <ac:spMkLst>
             <pc:docMk/>
             <pc:sldMk cId="2320815007" sldId="376"/>
@@ -2099,7 +2145,7 @@
           </ac:spMkLst>
         </pc:spChg>
         <pc:cxnChg chg="mod">
-          <ac:chgData name="DeCicco, Barry" userId="598d2070-81f9-4814-a3fd-315cf73b76ef" providerId="ADAL" clId="{CEECA33A-0581-4F3F-8D79-931A967D789A}" dt="2021-08-25T19:11:00.475" v="3124" actId="14100"/>
+          <ac:chgData name="DeCicco, Barry" userId="598d2070-81f9-4814-a3fd-315cf73b76ef" providerId="ADAL" clId="{CEECA33A-0581-4F3F-8D79-931A967D789A}" dt="2021-08-25T19:31:27.396" v="3304" actId="14100"/>
           <ac:cxnSpMkLst>
             <pc:docMk/>
             <pc:sldMk cId="2320815007" sldId="376"/>
@@ -2123,7 +2169,7 @@
           </ac:cxnSpMkLst>
         </pc:cxnChg>
         <pc:cxnChg chg="add mod">
-          <ac:chgData name="DeCicco, Barry" userId="598d2070-81f9-4814-a3fd-315cf73b76ef" providerId="ADAL" clId="{CEECA33A-0581-4F3F-8D79-931A967D789A}" dt="2021-08-25T19:11:05.900" v="3126" actId="14100"/>
+          <ac:chgData name="DeCicco, Barry" userId="598d2070-81f9-4814-a3fd-315cf73b76ef" providerId="ADAL" clId="{CEECA33A-0581-4F3F-8D79-931A967D789A}" dt="2021-08-25T19:31:10.086" v="3294" actId="14100"/>
           <ac:cxnSpMkLst>
             <pc:docMk/>
             <pc:sldMk cId="2320815007" sldId="376"/>
@@ -2131,13 +2177,52 @@
           </ac:cxnSpMkLst>
         </pc:cxnChg>
         <pc:cxnChg chg="add mod">
-          <ac:chgData name="DeCicco, Barry" userId="598d2070-81f9-4814-a3fd-315cf73b76ef" providerId="ADAL" clId="{CEECA33A-0581-4F3F-8D79-931A967D789A}" dt="2021-08-25T19:10:56.832" v="3123" actId="14100"/>
+          <ac:chgData name="DeCicco, Barry" userId="598d2070-81f9-4814-a3fd-315cf73b76ef" providerId="ADAL" clId="{CEECA33A-0581-4F3F-8D79-931A967D789A}" dt="2021-08-25T19:31:07.547" v="3293" actId="14100"/>
           <ac:cxnSpMkLst>
             <pc:docMk/>
             <pc:sldMk cId="2320815007" sldId="376"/>
             <ac:cxnSpMk id="14" creationId="{00159092-51FD-4604-ABD0-0AFA6476F181}"/>
           </ac:cxnSpMkLst>
         </pc:cxnChg>
+      </pc:sldChg>
+      <pc:sldChg chg="addSp delSp modSp add del mod">
+        <pc:chgData name="DeCicco, Barry" userId="598d2070-81f9-4814-a3fd-315cf73b76ef" providerId="ADAL" clId="{CEECA33A-0581-4F3F-8D79-931A967D789A}" dt="2021-08-25T19:47:10.503" v="3506" actId="2696"/>
+        <pc:sldMkLst>
+          <pc:docMk/>
+          <pc:sldMk cId="302587208" sldId="377"/>
+        </pc:sldMkLst>
+        <pc:spChg chg="mod">
+          <ac:chgData name="DeCicco, Barry" userId="598d2070-81f9-4814-a3fd-315cf73b76ef" providerId="ADAL" clId="{CEECA33A-0581-4F3F-8D79-931A967D789A}" dt="2021-08-25T19:47:06.134" v="3505" actId="6549"/>
+          <ac:spMkLst>
+            <pc:docMk/>
+            <pc:sldMk cId="302587208" sldId="377"/>
+            <ac:spMk id="2" creationId="{4706F774-9C24-4451-8B7C-0234BA2E924D}"/>
+          </ac:spMkLst>
+        </pc:spChg>
+        <pc:spChg chg="add del mod">
+          <ac:chgData name="DeCicco, Barry" userId="598d2070-81f9-4814-a3fd-315cf73b76ef" providerId="ADAL" clId="{CEECA33A-0581-4F3F-8D79-931A967D789A}" dt="2021-08-25T19:45:20.049" v="3503" actId="478"/>
+          <ac:spMkLst>
+            <pc:docMk/>
+            <pc:sldMk cId="302587208" sldId="377"/>
+            <ac:spMk id="6" creationId="{7C8AFE1B-B2CA-4049-B36D-7ACCEF60247A}"/>
+          </ac:spMkLst>
+        </pc:spChg>
+        <pc:picChg chg="add del mod">
+          <ac:chgData name="DeCicco, Barry" userId="598d2070-81f9-4814-a3fd-315cf73b76ef" providerId="ADAL" clId="{CEECA33A-0581-4F3F-8D79-931A967D789A}" dt="2021-08-25T19:39:03.964" v="3490" actId="478"/>
+          <ac:picMkLst>
+            <pc:docMk/>
+            <pc:sldMk cId="302587208" sldId="377"/>
+            <ac:picMk id="4" creationId="{F6F51C69-DB32-4646-A0C9-8BCF59BBD75F}"/>
+          </ac:picMkLst>
+        </pc:picChg>
+        <pc:picChg chg="del">
+          <ac:chgData name="DeCicco, Barry" userId="598d2070-81f9-4814-a3fd-315cf73b76ef" providerId="ADAL" clId="{CEECA33A-0581-4F3F-8D79-931A967D789A}" dt="2021-08-25T19:38:24.137" v="3473" actId="478"/>
+          <ac:picMkLst>
+            <pc:docMk/>
+            <pc:sldMk cId="302587208" sldId="377"/>
+            <ac:picMk id="5" creationId="{526721C4-76B9-447B-BD0A-5D6EC254CD62}"/>
+          </ac:picMkLst>
+        </pc:picChg>
       </pc:sldChg>
       <pc:sldChg chg="del">
         <pc:chgData name="DeCicco, Barry" userId="598d2070-81f9-4814-a3fd-315cf73b76ef" providerId="ADAL" clId="{CEECA33A-0581-4F3F-8D79-931A967D789A}" dt="2021-08-25T12:37:37.198" v="57" actId="2696"/>
@@ -6583,7 +6668,7 @@
   <p:cSld>
     <p:spTree>
       <p:nvGrpSpPr>
-        <p:cNvPr id="1" name="Shape 283"/>
+        <p:cNvPr id="1" name="Shape 329"/>
         <p:cNvGrpSpPr/>
         <p:nvPr/>
       </p:nvGrpSpPr>
@@ -6597,7 +6682,7 @@
       </p:grpSpPr>
       <p:sp>
         <p:nvSpPr>
-          <p:cNvPr id="284" name="Google Shape;284;p25:notes"/>
+          <p:cNvPr id="330" name="Google Shape;330;p31:notes"/>
           <p:cNvSpPr txBox="1">
             <a:spLocks noGrp="1"/>
           </p:cNvSpPr>
@@ -6635,7 +6720,7 @@
       </p:sp>
       <p:sp>
         <p:nvSpPr>
-          <p:cNvPr id="285" name="Google Shape;285;p25:notes"/>
+          <p:cNvPr id="331" name="Google Shape;331;p31:notes"/>
           <p:cNvSpPr>
             <a:spLocks noGrp="1" noRot="1" noChangeAspect="1"/>
           </p:cNvSpPr>
@@ -6675,11 +6760,6 @@
         </p:spPr>
       </p:sp>
     </p:spTree>
-    <p:extLst>
-      <p:ext uri="{BB962C8B-B14F-4D97-AF65-F5344CB8AC3E}">
-        <p14:creationId xmlns:p14="http://schemas.microsoft.com/office/powerpoint/2010/main" val="422583704"/>
-      </p:ext>
-    </p:extLst>
   </p:cSld>
   <p:clrMapOvr>
     <a:masterClrMapping/>
@@ -6692,7 +6772,7 @@
   <p:cSld>
     <p:spTree>
       <p:nvGrpSpPr>
-        <p:cNvPr id="1" name="Shape 291"/>
+        <p:cNvPr id="1" name="Shape 329"/>
         <p:cNvGrpSpPr/>
         <p:nvPr/>
       </p:nvGrpSpPr>
@@ -6706,7 +6786,7 @@
       </p:grpSpPr>
       <p:sp>
         <p:nvSpPr>
-          <p:cNvPr id="292" name="Google Shape;292;p26:notes"/>
+          <p:cNvPr id="330" name="Google Shape;330;p31:notes"/>
           <p:cNvSpPr txBox="1">
             <a:spLocks noGrp="1"/>
           </p:cNvSpPr>
@@ -6744,7 +6824,7 @@
       </p:sp>
       <p:sp>
         <p:nvSpPr>
-          <p:cNvPr id="293" name="Google Shape;293;p26:notes"/>
+          <p:cNvPr id="331" name="Google Shape;331;p31:notes"/>
           <p:cNvSpPr>
             <a:spLocks noGrp="1" noRot="1" noChangeAspect="1"/>
           </p:cNvSpPr>
@@ -6784,6 +6864,11 @@
         </p:spPr>
       </p:sp>
     </p:spTree>
+    <p:extLst>
+      <p:ext uri="{BB962C8B-B14F-4D97-AF65-F5344CB8AC3E}">
+        <p14:creationId xmlns:p14="http://schemas.microsoft.com/office/powerpoint/2010/main" val="3725727929"/>
+      </p:ext>
+    </p:extLst>
   </p:cSld>
   <p:clrMapOvr>
     <a:masterClrMapping/>
@@ -6796,7 +6881,7 @@
   <p:cSld>
     <p:spTree>
       <p:nvGrpSpPr>
-        <p:cNvPr id="1" name="Shape 299"/>
+        <p:cNvPr id="1" name="Shape 335"/>
         <p:cNvGrpSpPr/>
         <p:nvPr/>
       </p:nvGrpSpPr>
@@ -6810,7 +6895,7 @@
       </p:grpSpPr>
       <p:sp>
         <p:nvSpPr>
-          <p:cNvPr id="300" name="Google Shape;300;p27:notes"/>
+          <p:cNvPr id="336" name="Google Shape;336;p32:notes"/>
           <p:cNvSpPr txBox="1">
             <a:spLocks noGrp="1"/>
           </p:cNvSpPr>
@@ -6848,7 +6933,7 @@
       </p:sp>
       <p:sp>
         <p:nvSpPr>
-          <p:cNvPr id="301" name="Google Shape;301;p27:notes"/>
+          <p:cNvPr id="337" name="Google Shape;337;p32:notes"/>
           <p:cNvSpPr>
             <a:spLocks noGrp="1" noRot="1" noChangeAspect="1"/>
           </p:cNvSpPr>
@@ -6888,11 +6973,6 @@
         </p:spPr>
       </p:sp>
     </p:spTree>
-    <p:extLst>
-      <p:ext uri="{BB962C8B-B14F-4D97-AF65-F5344CB8AC3E}">
-        <p14:creationId xmlns:p14="http://schemas.microsoft.com/office/powerpoint/2010/main" val="1714914262"/>
-      </p:ext>
-    </p:extLst>
   </p:cSld>
   <p:clrMapOvr>
     <a:masterClrMapping/>
@@ -6905,7 +6985,7 @@
   <p:cSld>
     <p:spTree>
       <p:nvGrpSpPr>
-        <p:cNvPr id="1" name="Shape 308"/>
+        <p:cNvPr id="1" name="Shape 341"/>
         <p:cNvGrpSpPr/>
         <p:nvPr/>
       </p:nvGrpSpPr>
@@ -6919,7 +6999,7 @@
       </p:grpSpPr>
       <p:sp>
         <p:nvSpPr>
-          <p:cNvPr id="309" name="Google Shape;309;p28:notes"/>
+          <p:cNvPr id="342" name="Google Shape;342;p33:notes"/>
           <p:cNvSpPr txBox="1">
             <a:spLocks noGrp="1"/>
           </p:cNvSpPr>
@@ -6957,7 +7037,7 @@
       </p:sp>
       <p:sp>
         <p:nvSpPr>
-          <p:cNvPr id="310" name="Google Shape;310;p28:notes"/>
+          <p:cNvPr id="343" name="Google Shape;343;p33:notes"/>
           <p:cNvSpPr>
             <a:spLocks noGrp="1" noRot="1" noChangeAspect="1"/>
           </p:cNvSpPr>
@@ -7004,214 +7084,6 @@
 </p:notes>
 </file>
 
-<file path=ppt/notesSlides/notesSlide48.xml><?xml version="1.0" encoding="utf-8"?>
-<p:notes xmlns:a="http://schemas.openxmlformats.org/drawingml/2006/main" xmlns:r="http://schemas.openxmlformats.org/officeDocument/2006/relationships" xmlns:p="http://schemas.openxmlformats.org/presentationml/2006/main" showMasterSp="0" showMasterPhAnim="0">
-  <p:cSld>
-    <p:spTree>
-      <p:nvGrpSpPr>
-        <p:cNvPr id="1" name="Shape 316"/>
-        <p:cNvGrpSpPr/>
-        <p:nvPr/>
-      </p:nvGrpSpPr>
-      <p:grpSpPr>
-        <a:xfrm>
-          <a:off x="0" y="0"/>
-          <a:ext cx="0" cy="0"/>
-          <a:chOff x="0" y="0"/>
-          <a:chExt cx="0" cy="0"/>
-        </a:xfrm>
-      </p:grpSpPr>
-      <p:sp>
-        <p:nvSpPr>
-          <p:cNvPr id="317" name="Google Shape;317;p29:notes"/>
-          <p:cNvSpPr txBox="1">
-            <a:spLocks noGrp="1"/>
-          </p:cNvSpPr>
-          <p:nvPr>
-            <p:ph type="body" idx="1"/>
-          </p:nvPr>
-        </p:nvSpPr>
-        <p:spPr>
-          <a:xfrm>
-            <a:off x="685800" y="4343400"/>
-            <a:ext cx="5486400" cy="4114800"/>
-          </a:xfrm>
-          <a:prstGeom prst="rect">
-            <a:avLst/>
-          </a:prstGeom>
-        </p:spPr>
-        <p:txBody>
-          <a:bodyPr spcFirstLastPara="1" wrap="square" lIns="91425" tIns="91425" rIns="91425" bIns="91425" anchor="t" anchorCtr="0">
-            <a:noAutofit/>
-          </a:bodyPr>
-          <a:lstStyle/>
-          <a:p>
-            <a:pPr marL="0" lvl="0" indent="0" algn="l" rtl="0">
-              <a:spcBef>
-                <a:spcPts val="0"/>
-              </a:spcBef>
-              <a:spcAft>
-                <a:spcPts val="0"/>
-              </a:spcAft>
-              <a:buNone/>
-            </a:pPr>
-            <a:endParaRPr/>
-          </a:p>
-        </p:txBody>
-      </p:sp>
-      <p:sp>
-        <p:nvSpPr>
-          <p:cNvPr id="318" name="Google Shape;318;p29:notes"/>
-          <p:cNvSpPr>
-            <a:spLocks noGrp="1" noRot="1" noChangeAspect="1"/>
-          </p:cNvSpPr>
-          <p:nvPr>
-            <p:ph type="sldImg" idx="2"/>
-          </p:nvPr>
-        </p:nvSpPr>
-        <p:spPr>
-          <a:xfrm>
-            <a:off x="1143000" y="685800"/>
-            <a:ext cx="4572000" cy="3429000"/>
-          </a:xfrm>
-          <a:custGeom>
-            <a:avLst/>
-            <a:gdLst/>
-            <a:ahLst/>
-            <a:cxnLst/>
-            <a:rect l="l" t="t" r="r" b="b"/>
-            <a:pathLst>
-              <a:path w="120000" h="120000" extrusionOk="0">
-                <a:moveTo>
-                  <a:pt x="0" y="0"/>
-                </a:moveTo>
-                <a:lnTo>
-                  <a:pt x="120000" y="0"/>
-                </a:lnTo>
-                <a:lnTo>
-                  <a:pt x="120000" y="120000"/>
-                </a:lnTo>
-                <a:lnTo>
-                  <a:pt x="0" y="120000"/>
-                </a:lnTo>
-                <a:close/>
-              </a:path>
-            </a:pathLst>
-          </a:custGeom>
-        </p:spPr>
-      </p:sp>
-    </p:spTree>
-  </p:cSld>
-  <p:clrMapOvr>
-    <a:masterClrMapping/>
-  </p:clrMapOvr>
-</p:notes>
-</file>
-
-<file path=ppt/notesSlides/notesSlide49.xml><?xml version="1.0" encoding="utf-8"?>
-<p:notes xmlns:a="http://schemas.openxmlformats.org/drawingml/2006/main" xmlns:r="http://schemas.openxmlformats.org/officeDocument/2006/relationships" xmlns:p="http://schemas.openxmlformats.org/presentationml/2006/main" showMasterSp="0" showMasterPhAnim="0">
-  <p:cSld>
-    <p:spTree>
-      <p:nvGrpSpPr>
-        <p:cNvPr id="1" name="Shape 329"/>
-        <p:cNvGrpSpPr/>
-        <p:nvPr/>
-      </p:nvGrpSpPr>
-      <p:grpSpPr>
-        <a:xfrm>
-          <a:off x="0" y="0"/>
-          <a:ext cx="0" cy="0"/>
-          <a:chOff x="0" y="0"/>
-          <a:chExt cx="0" cy="0"/>
-        </a:xfrm>
-      </p:grpSpPr>
-      <p:sp>
-        <p:nvSpPr>
-          <p:cNvPr id="330" name="Google Shape;330;p31:notes"/>
-          <p:cNvSpPr txBox="1">
-            <a:spLocks noGrp="1"/>
-          </p:cNvSpPr>
-          <p:nvPr>
-            <p:ph type="body" idx="1"/>
-          </p:nvPr>
-        </p:nvSpPr>
-        <p:spPr>
-          <a:xfrm>
-            <a:off x="685800" y="4343400"/>
-            <a:ext cx="5486400" cy="4114800"/>
-          </a:xfrm>
-          <a:prstGeom prst="rect">
-            <a:avLst/>
-          </a:prstGeom>
-        </p:spPr>
-        <p:txBody>
-          <a:bodyPr spcFirstLastPara="1" wrap="square" lIns="91425" tIns="91425" rIns="91425" bIns="91425" anchor="t" anchorCtr="0">
-            <a:noAutofit/>
-          </a:bodyPr>
-          <a:lstStyle/>
-          <a:p>
-            <a:pPr marL="0" lvl="0" indent="0" algn="l" rtl="0">
-              <a:spcBef>
-                <a:spcPts val="0"/>
-              </a:spcBef>
-              <a:spcAft>
-                <a:spcPts val="0"/>
-              </a:spcAft>
-              <a:buNone/>
-            </a:pPr>
-            <a:endParaRPr/>
-          </a:p>
-        </p:txBody>
-      </p:sp>
-      <p:sp>
-        <p:nvSpPr>
-          <p:cNvPr id="331" name="Google Shape;331;p31:notes"/>
-          <p:cNvSpPr>
-            <a:spLocks noGrp="1" noRot="1" noChangeAspect="1"/>
-          </p:cNvSpPr>
-          <p:nvPr>
-            <p:ph type="sldImg" idx="2"/>
-          </p:nvPr>
-        </p:nvSpPr>
-        <p:spPr>
-          <a:xfrm>
-            <a:off x="1143000" y="685800"/>
-            <a:ext cx="4572000" cy="3429000"/>
-          </a:xfrm>
-          <a:custGeom>
-            <a:avLst/>
-            <a:gdLst/>
-            <a:ahLst/>
-            <a:cxnLst/>
-            <a:rect l="l" t="t" r="r" b="b"/>
-            <a:pathLst>
-              <a:path w="120000" h="120000" extrusionOk="0">
-                <a:moveTo>
-                  <a:pt x="0" y="0"/>
-                </a:moveTo>
-                <a:lnTo>
-                  <a:pt x="120000" y="0"/>
-                </a:lnTo>
-                <a:lnTo>
-                  <a:pt x="120000" y="120000"/>
-                </a:lnTo>
-                <a:lnTo>
-                  <a:pt x="0" y="120000"/>
-                </a:lnTo>
-                <a:close/>
-              </a:path>
-            </a:pathLst>
-          </a:custGeom>
-        </p:spPr>
-      </p:sp>
-    </p:spTree>
-  </p:cSld>
-  <p:clrMapOvr>
-    <a:masterClrMapping/>
-  </p:clrMapOvr>
-</p:notes>
-</file>
-
 <file path=ppt/notesSlides/notesSlide5.xml><?xml version="1.0" encoding="utf-8"?>
 <p:notes xmlns:a="http://schemas.openxmlformats.org/drawingml/2006/main" xmlns:r="http://schemas.openxmlformats.org/officeDocument/2006/relationships" xmlns:p="http://schemas.openxmlformats.org/presentationml/2006/main" showMasterSp="0" showMasterPhAnim="0">
   <p:cSld>
@@ -7270,323 +7142,6 @@
       <p:sp>
         <p:nvSpPr>
           <p:cNvPr id="154" name="Google Shape;154;p4:notes"/>
-          <p:cNvSpPr>
-            <a:spLocks noGrp="1" noRot="1" noChangeAspect="1"/>
-          </p:cNvSpPr>
-          <p:nvPr>
-            <p:ph type="sldImg" idx="2"/>
-          </p:nvPr>
-        </p:nvSpPr>
-        <p:spPr>
-          <a:xfrm>
-            <a:off x="1143000" y="685800"/>
-            <a:ext cx="4572000" cy="3429000"/>
-          </a:xfrm>
-          <a:custGeom>
-            <a:avLst/>
-            <a:gdLst/>
-            <a:ahLst/>
-            <a:cxnLst/>
-            <a:rect l="l" t="t" r="r" b="b"/>
-            <a:pathLst>
-              <a:path w="120000" h="120000" extrusionOk="0">
-                <a:moveTo>
-                  <a:pt x="0" y="0"/>
-                </a:moveTo>
-                <a:lnTo>
-                  <a:pt x="120000" y="0"/>
-                </a:lnTo>
-                <a:lnTo>
-                  <a:pt x="120000" y="120000"/>
-                </a:lnTo>
-                <a:lnTo>
-                  <a:pt x="0" y="120000"/>
-                </a:lnTo>
-                <a:close/>
-              </a:path>
-            </a:pathLst>
-          </a:custGeom>
-        </p:spPr>
-      </p:sp>
-    </p:spTree>
-  </p:cSld>
-  <p:clrMapOvr>
-    <a:masterClrMapping/>
-  </p:clrMapOvr>
-</p:notes>
-</file>
-
-<file path=ppt/notesSlides/notesSlide50.xml><?xml version="1.0" encoding="utf-8"?>
-<p:notes xmlns:a="http://schemas.openxmlformats.org/drawingml/2006/main" xmlns:r="http://schemas.openxmlformats.org/officeDocument/2006/relationships" xmlns:p="http://schemas.openxmlformats.org/presentationml/2006/main" showMasterSp="0" showMasterPhAnim="0">
-  <p:cSld>
-    <p:spTree>
-      <p:nvGrpSpPr>
-        <p:cNvPr id="1" name="Shape 329"/>
-        <p:cNvGrpSpPr/>
-        <p:nvPr/>
-      </p:nvGrpSpPr>
-      <p:grpSpPr>
-        <a:xfrm>
-          <a:off x="0" y="0"/>
-          <a:ext cx="0" cy="0"/>
-          <a:chOff x="0" y="0"/>
-          <a:chExt cx="0" cy="0"/>
-        </a:xfrm>
-      </p:grpSpPr>
-      <p:sp>
-        <p:nvSpPr>
-          <p:cNvPr id="330" name="Google Shape;330;p31:notes"/>
-          <p:cNvSpPr txBox="1">
-            <a:spLocks noGrp="1"/>
-          </p:cNvSpPr>
-          <p:nvPr>
-            <p:ph type="body" idx="1"/>
-          </p:nvPr>
-        </p:nvSpPr>
-        <p:spPr>
-          <a:xfrm>
-            <a:off x="685800" y="4343400"/>
-            <a:ext cx="5486400" cy="4114800"/>
-          </a:xfrm>
-          <a:prstGeom prst="rect">
-            <a:avLst/>
-          </a:prstGeom>
-        </p:spPr>
-        <p:txBody>
-          <a:bodyPr spcFirstLastPara="1" wrap="square" lIns="91425" tIns="91425" rIns="91425" bIns="91425" anchor="t" anchorCtr="0">
-            <a:noAutofit/>
-          </a:bodyPr>
-          <a:lstStyle/>
-          <a:p>
-            <a:pPr marL="0" lvl="0" indent="0" algn="l" rtl="0">
-              <a:spcBef>
-                <a:spcPts val="0"/>
-              </a:spcBef>
-              <a:spcAft>
-                <a:spcPts val="0"/>
-              </a:spcAft>
-              <a:buNone/>
-            </a:pPr>
-            <a:endParaRPr/>
-          </a:p>
-        </p:txBody>
-      </p:sp>
-      <p:sp>
-        <p:nvSpPr>
-          <p:cNvPr id="331" name="Google Shape;331;p31:notes"/>
-          <p:cNvSpPr>
-            <a:spLocks noGrp="1" noRot="1" noChangeAspect="1"/>
-          </p:cNvSpPr>
-          <p:nvPr>
-            <p:ph type="sldImg" idx="2"/>
-          </p:nvPr>
-        </p:nvSpPr>
-        <p:spPr>
-          <a:xfrm>
-            <a:off x="1143000" y="685800"/>
-            <a:ext cx="4572000" cy="3429000"/>
-          </a:xfrm>
-          <a:custGeom>
-            <a:avLst/>
-            <a:gdLst/>
-            <a:ahLst/>
-            <a:cxnLst/>
-            <a:rect l="l" t="t" r="r" b="b"/>
-            <a:pathLst>
-              <a:path w="120000" h="120000" extrusionOk="0">
-                <a:moveTo>
-                  <a:pt x="0" y="0"/>
-                </a:moveTo>
-                <a:lnTo>
-                  <a:pt x="120000" y="0"/>
-                </a:lnTo>
-                <a:lnTo>
-                  <a:pt x="120000" y="120000"/>
-                </a:lnTo>
-                <a:lnTo>
-                  <a:pt x="0" y="120000"/>
-                </a:lnTo>
-                <a:close/>
-              </a:path>
-            </a:pathLst>
-          </a:custGeom>
-        </p:spPr>
-      </p:sp>
-    </p:spTree>
-    <p:extLst>
-      <p:ext uri="{BB962C8B-B14F-4D97-AF65-F5344CB8AC3E}">
-        <p14:creationId xmlns:p14="http://schemas.microsoft.com/office/powerpoint/2010/main" val="3725727929"/>
-      </p:ext>
-    </p:extLst>
-  </p:cSld>
-  <p:clrMapOvr>
-    <a:masterClrMapping/>
-  </p:clrMapOvr>
-</p:notes>
-</file>
-
-<file path=ppt/notesSlides/notesSlide51.xml><?xml version="1.0" encoding="utf-8"?>
-<p:notes xmlns:a="http://schemas.openxmlformats.org/drawingml/2006/main" xmlns:r="http://schemas.openxmlformats.org/officeDocument/2006/relationships" xmlns:p="http://schemas.openxmlformats.org/presentationml/2006/main" showMasterSp="0" showMasterPhAnim="0">
-  <p:cSld>
-    <p:spTree>
-      <p:nvGrpSpPr>
-        <p:cNvPr id="1" name="Shape 335"/>
-        <p:cNvGrpSpPr/>
-        <p:nvPr/>
-      </p:nvGrpSpPr>
-      <p:grpSpPr>
-        <a:xfrm>
-          <a:off x="0" y="0"/>
-          <a:ext cx="0" cy="0"/>
-          <a:chOff x="0" y="0"/>
-          <a:chExt cx="0" cy="0"/>
-        </a:xfrm>
-      </p:grpSpPr>
-      <p:sp>
-        <p:nvSpPr>
-          <p:cNvPr id="336" name="Google Shape;336;p32:notes"/>
-          <p:cNvSpPr txBox="1">
-            <a:spLocks noGrp="1"/>
-          </p:cNvSpPr>
-          <p:nvPr>
-            <p:ph type="body" idx="1"/>
-          </p:nvPr>
-        </p:nvSpPr>
-        <p:spPr>
-          <a:xfrm>
-            <a:off x="685800" y="4343400"/>
-            <a:ext cx="5486400" cy="4114800"/>
-          </a:xfrm>
-          <a:prstGeom prst="rect">
-            <a:avLst/>
-          </a:prstGeom>
-        </p:spPr>
-        <p:txBody>
-          <a:bodyPr spcFirstLastPara="1" wrap="square" lIns="91425" tIns="91425" rIns="91425" bIns="91425" anchor="t" anchorCtr="0">
-            <a:noAutofit/>
-          </a:bodyPr>
-          <a:lstStyle/>
-          <a:p>
-            <a:pPr marL="0" lvl="0" indent="0" algn="l" rtl="0">
-              <a:spcBef>
-                <a:spcPts val="0"/>
-              </a:spcBef>
-              <a:spcAft>
-                <a:spcPts val="0"/>
-              </a:spcAft>
-              <a:buNone/>
-            </a:pPr>
-            <a:endParaRPr/>
-          </a:p>
-        </p:txBody>
-      </p:sp>
-      <p:sp>
-        <p:nvSpPr>
-          <p:cNvPr id="337" name="Google Shape;337;p32:notes"/>
-          <p:cNvSpPr>
-            <a:spLocks noGrp="1" noRot="1" noChangeAspect="1"/>
-          </p:cNvSpPr>
-          <p:nvPr>
-            <p:ph type="sldImg" idx="2"/>
-          </p:nvPr>
-        </p:nvSpPr>
-        <p:spPr>
-          <a:xfrm>
-            <a:off x="1143000" y="685800"/>
-            <a:ext cx="4572000" cy="3429000"/>
-          </a:xfrm>
-          <a:custGeom>
-            <a:avLst/>
-            <a:gdLst/>
-            <a:ahLst/>
-            <a:cxnLst/>
-            <a:rect l="l" t="t" r="r" b="b"/>
-            <a:pathLst>
-              <a:path w="120000" h="120000" extrusionOk="0">
-                <a:moveTo>
-                  <a:pt x="0" y="0"/>
-                </a:moveTo>
-                <a:lnTo>
-                  <a:pt x="120000" y="0"/>
-                </a:lnTo>
-                <a:lnTo>
-                  <a:pt x="120000" y="120000"/>
-                </a:lnTo>
-                <a:lnTo>
-                  <a:pt x="0" y="120000"/>
-                </a:lnTo>
-                <a:close/>
-              </a:path>
-            </a:pathLst>
-          </a:custGeom>
-        </p:spPr>
-      </p:sp>
-    </p:spTree>
-  </p:cSld>
-  <p:clrMapOvr>
-    <a:masterClrMapping/>
-  </p:clrMapOvr>
-</p:notes>
-</file>
-
-<file path=ppt/notesSlides/notesSlide52.xml><?xml version="1.0" encoding="utf-8"?>
-<p:notes xmlns:a="http://schemas.openxmlformats.org/drawingml/2006/main" xmlns:r="http://schemas.openxmlformats.org/officeDocument/2006/relationships" xmlns:p="http://schemas.openxmlformats.org/presentationml/2006/main" showMasterSp="0" showMasterPhAnim="0">
-  <p:cSld>
-    <p:spTree>
-      <p:nvGrpSpPr>
-        <p:cNvPr id="1" name="Shape 341"/>
-        <p:cNvGrpSpPr/>
-        <p:nvPr/>
-      </p:nvGrpSpPr>
-      <p:grpSpPr>
-        <a:xfrm>
-          <a:off x="0" y="0"/>
-          <a:ext cx="0" cy="0"/>
-          <a:chOff x="0" y="0"/>
-          <a:chExt cx="0" cy="0"/>
-        </a:xfrm>
-      </p:grpSpPr>
-      <p:sp>
-        <p:nvSpPr>
-          <p:cNvPr id="342" name="Google Shape;342;p33:notes"/>
-          <p:cNvSpPr txBox="1">
-            <a:spLocks noGrp="1"/>
-          </p:cNvSpPr>
-          <p:nvPr>
-            <p:ph type="body" idx="1"/>
-          </p:nvPr>
-        </p:nvSpPr>
-        <p:spPr>
-          <a:xfrm>
-            <a:off x="685800" y="4343400"/>
-            <a:ext cx="5486400" cy="4114800"/>
-          </a:xfrm>
-          <a:prstGeom prst="rect">
-            <a:avLst/>
-          </a:prstGeom>
-        </p:spPr>
-        <p:txBody>
-          <a:bodyPr spcFirstLastPara="1" wrap="square" lIns="91425" tIns="91425" rIns="91425" bIns="91425" anchor="t" anchorCtr="0">
-            <a:noAutofit/>
-          </a:bodyPr>
-          <a:lstStyle/>
-          <a:p>
-            <a:pPr marL="0" lvl="0" indent="0" algn="l" rtl="0">
-              <a:spcBef>
-                <a:spcPts val="0"/>
-              </a:spcBef>
-              <a:spcAft>
-                <a:spcPts val="0"/>
-              </a:spcAft>
-              <a:buNone/>
-            </a:pPr>
-            <a:endParaRPr/>
-          </a:p>
-        </p:txBody>
-      </p:sp>
-      <p:sp>
-        <p:nvSpPr>
-          <p:cNvPr id="343" name="Google Shape;343;p33:notes"/>
           <p:cNvSpPr>
             <a:spLocks noGrp="1" noRot="1" noChangeAspect="1"/>
           </p:cNvSpPr>
@@ -15183,7 +14738,7 @@
         </p:nvSpPr>
         <p:spPr>
           <a:xfrm>
-            <a:off x="1033706" y="2462042"/>
+            <a:off x="890831" y="3157367"/>
             <a:ext cx="6401675" cy="1933916"/>
           </a:xfrm>
           <a:prstGeom prst="rect">
@@ -15216,42 +14771,8 @@
                   <a:schemeClr val="lt1"/>
                 </a:solidFill>
               </a:rPr>
-              <a:t># Any error messages from R will now show up </a:t>
-            </a:r>
-            <a:endParaRPr b="1" dirty="0">
-              <a:solidFill>
-                <a:schemeClr val="lt1"/>
-              </a:solidFill>
-            </a:endParaRPr>
-          </a:p>
-          <a:p>
-            <a:pPr marL="68580" indent="0">
-              <a:spcBef>
-                <a:spcPts val="720"/>
-              </a:spcBef>
-              <a:spcAft>
-                <a:spcPts val="0"/>
-              </a:spcAft>
-              <a:buSzPts val="1440"/>
-              <a:buNone/>
-            </a:pPr>
-            <a:endParaRPr b="1" dirty="0">
-              <a:solidFill>
-                <a:schemeClr val="dk1"/>
-              </a:solidFill>
-            </a:endParaRPr>
-          </a:p>
-          <a:p>
-            <a:pPr marL="0" indent="0">
-              <a:spcBef>
-                <a:spcPts val="720"/>
-              </a:spcBef>
-              <a:spcAft>
-                <a:spcPts val="0"/>
-              </a:spcAft>
-              <a:buSzPts val="1440"/>
-              <a:buNone/>
-            </a:pPr>
+              <a:t># A</a:t>
+            </a:r>
             <a:r>
               <a:rPr lang="en-US" b="1" dirty="0">
                 <a:solidFill>
@@ -16837,7 +16358,7 @@
                   <a:schemeClr val="dk1"/>
                 </a:solidFill>
               </a:rPr>
-              <a:t> HTML markdown.  For other types of output, other packages are needed.</a:t>
+              <a:t> HTML markdown.  For other types of output, other packages might needed.</a:t>
             </a:r>
             <a:endParaRPr dirty="0"/>
           </a:p>
@@ -18924,7 +18445,7 @@
             </a:pPr>
             <a:r>
               <a:rPr lang="en-US" b="1" dirty="0"/>
-              <a:t>RESULTS</a:t>
+              <a:t>RESULTS (run in PDF)</a:t>
             </a:r>
             <a:endParaRPr b="1" dirty="0"/>
           </a:p>
@@ -18932,10 +18453,10 @@
       </p:sp>
       <p:pic>
         <p:nvPicPr>
-          <p:cNvPr id="5" name="Picture 4" descr="Table&#10;&#10;Description automatically generated with low confidence">
+          <p:cNvPr id="3" name="Picture 2" descr="Table&#10;&#10;Description automatically generated">
             <a:extLst>
               <a:ext uri="{FF2B5EF4-FFF2-40B4-BE49-F238E27FC236}">
-                <a16:creationId xmlns:a16="http://schemas.microsoft.com/office/drawing/2014/main" id="{2880AF3B-5B3F-43DC-9116-A2AD0E519446}"/>
+                <a16:creationId xmlns:a16="http://schemas.microsoft.com/office/drawing/2014/main" id="{DA14A2B2-D394-4A41-BCFF-F8AF2D6D23DF}"/>
               </a:ext>
             </a:extLst>
           </p:cNvPr>
@@ -18952,8 +18473,8 @@
         </p:blipFill>
         <p:spPr>
           <a:xfrm>
-            <a:off x="1058803" y="1918599"/>
-            <a:ext cx="7347682" cy="4063101"/>
+            <a:off x="1666564" y="2025875"/>
+            <a:ext cx="5505761" cy="4015106"/>
           </a:xfrm>
           <a:prstGeom prst="rect">
             <a:avLst/>
@@ -19265,7 +18786,7 @@
                   <a:schemeClr val="dk1"/>
                 </a:solidFill>
               </a:rPr>
-              <a:t>The setup chunk is a normal chunk for R, with the addition of the ‘</a:t>
+              <a:t>The setup chunk is a normal chunk for R, with the addition of loading R’s ‘</a:t>
             </a:r>
             <a:r>
               <a:rPr lang="en-US" sz="2100" b="1" dirty="0" err="1">
@@ -19460,7 +18981,15 @@
           <a:p>
             <a:r>
               <a:rPr lang="en-US" dirty="0"/>
-              <a:t>```{chunk1, engine='</a:t>
+              <a:t>```{</a:t>
+            </a:r>
+            <a:r>
+              <a:rPr lang="en-US" dirty="0" err="1"/>
+              <a:t>sas</a:t>
+            </a:r>
+            <a:r>
+              <a:rPr lang="en-US" dirty="0"/>
+              <a:t>, engine='</a:t>
             </a:r>
             <a:r>
               <a:rPr lang="en-US" dirty="0" err="1"/>
@@ -19695,7 +19224,23 @@
                   <a:schemeClr val="dk1"/>
                 </a:solidFill>
               </a:rPr>
-              <a:t>The name of the chunk is ‘chunk1’.  Chunk names must be unique.</a:t>
+              <a:t>‘</a:t>
+            </a:r>
+            <a:r>
+              <a:rPr lang="en-US" sz="2100" b="1" dirty="0" err="1">
+                <a:solidFill>
+                  <a:schemeClr val="dk1"/>
+                </a:solidFill>
+              </a:rPr>
+              <a:t>sas</a:t>
+            </a:r>
+            <a:r>
+              <a:rPr lang="en-US" sz="2100" b="1" dirty="0">
+                <a:solidFill>
+                  <a:schemeClr val="dk1"/>
+                </a:solidFill>
+              </a:rPr>
+              <a:t>’ tells Rstudio to use SAS/</a:t>
             </a:r>
           </a:p>
           <a:p>
@@ -19732,8 +19277,25 @@
                   <a:schemeClr val="dk1"/>
                 </a:solidFill>
               </a:rPr>
-              <a:t>The information about SAS is provided in each code chunk which is to be run with SAS.</a:t>
-            </a:r>
+              <a:t>The other information tells Rstudio where SAS is, and what SAS options to use.</a:t>
+            </a:r>
+          </a:p>
+          <a:p>
+            <a:pPr marL="0" indent="0">
+              <a:spcBef>
+                <a:spcPts val="0"/>
+              </a:spcBef>
+              <a:spcAft>
+                <a:spcPts val="0"/>
+              </a:spcAft>
+              <a:buSzPts val="2240"/>
+              <a:buNone/>
+            </a:pPr>
+            <a:endParaRPr lang="en-US" sz="2100" b="1" dirty="0">
+              <a:solidFill>
+                <a:schemeClr val="dk1"/>
+              </a:solidFill>
+            </a:endParaRPr>
           </a:p>
           <a:p>
             <a:pPr marL="0" indent="0">
@@ -19790,8 +19352,8 @@
         </p:nvCxnSpPr>
         <p:spPr>
           <a:xfrm flipV="1">
-            <a:off x="3240454" y="3276601"/>
-            <a:ext cx="531446" cy="774640"/>
+            <a:off x="2886075" y="2514601"/>
+            <a:ext cx="885825" cy="838199"/>
           </a:xfrm>
           <a:prstGeom prst="straightConnector1">
             <a:avLst/>
@@ -19827,7 +19389,7 @@
         <p:spPr>
           <a:xfrm flipV="1">
             <a:off x="3333750" y="2125266"/>
-            <a:ext cx="762000" cy="290676"/>
+            <a:ext cx="762000" cy="389334"/>
           </a:xfrm>
           <a:prstGeom prst="straightConnector1">
             <a:avLst/>
@@ -19862,8 +19424,8 @@
         </p:nvCxnSpPr>
         <p:spPr>
           <a:xfrm flipV="1">
-            <a:off x="2181855" y="4619625"/>
-            <a:ext cx="1412980" cy="623387"/>
+            <a:off x="2371725" y="4619626"/>
+            <a:ext cx="1223110" cy="209549"/>
           </a:xfrm>
           <a:prstGeom prst="straightConnector1">
             <a:avLst/>
@@ -19955,7 +19517,7 @@
             </a:pPr>
             <a:r>
               <a:rPr lang="en-US" b="1" dirty="0"/>
-              <a:t>RUNNING SAS</a:t>
+              <a:t>RUNNING SAS BY CHUNK</a:t>
             </a:r>
             <a:endParaRPr b="1" dirty="0"/>
           </a:p>
@@ -19974,7 +19536,7 @@
         <p:spPr>
           <a:xfrm>
             <a:off x="416136" y="2434070"/>
-            <a:ext cx="3260513" cy="2858877"/>
+            <a:ext cx="3584364" cy="2858877"/>
           </a:xfrm>
           <a:prstGeom prst="rect">
             <a:avLst/>
@@ -20059,23 +19621,7 @@
                   <a:schemeClr val="dk1"/>
                 </a:solidFill>
               </a:rPr>
-              <a:t>’ tells </a:t>
-            </a:r>
-            <a:r>
-              <a:rPr lang="en-US" sz="2100" b="1" dirty="0" err="1">
-                <a:solidFill>
-                  <a:schemeClr val="dk1"/>
-                </a:solidFill>
-              </a:rPr>
-              <a:t>RSTudio</a:t>
-            </a:r>
-            <a:r>
-              <a:rPr lang="en-US" sz="2100" b="1" dirty="0">
-                <a:solidFill>
-                  <a:schemeClr val="dk1"/>
-                </a:solidFill>
-              </a:rPr>
-              <a:t> that this is for SAS.</a:t>
+              <a:t>’ tells RStudio that this is for SAS.</a:t>
             </a:r>
           </a:p>
           <a:p>
@@ -20112,22 +19658,17 @@
                   <a:schemeClr val="dk1"/>
                 </a:solidFill>
               </a:rPr>
-              <a:t>‘sas_1’ is the name of the code chunk; they must be unique.</a:t>
-            </a:r>
-            <a:endParaRPr sz="2100" b="1" dirty="0">
-              <a:solidFill>
-                <a:schemeClr val="dk1"/>
-              </a:solidFill>
-            </a:endParaRPr>
+              <a:t>THESE CHUNKS DO NOT NEED NAMES.</a:t>
+            </a:r>
           </a:p>
         </p:txBody>
       </p:sp>
       <p:sp>
         <p:nvSpPr>
-          <p:cNvPr id="8" name="TextBox 7">
+          <p:cNvPr id="6" name="TextBox 5">
             <a:extLst>
               <a:ext uri="{FF2B5EF4-FFF2-40B4-BE49-F238E27FC236}">
-                <a16:creationId xmlns:a16="http://schemas.microsoft.com/office/drawing/2014/main" id="{BC718B1D-36EB-4475-9B5F-60DE9E871765}"/>
+                <a16:creationId xmlns:a16="http://schemas.microsoft.com/office/drawing/2014/main" id="{802D4297-BBBE-43EB-9C12-453C0BC270B5}"/>
               </a:ext>
             </a:extLst>
           </p:cNvPr>
@@ -20136,8 +19677,8 @@
         </p:nvSpPr>
         <p:spPr>
           <a:xfrm>
-            <a:off x="3968826" y="1845909"/>
-            <a:ext cx="4572000" cy="3046988"/>
+            <a:off x="4422564" y="2292251"/>
+            <a:ext cx="4305300" cy="2862322"/>
           </a:xfrm>
           <a:prstGeom prst="rect">
             <a:avLst/>
@@ -20151,78 +19692,103 @@
           <a:lstStyle/>
           <a:p>
             <a:r>
-              <a:rPr lang="en-US" dirty="0"/>
+              <a:rPr lang="en-US" sz="1800" dirty="0"/>
               <a:t>```{</a:t>
             </a:r>
             <a:r>
-              <a:rPr lang="en-US" dirty="0" err="1"/>
+              <a:rPr lang="en-US" sz="1800" dirty="0" err="1"/>
               <a:t>sas</a:t>
             </a:r>
             <a:r>
-              <a:rPr lang="en-US" dirty="0"/>
-              <a:t> sas_1}</a:t>
-            </a:r>
-          </a:p>
-          <a:p>
-            <a:r>
-              <a:rPr lang="en-US" dirty="0"/>
+              <a:rPr lang="en-US" sz="1800" dirty="0"/>
+              <a:t>, engine='</a:t>
+            </a:r>
+            <a:r>
+              <a:rPr lang="en-US" sz="1800" dirty="0" err="1"/>
+              <a:t>sashtml</a:t>
+            </a:r>
+            <a:r>
+              <a:rPr lang="en-US" sz="1800" dirty="0"/>
+              <a:t>', </a:t>
+            </a:r>
+            <a:r>
+              <a:rPr lang="en-US" sz="1800" dirty="0" err="1"/>
+              <a:t>engine.path</a:t>
+            </a:r>
+            <a:r>
+              <a:rPr lang="en-US" sz="1800" dirty="0"/>
+              <a:t>="C:/Program Files/</a:t>
+            </a:r>
+            <a:r>
+              <a:rPr lang="en-US" sz="1800" dirty="0" err="1"/>
+              <a:t>SASHome</a:t>
+            </a:r>
+            <a:r>
+              <a:rPr lang="en-US" sz="1800" dirty="0"/>
+              <a:t>/</a:t>
+            </a:r>
+            <a:r>
+              <a:rPr lang="en-US" sz="1800" dirty="0" err="1"/>
+              <a:t>SASFoundation</a:t>
+            </a:r>
+            <a:r>
+              <a:rPr lang="en-US" sz="1800" dirty="0"/>
+              <a:t>/9.4/sas.exe", </a:t>
+            </a:r>
+            <a:r>
+              <a:rPr lang="en-US" sz="1800" dirty="0" err="1"/>
+              <a:t>engine.opts</a:t>
+            </a:r>
+            <a:r>
+              <a:rPr lang="en-US" sz="1800" dirty="0"/>
+              <a:t>="-</a:t>
+            </a:r>
+            <a:r>
+              <a:rPr lang="en-US" sz="1800" dirty="0" err="1"/>
+              <a:t>nosplash</a:t>
+            </a:r>
+            <a:r>
+              <a:rPr lang="en-US" sz="1800" dirty="0"/>
+              <a:t> -</a:t>
+            </a:r>
+            <a:r>
+              <a:rPr lang="en-US" sz="1800" dirty="0" err="1"/>
+              <a:t>linesize</a:t>
+            </a:r>
+            <a:r>
+              <a:rPr lang="en-US" sz="1800" dirty="0"/>
+              <a:t> 75"}</a:t>
+            </a:r>
+          </a:p>
+          <a:p>
+            <a:endParaRPr lang="en-US" sz="1800" dirty="0"/>
+          </a:p>
+          <a:p>
+            <a:r>
+              <a:rPr lang="en-US" sz="1800" dirty="0"/>
               <a:t>proc means data=</a:t>
             </a:r>
             <a:r>
-              <a:rPr lang="en-US" dirty="0" err="1"/>
+              <a:rPr lang="en-US" sz="1800" dirty="0" err="1"/>
               <a:t>sashelp.class</a:t>
             </a:r>
             <a:r>
-              <a:rPr lang="en-US" dirty="0"/>
+              <a:rPr lang="en-US" sz="1800" dirty="0"/>
               <a:t>;</a:t>
             </a:r>
           </a:p>
           <a:p>
             <a:r>
-              <a:rPr lang="en-US" dirty="0"/>
+              <a:rPr lang="en-US" sz="1800" dirty="0"/>
               <a:t>run;</a:t>
             </a:r>
           </a:p>
           <a:p>
-            <a:endParaRPr lang="en-US" dirty="0"/>
-          </a:p>
-          <a:p>
-            <a:r>
-              <a:rPr lang="en-US" dirty="0"/>
-              <a:t>proc </a:t>
-            </a:r>
-            <a:r>
-              <a:rPr lang="en-US" dirty="0" err="1"/>
-              <a:t>freq</a:t>
-            </a:r>
-            <a:r>
-              <a:rPr lang="en-US" dirty="0"/>
-              <a:t> data=</a:t>
-            </a:r>
-            <a:r>
-              <a:rPr lang="en-US" dirty="0" err="1"/>
-              <a:t>sashelp.class</a:t>
-            </a:r>
-            <a:r>
-              <a:rPr lang="en-US" dirty="0"/>
-              <a:t>;</a:t>
-            </a:r>
-          </a:p>
-          <a:p>
-            <a:r>
-              <a:rPr lang="en-US" dirty="0"/>
-              <a:t>    tables sex;</a:t>
-            </a:r>
-          </a:p>
-          <a:p>
-            <a:r>
-              <a:rPr lang="en-US" dirty="0"/>
-              <a:t>run;</a:t>
-            </a:r>
-          </a:p>
-          <a:p>
-            <a:r>
-              <a:rPr lang="en-US" dirty="0"/>
+            <a:endParaRPr lang="en-US" sz="1800" dirty="0"/>
+          </a:p>
+          <a:p>
+            <a:r>
+              <a:rPr lang="en-US" sz="1800" dirty="0"/>
               <a:t>```</a:t>
             </a:r>
           </a:p>
@@ -20281,35 +19847,44 @@
           </a:bodyPr>
           <a:lstStyle/>
           <a:p>
-            <a:endParaRPr lang="en-US"/>
+            <a:pPr algn="ctr"/>
+            <a:r>
+              <a:rPr lang="en-US" dirty="0"/>
+              <a:t>RESULTS</a:t>
+            </a:r>
           </a:p>
         </p:txBody>
       </p:sp>
-      <p:sp>
-        <p:nvSpPr>
-          <p:cNvPr id="3" name="Content Placeholder 2">
+      <p:pic>
+        <p:nvPicPr>
+          <p:cNvPr id="7" name="Picture 6">
             <a:extLst>
               <a:ext uri="{FF2B5EF4-FFF2-40B4-BE49-F238E27FC236}">
-                <a16:creationId xmlns:a16="http://schemas.microsoft.com/office/drawing/2014/main" id="{3DEC58C5-A6AC-4D74-9314-23FAAC95018A}"/>
+                <a16:creationId xmlns:a16="http://schemas.microsoft.com/office/drawing/2014/main" id="{F89BEF42-A67A-49CC-ADC1-5587D8FF1BF0}"/>
               </a:ext>
             </a:extLst>
           </p:cNvPr>
-          <p:cNvSpPr>
-            <a:spLocks noGrp="1"/>
-          </p:cNvSpPr>
-          <p:nvPr>
-            <p:ph idx="1"/>
-          </p:nvPr>
-        </p:nvSpPr>
-        <p:spPr/>
-        <p:txBody>
-          <a:bodyPr/>
-          <a:lstStyle/>
-          <a:p>
-            <a:endParaRPr lang="en-US"/>
-          </a:p>
-        </p:txBody>
-      </p:sp>
+          <p:cNvPicPr>
+            <a:picLocks noChangeAspect="1"/>
+          </p:cNvPicPr>
+          <p:nvPr/>
+        </p:nvPicPr>
+        <p:blipFill>
+          <a:blip r:embed="rId2"/>
+          <a:stretch>
+            <a:fillRect/>
+          </a:stretch>
+        </p:blipFill>
+        <p:spPr>
+          <a:xfrm>
+            <a:off x="1962150" y="2080013"/>
+            <a:ext cx="5597204" cy="3829511"/>
+          </a:xfrm>
+          <a:prstGeom prst="rect">
+            <a:avLst/>
+          </a:prstGeom>
+        </p:spPr>
+      </p:pic>
     </p:spTree>
     <p:extLst>
       <p:ext uri="{BB962C8B-B14F-4D97-AF65-F5344CB8AC3E}">
@@ -20328,7 +19903,7 @@
   <p:cSld>
     <p:spTree>
       <p:nvGrpSpPr>
-        <p:cNvPr id="1" name="Shape 286"/>
+        <p:cNvPr id="1" name=""/>
         <p:cNvGrpSpPr/>
         <p:nvPr/>
       </p:nvGrpSpPr>
@@ -20340,36 +19915,176 @@
           <a:chExt cx="0" cy="0"/>
         </a:xfrm>
       </p:grpSpPr>
-      <p:pic>
-        <p:nvPicPr>
-          <p:cNvPr id="287" name="Google Shape;287;p25"/>
-          <p:cNvPicPr preferRelativeResize="0"/>
-          <p:nvPr/>
-        </p:nvPicPr>
-        <p:blipFill rotWithShape="1">
-          <a:blip r:embed="rId3">
-            <a:alphaModFix/>
-          </a:blip>
-          <a:srcRect r="40171" b="26061"/>
-          <a:stretch/>
-        </p:blipFill>
+      <p:sp>
+        <p:nvSpPr>
+          <p:cNvPr id="2" name="Title 1">
+            <a:extLst>
+              <a:ext uri="{FF2B5EF4-FFF2-40B4-BE49-F238E27FC236}">
+                <a16:creationId xmlns:a16="http://schemas.microsoft.com/office/drawing/2014/main" id="{BACFA4CB-7516-43BB-BB55-C3F8D5B840AF}"/>
+              </a:ext>
+            </a:extLst>
+          </p:cNvPr>
+          <p:cNvSpPr>
+            <a:spLocks noGrp="1"/>
+          </p:cNvSpPr>
+          <p:nvPr>
+            <p:ph type="title"/>
+          </p:nvPr>
+        </p:nvSpPr>
         <p:spPr>
           <a:xfrm>
-            <a:off x="3400358" y="1877168"/>
-            <a:ext cx="5470814" cy="3803073"/>
+            <a:off x="564776" y="2998695"/>
+            <a:ext cx="8229600" cy="670422"/>
           </a:xfrm>
-          <a:prstGeom prst="rect">
-            <a:avLst/>
-          </a:prstGeom>
-          <a:noFill/>
-          <a:ln>
-            <a:noFill/>
-          </a:ln>
         </p:spPr>
-      </p:pic>
-      <p:sp>
-        <p:nvSpPr>
-          <p:cNvPr id="288" name="Google Shape;288;p25"/>
+        <p:txBody>
+          <a:bodyPr>
+            <a:noAutofit/>
+          </a:bodyPr>
+          <a:lstStyle/>
+          <a:p>
+            <a:pPr algn="ctr"/>
+            <a:r>
+              <a:rPr lang="en-US" sz="4800" b="1" dirty="0"/>
+              <a:t>Questions?</a:t>
+            </a:r>
+          </a:p>
+        </p:txBody>
+      </p:sp>
+    </p:spTree>
+    <p:extLst>
+      <p:ext uri="{BB962C8B-B14F-4D97-AF65-F5344CB8AC3E}">
+        <p14:creationId xmlns:p14="http://schemas.microsoft.com/office/powerpoint/2010/main" val="1427623844"/>
+      </p:ext>
+    </p:extLst>
+  </p:cSld>
+  <p:clrMapOvr>
+    <a:masterClrMapping/>
+  </p:clrMapOvr>
+</p:sld>
+</file>
+
+<file path=ppt/slides/slide46.xml><?xml version="1.0" encoding="utf-8"?>
+<p:sld xmlns:a="http://schemas.openxmlformats.org/drawingml/2006/main" xmlns:r="http://schemas.openxmlformats.org/officeDocument/2006/relationships" xmlns:p="http://schemas.openxmlformats.org/presentationml/2006/main">
+  <p:cSld>
+    <p:spTree>
+      <p:nvGrpSpPr>
+        <p:cNvPr id="1" name=""/>
+        <p:cNvGrpSpPr/>
+        <p:nvPr/>
+      </p:nvGrpSpPr>
+      <p:grpSpPr>
+        <a:xfrm>
+          <a:off x="0" y="0"/>
+          <a:ext cx="0" cy="0"/>
+          <a:chOff x="0" y="0"/>
+          <a:chExt cx="0" cy="0"/>
+        </a:xfrm>
+      </p:grpSpPr>
+      <p:sp>
+        <p:nvSpPr>
+          <p:cNvPr id="2" name="Title 1">
+            <a:extLst>
+              <a:ext uri="{FF2B5EF4-FFF2-40B4-BE49-F238E27FC236}">
+                <a16:creationId xmlns:a16="http://schemas.microsoft.com/office/drawing/2014/main" id="{501EDBC2-55D6-41C8-9BCF-E43C5D0CAFB3}"/>
+              </a:ext>
+            </a:extLst>
+          </p:cNvPr>
+          <p:cNvSpPr>
+            <a:spLocks noGrp="1"/>
+          </p:cNvSpPr>
+          <p:nvPr>
+            <p:ph type="ctrTitle"/>
+          </p:nvPr>
+        </p:nvSpPr>
+        <p:spPr/>
+        <p:txBody>
+          <a:bodyPr/>
+          <a:lstStyle/>
+          <a:p>
+            <a:pPr algn="ctr"/>
+            <a:r>
+              <a:rPr lang="en-US" b="1" dirty="0"/>
+              <a:t>Appendices</a:t>
+            </a:r>
+          </a:p>
+        </p:txBody>
+      </p:sp>
+      <p:sp>
+        <p:nvSpPr>
+          <p:cNvPr id="3" name="Subtitle 2">
+            <a:extLst>
+              <a:ext uri="{FF2B5EF4-FFF2-40B4-BE49-F238E27FC236}">
+                <a16:creationId xmlns:a16="http://schemas.microsoft.com/office/drawing/2014/main" id="{0BA9081E-00F9-4AD9-9B1C-16BCD018A229}"/>
+              </a:ext>
+            </a:extLst>
+          </p:cNvPr>
+          <p:cNvSpPr>
+            <a:spLocks noGrp="1"/>
+          </p:cNvSpPr>
+          <p:nvPr>
+            <p:ph type="subTitle" idx="1"/>
+          </p:nvPr>
+        </p:nvSpPr>
+        <p:spPr/>
+        <p:txBody>
+          <a:bodyPr>
+            <a:normAutofit/>
+          </a:bodyPr>
+          <a:lstStyle/>
+          <a:p>
+            <a:r>
+              <a:rPr lang="en-US" sz="2800" b="1" dirty="0"/>
+              <a:t>Appendix A: SAS Documentation</a:t>
+            </a:r>
+          </a:p>
+          <a:p>
+            <a:r>
+              <a:rPr lang="en-US" sz="2800" b="1" dirty="0"/>
+              <a:t>Appendix B: R Documentation</a:t>
+            </a:r>
+          </a:p>
+          <a:p>
+            <a:r>
+              <a:rPr lang="en-US" sz="2800" b="1" dirty="0"/>
+              <a:t>Appendix C: How to get a copy</a:t>
+            </a:r>
+          </a:p>
+        </p:txBody>
+      </p:sp>
+    </p:spTree>
+    <p:extLst>
+      <p:ext uri="{BB962C8B-B14F-4D97-AF65-F5344CB8AC3E}">
+        <p14:creationId xmlns:p14="http://schemas.microsoft.com/office/powerpoint/2010/main" val="976075550"/>
+      </p:ext>
+    </p:extLst>
+  </p:cSld>
+  <p:clrMapOvr>
+    <a:masterClrMapping/>
+  </p:clrMapOvr>
+</p:sld>
+</file>
+
+<file path=ppt/slides/slide47.xml><?xml version="1.0" encoding="utf-8"?>
+<p:sld xmlns:a="http://schemas.openxmlformats.org/drawingml/2006/main" xmlns:r="http://schemas.openxmlformats.org/officeDocument/2006/relationships" xmlns:p="http://schemas.openxmlformats.org/presentationml/2006/main">
+  <p:cSld>
+    <p:spTree>
+      <p:nvGrpSpPr>
+        <p:cNvPr id="1" name="Shape 332"/>
+        <p:cNvGrpSpPr/>
+        <p:nvPr/>
+      </p:nvGrpSpPr>
+      <p:grpSpPr>
+        <a:xfrm>
+          <a:off x="0" y="0"/>
+          <a:ext cx="0" cy="0"/>
+          <a:chOff x="0" y="0"/>
+          <a:chExt cx="0" cy="0"/>
+        </a:xfrm>
+      </p:grpSpPr>
+      <p:sp>
+        <p:nvSpPr>
+          <p:cNvPr id="333" name="Google Shape;333;p31"/>
           <p:cNvSpPr txBox="1">
             <a:spLocks noGrp="1"/>
           </p:cNvSpPr>
@@ -20396,29 +20111,16 @@
           </a:bodyPr>
           <a:lstStyle/>
           <a:p>
-            <a:pPr algn="ctr">
-              <a:spcBef>
-                <a:spcPts val="0"/>
-              </a:spcBef>
-              <a:spcAft>
-                <a:spcPts val="0"/>
-              </a:spcAft>
-              <a:buClr>
-                <a:schemeClr val="lt1"/>
-              </a:buClr>
-              <a:buSzPts val="3600"/>
-            </a:pPr>
-            <a:r>
-              <a:rPr lang="en-US" b="1"/>
-              <a:t>SETTING UP SAS IN A CODE CHUNK</a:t>
-            </a:r>
-            <a:endParaRPr b="1"/>
+            <a:r>
+              <a:rPr lang="en-US" sz="3600" b="1" dirty="0"/>
+              <a:t>Appendix A: SAS Documentation</a:t>
+            </a:r>
           </a:p>
         </p:txBody>
       </p:sp>
       <p:sp>
         <p:nvSpPr>
-          <p:cNvPr id="289" name="Google Shape;289;p25"/>
+          <p:cNvPr id="334" name="Google Shape;334;p31"/>
           <p:cNvSpPr txBox="1">
             <a:spLocks noGrp="1"/>
           </p:cNvSpPr>
@@ -20428,8 +20130,8 @@
         </p:nvSpPr>
         <p:spPr>
           <a:xfrm>
-            <a:off x="348951" y="2008963"/>
-            <a:ext cx="2770920" cy="3423181"/>
+            <a:off x="603174" y="2675316"/>
+            <a:ext cx="7912177" cy="2858877"/>
           </a:xfrm>
           <a:prstGeom prst="rect">
             <a:avLst/>
@@ -20441,150 +20143,138 @@
         </p:spPr>
         <p:txBody>
           <a:bodyPr spcFirstLastPara="1" wrap="square" lIns="68569" tIns="34275" rIns="68569" bIns="34275" anchor="ctr" anchorCtr="0">
-            <a:normAutofit fontScale="92500" lnSpcReduction="10000"/>
+            <a:noAutofit/>
           </a:bodyPr>
           <a:lstStyle/>
           <a:p>
-            <a:pPr marL="214313" indent="-214313">
-              <a:spcBef>
-                <a:spcPts val="0"/>
-              </a:spcBef>
-              <a:spcAft>
-                <a:spcPts val="0"/>
-              </a:spcAft>
-              <a:buSzPct val="80000"/>
-              <a:buChar char="▶"/>
-            </a:pPr>
-            <a:r>
-              <a:rPr lang="en-US" sz="2100" b="1">
-                <a:solidFill>
-                  <a:schemeClr val="dk1"/>
-                </a:solidFill>
-              </a:rPr>
-              <a:t>Gray items are ‘code chunks’, where there is code to be executed.</a:t>
-            </a:r>
-            <a:endParaRPr/>
-          </a:p>
-          <a:p>
-            <a:pPr marL="214313" indent="-214313">
-              <a:spcBef>
-                <a:spcPts val="839"/>
-              </a:spcBef>
-              <a:spcAft>
-                <a:spcPts val="0"/>
-              </a:spcAft>
-              <a:buSzPct val="80000"/>
-              <a:buChar char="▶"/>
-            </a:pPr>
-            <a:r>
-              <a:rPr lang="en-US" sz="2100" b="1">
-                <a:solidFill>
-                  <a:schemeClr val="dk1"/>
-                </a:solidFill>
-              </a:rPr>
-              <a:t>They start and end with ```</a:t>
-            </a:r>
-            <a:endParaRPr/>
-          </a:p>
-          <a:p>
-            <a:pPr marL="214313" indent="-214313">
-              <a:spcBef>
-                <a:spcPts val="839"/>
-              </a:spcBef>
-              <a:spcAft>
-                <a:spcPts val="0"/>
-              </a:spcAft>
-              <a:buSzPct val="80000"/>
-              <a:buChar char="▶"/>
-            </a:pPr>
-            <a:r>
-              <a:rPr lang="en-US" sz="2100" b="1">
-                <a:solidFill>
-                  <a:schemeClr val="dk1"/>
-                </a:solidFill>
-              </a:rPr>
-              <a:t>This sets up SAS in this code chunk.  It tells R to use SAS, and where SAS is.</a:t>
-            </a:r>
-            <a:endParaRPr/>
-          </a:p>
-          <a:p>
-            <a:pPr marL="214313" indent="-214313">
-              <a:spcBef>
-                <a:spcPts val="866"/>
-              </a:spcBef>
-              <a:spcAft>
-                <a:spcPts val="0"/>
-              </a:spcAft>
-              <a:buSzPct val="80000"/>
-              <a:buChar char="▶"/>
-            </a:pPr>
-            <a:r>
-              <a:rPr lang="en-US" sz="2250" b="1">
-                <a:solidFill>
-                  <a:schemeClr val="dk1"/>
-                </a:solidFill>
-              </a:rPr>
-              <a:t>This applies *only* to this chunk.</a:t>
-            </a:r>
-            <a:endParaRPr sz="2100" b="1">
+            <a:pPr>
+              <a:spcBef>
+                <a:spcPts val="0"/>
+              </a:spcBef>
+              <a:spcAft>
+                <a:spcPts val="0"/>
+              </a:spcAft>
+              <a:buSzPts val="1600"/>
+            </a:pPr>
+            <a:r>
+              <a:rPr lang="en-US" sz="2400" b="1" dirty="0">
+                <a:solidFill>
+                  <a:schemeClr val="dk1"/>
+                </a:solidFill>
+              </a:rPr>
+              <a:t>SAS/IML(R) 9.3 User's Guide ‘The RLANG System Option’ </a:t>
+            </a:r>
+            <a:r>
+              <a:rPr lang="en-US" sz="2400" u="sng" dirty="0">
+                <a:solidFill>
+                  <a:schemeClr val="dk1"/>
+                </a:solidFill>
+                <a:hlinkClick r:id="rId3">
+                  <a:extLst>
+                    <a:ext uri="{A12FA001-AC4F-418D-AE19-62706E023703}">
+                      <ahyp:hlinkClr xmlns:ahyp="http://schemas.microsoft.com/office/drawing/2018/hyperlinkcolor" val="tx"/>
+                    </a:ext>
+                  </a:extLst>
+                </a:hlinkClick>
+              </a:rPr>
+              <a:t>http://support.sas.com/documentation/cdl/en/imlug/64248/HTML/default/viewer.htm#imlug_r_sect003.htm</a:t>
+            </a:r>
+            <a:endParaRPr lang="en-US" sz="2400" u="sng" dirty="0">
               <a:solidFill>
                 <a:schemeClr val="dk1"/>
               </a:solidFill>
             </a:endParaRPr>
           </a:p>
           <a:p>
-            <a:pPr marL="214313" indent="-115634">
-              <a:spcBef>
-                <a:spcPts val="839"/>
-              </a:spcBef>
-              <a:spcAft>
-                <a:spcPts val="0"/>
-              </a:spcAft>
-              <a:buSzPct val="80000"/>
-              <a:buNone/>
-            </a:pPr>
-            <a:endParaRPr sz="2100" b="1">
+            <a:pPr>
+              <a:spcBef>
+                <a:spcPts val="0"/>
+              </a:spcBef>
+              <a:spcAft>
+                <a:spcPts val="0"/>
+              </a:spcAft>
+              <a:buSzPts val="1600"/>
+            </a:pPr>
+            <a:endParaRPr sz="2400" dirty="0">
               <a:solidFill>
                 <a:schemeClr val="dk1"/>
               </a:solidFill>
             </a:endParaRPr>
           </a:p>
+          <a:p>
+            <a:pPr>
+              <a:spcBef>
+                <a:spcPts val="750"/>
+              </a:spcBef>
+              <a:spcAft>
+                <a:spcPts val="0"/>
+              </a:spcAft>
+              <a:buSzPts val="1600"/>
+            </a:pPr>
+            <a:r>
+              <a:rPr lang="en-US" sz="2400" b="1" dirty="0">
+                <a:solidFill>
+                  <a:schemeClr val="dk1"/>
+                </a:solidFill>
+              </a:rPr>
+              <a:t>SAS/IML(R) 9.3 User's </a:t>
+            </a:r>
+            <a:r>
+              <a:rPr lang="en-US" sz="2400" b="1" dirty="0" err="1">
+                <a:solidFill>
+                  <a:schemeClr val="dk1"/>
+                </a:solidFill>
+              </a:rPr>
+              <a:t>Guide‘Submit</a:t>
+            </a:r>
+            <a:r>
+              <a:rPr lang="en-US" sz="2400" b="1" dirty="0">
+                <a:solidFill>
+                  <a:schemeClr val="dk1"/>
+                </a:solidFill>
+              </a:rPr>
+              <a:t> R Statements’ </a:t>
+            </a:r>
+            <a:r>
+              <a:rPr lang="en-US" sz="2400" u="sng" dirty="0">
+                <a:solidFill>
+                  <a:schemeClr val="dk1"/>
+                </a:solidFill>
+                <a:hlinkClick r:id="rId4">
+                  <a:extLst>
+                    <a:ext uri="{A12FA001-AC4F-418D-AE19-62706E023703}">
+                      <ahyp:hlinkClr xmlns:ahyp="http://schemas.microsoft.com/office/drawing/2018/hyperlinkcolor" val="tx"/>
+                    </a:ext>
+                  </a:extLst>
+                </a:hlinkClick>
+              </a:rPr>
+              <a:t>http://support.sas.com/documentation/cdl/en/imlug/64248/HTML/default/viewer.htm#imlug_r_sect004.htm</a:t>
+            </a:r>
+            <a:endParaRPr sz="2400" b="1" dirty="0">
+              <a:solidFill>
+                <a:schemeClr val="dk1"/>
+              </a:solidFill>
+            </a:endParaRPr>
+          </a:p>
+          <a:p>
+            <a:pPr marL="533400" indent="-457200">
+              <a:spcBef>
+                <a:spcPts val="750"/>
+              </a:spcBef>
+              <a:spcAft>
+                <a:spcPts val="0"/>
+              </a:spcAft>
+              <a:buSzPts val="1600"/>
+            </a:pPr>
+            <a:endParaRPr sz="2400" b="1" dirty="0">
+              <a:solidFill>
+                <a:schemeClr val="dk1"/>
+              </a:solidFill>
+            </a:endParaRPr>
+          </a:p>
         </p:txBody>
       </p:sp>
-      <p:cxnSp>
-        <p:nvCxnSpPr>
-          <p:cNvPr id="290" name="Google Shape;290;p25"/>
-          <p:cNvCxnSpPr/>
-          <p:nvPr/>
-        </p:nvCxnSpPr>
-        <p:spPr>
-          <a:xfrm rot="10800000" flipH="1">
-            <a:off x="2821329" y="3078307"/>
-            <a:ext cx="942778" cy="1121135"/>
-          </a:xfrm>
-          <a:prstGeom prst="straightConnector1">
-            <a:avLst/>
-          </a:prstGeom>
-          <a:noFill/>
-          <a:ln w="63500" cap="flat" cmpd="sng">
-            <a:solidFill>
-              <a:srgbClr val="FF0000">
-                <a:alpha val="60000"/>
-              </a:srgbClr>
-            </a:solidFill>
-            <a:prstDash val="solid"/>
-            <a:round/>
-            <a:headEnd type="none" w="sm" len="sm"/>
-            <a:tailEnd type="triangle" w="med" len="med"/>
-          </a:ln>
-        </p:spPr>
-      </p:cxnSp>
     </p:spTree>
-    <p:extLst>
-      <p:ext uri="{BB962C8B-B14F-4D97-AF65-F5344CB8AC3E}">
-        <p14:creationId xmlns:p14="http://schemas.microsoft.com/office/powerpoint/2010/main" val="3392076918"/>
-      </p:ext>
-    </p:extLst>
   </p:cSld>
   <p:clrMapOvr>
     <a:masterClrMapping/>
@@ -20592,12 +20282,12 @@
 </p:sld>
 </file>
 
-<file path=ppt/slides/slide46.xml><?xml version="1.0" encoding="utf-8"?>
+<file path=ppt/slides/slide48.xml><?xml version="1.0" encoding="utf-8"?>
 <p:sld xmlns:a="http://schemas.openxmlformats.org/drawingml/2006/main" xmlns:r="http://schemas.openxmlformats.org/officeDocument/2006/relationships" xmlns:p="http://schemas.openxmlformats.org/presentationml/2006/main">
   <p:cSld>
     <p:spTree>
       <p:nvGrpSpPr>
-        <p:cNvPr id="1" name="Shape 294"/>
+        <p:cNvPr id="1" name="Shape 332"/>
         <p:cNvGrpSpPr/>
         <p:nvPr/>
       </p:nvGrpSpPr>
@@ -20609,36 +20299,9 @@
           <a:chExt cx="0" cy="0"/>
         </a:xfrm>
       </p:grpSpPr>
-      <p:pic>
-        <p:nvPicPr>
-          <p:cNvPr id="295" name="Google Shape;295;p26"/>
-          <p:cNvPicPr preferRelativeResize="0"/>
-          <p:nvPr/>
-        </p:nvPicPr>
-        <p:blipFill rotWithShape="1">
-          <a:blip r:embed="rId3">
-            <a:alphaModFix/>
-          </a:blip>
-          <a:srcRect r="40171" b="26061"/>
-          <a:stretch/>
-        </p:blipFill>
-        <p:spPr>
-          <a:xfrm>
-            <a:off x="3400358" y="1877168"/>
-            <a:ext cx="5470814" cy="3803073"/>
-          </a:xfrm>
-          <a:prstGeom prst="rect">
-            <a:avLst/>
-          </a:prstGeom>
-          <a:noFill/>
-          <a:ln>
-            <a:noFill/>
-          </a:ln>
-        </p:spPr>
-      </p:pic>
-      <p:sp>
-        <p:nvSpPr>
-          <p:cNvPr id="296" name="Google Shape;296;p26"/>
+      <p:sp>
+        <p:nvSpPr>
+          <p:cNvPr id="333" name="Google Shape;333;p31"/>
           <p:cNvSpPr txBox="1">
             <a:spLocks noGrp="1"/>
           </p:cNvSpPr>
@@ -20665,7 +20328,7 @@
           </a:bodyPr>
           <a:lstStyle/>
           <a:p>
-            <a:pPr algn="ctr">
+            <a:pPr>
               <a:spcBef>
                 <a:spcPts val="0"/>
               </a:spcBef>
@@ -20678,16 +20341,16 @@
               <a:buSzPts val="3600"/>
             </a:pPr>
             <a:r>
-              <a:rPr lang="en-US" b="1"/>
-              <a:t>SETTING UP SAS IN A CODE CHUNK</a:t>
-            </a:r>
-            <a:endParaRPr b="1"/>
+              <a:rPr lang="en-US" sz="3600" b="1" dirty="0"/>
+              <a:t>Appendix A (con):</a:t>
+            </a:r>
+            <a:endParaRPr b="1" dirty="0"/>
           </a:p>
         </p:txBody>
       </p:sp>
       <p:sp>
         <p:nvSpPr>
-          <p:cNvPr id="297" name="Google Shape;297;p26"/>
+          <p:cNvPr id="334" name="Google Shape;334;p31"/>
           <p:cNvSpPr txBox="1">
             <a:spLocks noGrp="1"/>
           </p:cNvSpPr>
@@ -20697,8 +20360,8 @@
         </p:nvSpPr>
         <p:spPr>
           <a:xfrm>
-            <a:off x="348951" y="2008963"/>
-            <a:ext cx="2770920" cy="3423181"/>
+            <a:off x="603174" y="2675316"/>
+            <a:ext cx="7912177" cy="2858877"/>
           </a:xfrm>
           <a:prstGeom prst="rect">
             <a:avLst/>
@@ -20710,145 +20373,136 @@
         </p:spPr>
         <p:txBody>
           <a:bodyPr spcFirstLastPara="1" wrap="square" lIns="68569" tIns="34275" rIns="68569" bIns="34275" anchor="ctr" anchorCtr="0">
-            <a:normAutofit fontScale="92500" lnSpcReduction="10000"/>
+            <a:noAutofit/>
           </a:bodyPr>
           <a:lstStyle/>
           <a:p>
-            <a:pPr marL="214313" indent="-214313">
-              <a:spcBef>
-                <a:spcPts val="0"/>
-              </a:spcBef>
-              <a:spcAft>
-                <a:spcPts val="0"/>
-              </a:spcAft>
-              <a:buSzPct val="80000"/>
-              <a:buChar char="▶"/>
-            </a:pPr>
-            <a:r>
-              <a:rPr lang="en-US" sz="2100" b="1">
-                <a:solidFill>
-                  <a:schemeClr val="dk1"/>
-                </a:solidFill>
-              </a:rPr>
-              <a:t>Gray items are ‘code chunks’, where there is code to be executed.</a:t>
-            </a:r>
-            <a:endParaRPr/>
-          </a:p>
-          <a:p>
-            <a:pPr marL="214313" indent="-214313">
-              <a:spcBef>
-                <a:spcPts val="839"/>
-              </a:spcBef>
-              <a:spcAft>
-                <a:spcPts val="0"/>
-              </a:spcAft>
-              <a:buSzPct val="80000"/>
-              <a:buChar char="▶"/>
-            </a:pPr>
-            <a:r>
-              <a:rPr lang="en-US" sz="2100" b="1">
-                <a:solidFill>
-                  <a:schemeClr val="dk1"/>
-                </a:solidFill>
-              </a:rPr>
-              <a:t>They start and end with ```</a:t>
-            </a:r>
-            <a:endParaRPr/>
-          </a:p>
-          <a:p>
-            <a:pPr marL="214313" indent="-214313">
-              <a:spcBef>
-                <a:spcPts val="839"/>
-              </a:spcBef>
-              <a:spcAft>
-                <a:spcPts val="0"/>
-              </a:spcAft>
-              <a:buSzPct val="80000"/>
-              <a:buChar char="▶"/>
-            </a:pPr>
-            <a:r>
-              <a:rPr lang="en-US" sz="2100" b="1">
-                <a:solidFill>
-                  <a:schemeClr val="dk1"/>
-                </a:solidFill>
-              </a:rPr>
-              <a:t>This sets up SAS in this code chunk.  It tells R to use SAS, and where SAS is.</a:t>
-            </a:r>
-            <a:endParaRPr/>
-          </a:p>
-          <a:p>
-            <a:pPr marL="214313" indent="-214313">
-              <a:spcBef>
-                <a:spcPts val="866"/>
-              </a:spcBef>
-              <a:spcAft>
-                <a:spcPts val="0"/>
-              </a:spcAft>
-              <a:buSzPct val="80000"/>
-              <a:buChar char="▶"/>
-            </a:pPr>
-            <a:r>
-              <a:rPr lang="en-US" sz="2250" b="1">
-                <a:solidFill>
-                  <a:schemeClr val="dk1"/>
-                </a:solidFill>
-              </a:rPr>
-              <a:t>This applies *only* to this chunk.</a:t>
-            </a:r>
-            <a:endParaRPr sz="2100" b="1">
+            <a:pPr>
+              <a:spcBef>
+                <a:spcPts val="0"/>
+              </a:spcBef>
+              <a:spcAft>
+                <a:spcPts val="0"/>
+              </a:spcAft>
+              <a:buSzPts val="1600"/>
+            </a:pPr>
+            <a:r>
+              <a:rPr lang="en-US" sz="2400" b="1" dirty="0">
+                <a:solidFill>
+                  <a:schemeClr val="dk1"/>
+                </a:solidFill>
+              </a:rPr>
+              <a:t>SAS/IML(R) 12.1 User's Guide:  EXPORTDATASETTOR Call </a:t>
+            </a:r>
+            <a:r>
+              <a:rPr lang="en-US" sz="2400" u="sng" dirty="0">
+                <a:solidFill>
+                  <a:schemeClr val="dk1"/>
+                </a:solidFill>
+                <a:hlinkClick r:id="rId3">
+                  <a:extLst>
+                    <a:ext uri="{A12FA001-AC4F-418D-AE19-62706E023703}">
+                      <ahyp:hlinkClr xmlns:ahyp="http://schemas.microsoft.com/office/drawing/2018/hyperlinkcolor" val="tx"/>
+                    </a:ext>
+                  </a:extLst>
+                </a:hlinkClick>
+              </a:rPr>
+              <a:t>http://support.sas.com/documentation/cdl/en/imlug/65547/HTML/default/viewer.htm#imlug_langref_sect114.htm</a:t>
+            </a:r>
+            <a:endParaRPr lang="en-US" sz="2400" u="sng" dirty="0">
               <a:solidFill>
                 <a:schemeClr val="dk1"/>
               </a:solidFill>
             </a:endParaRPr>
           </a:p>
           <a:p>
-            <a:pPr marL="214313" indent="-115634">
-              <a:spcBef>
-                <a:spcPts val="839"/>
-              </a:spcBef>
-              <a:spcAft>
-                <a:spcPts val="0"/>
-              </a:spcAft>
-              <a:buSzPct val="80000"/>
-              <a:buNone/>
-            </a:pPr>
-            <a:endParaRPr sz="2100" b="1">
+            <a:pPr>
+              <a:spcBef>
+                <a:spcPts val="0"/>
+              </a:spcBef>
+              <a:spcAft>
+                <a:spcPts val="0"/>
+              </a:spcAft>
+              <a:buSzPts val="1600"/>
+            </a:pPr>
+            <a:endParaRPr sz="2400" dirty="0">
               <a:solidFill>
                 <a:schemeClr val="dk1"/>
               </a:solidFill>
             </a:endParaRPr>
           </a:p>
+          <a:p>
+            <a:pPr>
+              <a:spcBef>
+                <a:spcPts val="750"/>
+              </a:spcBef>
+              <a:spcAft>
+                <a:spcPts val="0"/>
+              </a:spcAft>
+              <a:buSzPts val="1600"/>
+            </a:pPr>
+            <a:r>
+              <a:rPr lang="en-US" sz="2400" b="1" dirty="0">
+                <a:solidFill>
+                  <a:schemeClr val="dk1"/>
+                </a:solidFill>
+              </a:rPr>
+              <a:t>SAS/IML(R) 12.1 User's Guide: IMPORTDATASETFROMR Call </a:t>
+            </a:r>
+            <a:r>
+              <a:rPr lang="en-US" sz="2400" dirty="0">
+                <a:solidFill>
+                  <a:schemeClr val="dk1"/>
+                </a:solidFill>
+              </a:rPr>
+              <a:t>http://support.sas.com/documentation/cdl/en/imlug/65547/HTML/default/viewer.htm#imlug_langref_sect182.htm</a:t>
+            </a:r>
+            <a:endParaRPr sz="2400" dirty="0">
+              <a:solidFill>
+                <a:schemeClr val="dk1"/>
+              </a:solidFill>
+            </a:endParaRPr>
+          </a:p>
+          <a:p>
+            <a:pPr marL="533400" indent="-457200">
+              <a:spcBef>
+                <a:spcPts val="750"/>
+              </a:spcBef>
+              <a:spcAft>
+                <a:spcPts val="0"/>
+              </a:spcAft>
+              <a:buSzPts val="1600"/>
+            </a:pPr>
+            <a:endParaRPr sz="2400" b="1" dirty="0">
+              <a:solidFill>
+                <a:schemeClr val="dk1"/>
+              </a:solidFill>
+            </a:endParaRPr>
+          </a:p>
+          <a:p>
+            <a:pPr marL="533400" indent="-457200">
+              <a:spcBef>
+                <a:spcPts val="750"/>
+              </a:spcBef>
+              <a:spcAft>
+                <a:spcPts val="0"/>
+              </a:spcAft>
+              <a:buSzPts val="1600"/>
+            </a:pPr>
+            <a:endParaRPr sz="2400" b="1" dirty="0">
+              <a:solidFill>
+                <a:schemeClr val="dk1"/>
+              </a:solidFill>
+            </a:endParaRPr>
+          </a:p>
         </p:txBody>
       </p:sp>
-      <p:cxnSp>
-        <p:nvCxnSpPr>
-          <p:cNvPr id="298" name="Google Shape;298;p26"/>
-          <p:cNvCxnSpPr/>
-          <p:nvPr/>
-        </p:nvCxnSpPr>
-        <p:spPr>
-          <a:xfrm rot="10800000" flipH="1">
-            <a:off x="2821329" y="3078307"/>
-            <a:ext cx="942778" cy="1121135"/>
-          </a:xfrm>
-          <a:prstGeom prst="straightConnector1">
-            <a:avLst/>
-          </a:prstGeom>
-          <a:noFill/>
-          <a:ln w="63500" cap="flat" cmpd="sng">
-            <a:solidFill>
-              <a:srgbClr val="FF0000">
-                <a:alpha val="60000"/>
-              </a:srgbClr>
-            </a:solidFill>
-            <a:prstDash val="solid"/>
-            <a:round/>
-            <a:headEnd type="none" w="sm" len="sm"/>
-            <a:tailEnd type="triangle" w="med" len="med"/>
-          </a:ln>
-        </p:spPr>
-      </p:cxnSp>
     </p:spTree>
+    <p:extLst>
+      <p:ext uri="{BB962C8B-B14F-4D97-AF65-F5344CB8AC3E}">
+        <p14:creationId xmlns:p14="http://schemas.microsoft.com/office/powerpoint/2010/main" val="2958874926"/>
+      </p:ext>
+    </p:extLst>
   </p:cSld>
   <p:clrMapOvr>
     <a:masterClrMapping/>
@@ -20856,12 +20510,12 @@
 </p:sld>
 </file>
 
-<file path=ppt/slides/slide47.xml><?xml version="1.0" encoding="utf-8"?>
+<file path=ppt/slides/slide49.xml><?xml version="1.0" encoding="utf-8"?>
 <p:sld xmlns:a="http://schemas.openxmlformats.org/drawingml/2006/main" xmlns:r="http://schemas.openxmlformats.org/officeDocument/2006/relationships" xmlns:p="http://schemas.openxmlformats.org/presentationml/2006/main">
   <p:cSld>
     <p:spTree>
       <p:nvGrpSpPr>
-        <p:cNvPr id="1" name="Shape 302"/>
+        <p:cNvPr id="1" name="Shape 338"/>
         <p:cNvGrpSpPr/>
         <p:nvPr/>
       </p:nvGrpSpPr>
@@ -20873,36 +20527,9 @@
           <a:chExt cx="0" cy="0"/>
         </a:xfrm>
       </p:grpSpPr>
-      <p:pic>
-        <p:nvPicPr>
-          <p:cNvPr id="303" name="Google Shape;303;p27"/>
-          <p:cNvPicPr preferRelativeResize="0"/>
-          <p:nvPr/>
-        </p:nvPicPr>
-        <p:blipFill rotWithShape="1">
-          <a:blip r:embed="rId3">
-            <a:alphaModFix/>
-          </a:blip>
-          <a:srcRect l="15442" t="3038" r="32788" b="4024"/>
-          <a:stretch/>
-        </p:blipFill>
-        <p:spPr>
-          <a:xfrm>
-            <a:off x="4021464" y="1138180"/>
-            <a:ext cx="4733844" cy="4780301"/>
-          </a:xfrm>
-          <a:prstGeom prst="rect">
-            <a:avLst/>
-          </a:prstGeom>
-          <a:noFill/>
-          <a:ln>
-            <a:noFill/>
-          </a:ln>
-        </p:spPr>
-      </p:pic>
-      <p:sp>
-        <p:nvSpPr>
-          <p:cNvPr id="304" name="Google Shape;304;p27"/>
+      <p:sp>
+        <p:nvSpPr>
+          <p:cNvPr id="339" name="Google Shape;339;p32"/>
           <p:cNvSpPr txBox="1">
             <a:spLocks noGrp="1"/>
           </p:cNvSpPr>
@@ -20942,16 +20569,16 @@
               <a:buSzPts val="3600"/>
             </a:pPr>
             <a:r>
-              <a:rPr lang="en-US" b="1"/>
-              <a:t>RUNNING SAS</a:t>
-            </a:r>
-            <a:endParaRPr b="1"/>
+              <a:rPr lang="en-US" sz="3600" b="1" dirty="0"/>
+              <a:t>Appendix A (con):</a:t>
+            </a:r>
+            <a:endParaRPr b="1" dirty="0"/>
           </a:p>
         </p:txBody>
       </p:sp>
       <p:sp>
         <p:nvSpPr>
-          <p:cNvPr id="305" name="Google Shape;305;p27"/>
+          <p:cNvPr id="340" name="Google Shape;340;p32"/>
           <p:cNvSpPr txBox="1">
             <a:spLocks noGrp="1"/>
           </p:cNvSpPr>
@@ -20961,8 +20588,8 @@
         </p:nvSpPr>
         <p:spPr>
           <a:xfrm>
-            <a:off x="187537" y="2034020"/>
-            <a:ext cx="2755688" cy="2858877"/>
+            <a:off x="694938" y="2503582"/>
+            <a:ext cx="7534662" cy="3663041"/>
           </a:xfrm>
           <a:prstGeom prst="rect">
             <a:avLst/>
@@ -20974,465 +20601,157 @@
         </p:spPr>
         <p:txBody>
           <a:bodyPr spcFirstLastPara="1" wrap="square" lIns="68569" tIns="34275" rIns="68569" bIns="34275" anchor="ctr" anchorCtr="0">
-            <a:noAutofit/>
+            <a:normAutofit/>
           </a:bodyPr>
           <a:lstStyle/>
           <a:p>
-            <a:pPr marL="214313" indent="-214313">
-              <a:spcBef>
-                <a:spcPts val="0"/>
-              </a:spcBef>
-              <a:spcAft>
-                <a:spcPts val="0"/>
-              </a:spcAft>
-              <a:buSzPts val="2240"/>
-              <a:buChar char="▶"/>
-            </a:pPr>
-            <a:r>
-              <a:rPr lang="en-US" sz="2100" b="1">
-                <a:solidFill>
-                  <a:schemeClr val="dk1"/>
-                </a:solidFill>
-              </a:rPr>
-              <a:t>Once the set up has been done  SAS commands can be done in one chunk, with r commands in another.</a:t>
-            </a:r>
-            <a:endParaRPr sz="2100" b="1">
+            <a:pPr marL="0" indent="0">
+              <a:spcBef>
+                <a:spcPts val="0"/>
+              </a:spcBef>
+              <a:spcAft>
+                <a:spcPts val="0"/>
+              </a:spcAft>
+              <a:buSzPts val="1600"/>
+              <a:buNone/>
+            </a:pPr>
+            <a:r>
+              <a:rPr lang="en-US" sz="2400" dirty="0">
+                <a:solidFill>
+                  <a:schemeClr val="dk1"/>
+                </a:solidFill>
+              </a:rPr>
+              <a:t>‘</a:t>
+            </a:r>
+            <a:r>
+              <a:rPr lang="en-US" sz="2400" b="1" dirty="0">
+                <a:solidFill>
+                  <a:schemeClr val="dk1"/>
+                </a:solidFill>
+              </a:rPr>
+              <a:t>Run R code inside SAS easily’ SAS/IML(R) 9.3 User's Guide </a:t>
+            </a:r>
+            <a:r>
+              <a:rPr lang="en-US" sz="2400" dirty="0">
+                <a:solidFill>
+                  <a:schemeClr val="dk1"/>
+                </a:solidFill>
+              </a:rPr>
+              <a:t>‘</a:t>
+            </a:r>
+            <a:r>
+              <a:rPr lang="en-US" sz="2400" b="1" dirty="0">
+                <a:solidFill>
+                  <a:schemeClr val="dk1"/>
+                </a:solidFill>
+              </a:rPr>
+              <a:t>EXPORTDATASETTOR Call’ </a:t>
+            </a:r>
+            <a:r>
+              <a:rPr lang="en-US" sz="2400" u="sng" dirty="0">
+                <a:solidFill>
+                  <a:schemeClr val="dk1"/>
+                </a:solidFill>
+                <a:hlinkClick r:id="rId3">
+                  <a:extLst>
+                    <a:ext uri="{A12FA001-AC4F-418D-AE19-62706E023703}">
+                      <ahyp:hlinkClr xmlns:ahyp="http://schemas.microsoft.com/office/drawing/2018/hyperlinkcolor" val="tx"/>
+                    </a:ext>
+                  </a:extLst>
+                </a:hlinkClick>
+              </a:rPr>
+              <a:t>http://support.sas.com/documentation/cdl/en/imlug/65547/HTML/default/viewer.htm#imlug_langref_sect114.htm</a:t>
+            </a:r>
+            <a:endParaRPr sz="2400" dirty="0">
               <a:solidFill>
                 <a:schemeClr val="dk1"/>
               </a:solidFill>
             </a:endParaRPr>
           </a:p>
-        </p:txBody>
-      </p:sp>
-      <p:cxnSp>
-        <p:nvCxnSpPr>
-          <p:cNvPr id="306" name="Google Shape;306;p27"/>
-          <p:cNvCxnSpPr/>
-          <p:nvPr/>
-        </p:nvCxnSpPr>
-        <p:spPr>
-          <a:xfrm rot="10800000" flipH="1">
-            <a:off x="2591815" y="2125266"/>
-            <a:ext cx="1361918" cy="1067341"/>
-          </a:xfrm>
-          <a:prstGeom prst="straightConnector1">
-            <a:avLst/>
-          </a:prstGeom>
-          <a:noFill/>
-          <a:ln w="63500" cap="flat" cmpd="sng">
-            <a:solidFill>
-              <a:srgbClr val="FF0000">
-                <a:alpha val="60000"/>
-              </a:srgbClr>
-            </a:solidFill>
-            <a:prstDash val="solid"/>
-            <a:round/>
-            <a:headEnd type="none" w="sm" len="sm"/>
-            <a:tailEnd type="triangle" w="med" len="med"/>
-          </a:ln>
-        </p:spPr>
-      </p:cxnSp>
-      <p:cxnSp>
-        <p:nvCxnSpPr>
-          <p:cNvPr id="307" name="Google Shape;307;p27"/>
-          <p:cNvCxnSpPr/>
-          <p:nvPr/>
-        </p:nvCxnSpPr>
-        <p:spPr>
-          <a:xfrm rot="10800000" flipH="1">
-            <a:off x="2505702" y="3016995"/>
-            <a:ext cx="1953286" cy="1162698"/>
-          </a:xfrm>
-          <a:prstGeom prst="straightConnector1">
-            <a:avLst/>
-          </a:prstGeom>
-          <a:noFill/>
-          <a:ln w="63500" cap="flat" cmpd="sng">
-            <a:solidFill>
-              <a:srgbClr val="FF0000">
-                <a:alpha val="60000"/>
-              </a:srgbClr>
-            </a:solidFill>
-            <a:prstDash val="solid"/>
-            <a:round/>
-            <a:headEnd type="none" w="sm" len="sm"/>
-            <a:tailEnd type="triangle" w="med" len="med"/>
-          </a:ln>
-        </p:spPr>
-      </p:cxnSp>
-    </p:spTree>
-    <p:extLst>
-      <p:ext uri="{BB962C8B-B14F-4D97-AF65-F5344CB8AC3E}">
-        <p14:creationId xmlns:p14="http://schemas.microsoft.com/office/powerpoint/2010/main" val="2539329128"/>
-      </p:ext>
-    </p:extLst>
-  </p:cSld>
-  <p:clrMapOvr>
-    <a:masterClrMapping/>
-  </p:clrMapOvr>
-</p:sld>
-</file>
-
-<file path=ppt/slides/slide48.xml><?xml version="1.0" encoding="utf-8"?>
-<p:sld xmlns:a="http://schemas.openxmlformats.org/drawingml/2006/main" xmlns:r="http://schemas.openxmlformats.org/officeDocument/2006/relationships" xmlns:p="http://schemas.openxmlformats.org/presentationml/2006/main">
-  <p:cSld>
-    <p:spTree>
-      <p:nvGrpSpPr>
-        <p:cNvPr id="1" name="Shape 311"/>
-        <p:cNvGrpSpPr/>
-        <p:nvPr/>
-      </p:nvGrpSpPr>
-      <p:grpSpPr>
-        <a:xfrm>
-          <a:off x="0" y="0"/>
-          <a:ext cx="0" cy="0"/>
-          <a:chOff x="0" y="0"/>
-          <a:chExt cx="0" cy="0"/>
-        </a:xfrm>
-      </p:grpSpPr>
-      <p:sp>
-        <p:nvSpPr>
-          <p:cNvPr id="312" name="Google Shape;312;p28"/>
-          <p:cNvSpPr txBox="1">
-            <a:spLocks noGrp="1"/>
-          </p:cNvSpPr>
-          <p:nvPr>
-            <p:ph type="title"/>
-          </p:nvPr>
-        </p:nvSpPr>
-        <p:spPr>
-          <a:xfrm>
-            <a:off x="603174" y="1138180"/>
-            <a:ext cx="7912177" cy="987086"/>
-          </a:xfrm>
-          <a:prstGeom prst="rect">
-            <a:avLst/>
-          </a:prstGeom>
-          <a:noFill/>
-          <a:ln>
-            <a:noFill/>
-          </a:ln>
-        </p:spPr>
-        <p:txBody>
-          <a:bodyPr spcFirstLastPara="1" wrap="square" lIns="68569" tIns="34275" rIns="68569" bIns="34275" anchor="ctr" anchorCtr="0">
-            <a:normAutofit fontScale="90000"/>
-          </a:bodyPr>
-          <a:lstStyle/>
-          <a:p>
-            <a:pPr algn="ctr">
-              <a:spcBef>
-                <a:spcPts val="0"/>
-              </a:spcBef>
-              <a:spcAft>
-                <a:spcPts val="0"/>
-              </a:spcAft>
-              <a:buClr>
-                <a:schemeClr val="lt1"/>
-              </a:buClr>
-              <a:buSzPts val="3600"/>
-            </a:pPr>
-            <a:r>
-              <a:rPr lang="en-US" b="1"/>
-              <a:t>IMPORTANT NOTE ON THE SETUP CHUNK</a:t>
-            </a:r>
-            <a:endParaRPr b="1"/>
-          </a:p>
-        </p:txBody>
-      </p:sp>
-      <p:sp>
-        <p:nvSpPr>
-          <p:cNvPr id="313" name="Google Shape;313;p28"/>
-          <p:cNvSpPr txBox="1">
-            <a:spLocks noGrp="1"/>
-          </p:cNvSpPr>
-          <p:nvPr>
-            <p:ph type="body" idx="1"/>
-          </p:nvPr>
-        </p:nvSpPr>
-        <p:spPr>
-          <a:xfrm>
-            <a:off x="187537" y="2034020"/>
-            <a:ext cx="2755688" cy="2858877"/>
-          </a:xfrm>
-          <a:prstGeom prst="rect">
-            <a:avLst/>
-          </a:prstGeom>
-          <a:noFill/>
-          <a:ln>
-            <a:noFill/>
-          </a:ln>
-        </p:spPr>
-        <p:txBody>
-          <a:bodyPr spcFirstLastPara="1" wrap="square" lIns="68569" tIns="34275" rIns="68569" bIns="34275" anchor="ctr" anchorCtr="0">
-            <a:noAutofit/>
-          </a:bodyPr>
-          <a:lstStyle/>
-          <a:p>
-            <a:pPr marL="214313" indent="-214313">
-              <a:spcBef>
-                <a:spcPts val="0"/>
-              </a:spcBef>
-              <a:spcAft>
-                <a:spcPts val="0"/>
-              </a:spcAft>
-              <a:buSzPts val="2240"/>
-              <a:buChar char="▶"/>
-            </a:pPr>
-            <a:r>
-              <a:rPr lang="en-US" sz="2100" b="1">
-                <a:solidFill>
-                  <a:schemeClr val="dk1"/>
-                </a:solidFill>
-              </a:rPr>
-              <a:t>Setting the SAS option in the setup code chunk will cause knitr means to run *all* code chunks in the document with SAS.  </a:t>
-            </a:r>
-            <a:endParaRPr sz="2100" b="1">
+          <a:p>
+            <a:pPr marL="0" indent="0">
+              <a:spcBef>
+                <a:spcPts val="750"/>
+              </a:spcBef>
+              <a:spcAft>
+                <a:spcPts val="0"/>
+              </a:spcAft>
+              <a:buSzPts val="1600"/>
+              <a:buNone/>
+            </a:pPr>
+            <a:r>
+              <a:rPr lang="en-US" sz="2400" b="1" dirty="0">
+                <a:solidFill>
+                  <a:schemeClr val="dk1"/>
+                </a:solidFill>
+              </a:rPr>
+              <a:t>SAS Blogs:  Video: Calling R from the SAS/IML Language</a:t>
+            </a:r>
+            <a:r>
+              <a:rPr lang="en-US" sz="2400" dirty="0">
+                <a:solidFill>
+                  <a:schemeClr val="dk1"/>
+                </a:solidFill>
+              </a:rPr>
+              <a:t> </a:t>
+            </a:r>
+            <a:r>
+              <a:rPr lang="en-US" sz="2400" u="sng" dirty="0">
+                <a:solidFill>
+                  <a:schemeClr val="dk1"/>
+                </a:solidFill>
+                <a:hlinkClick r:id="rId4">
+                  <a:extLst>
+                    <a:ext uri="{A12FA001-AC4F-418D-AE19-62706E023703}">
+                      <ahyp:hlinkClr xmlns:ahyp="http://schemas.microsoft.com/office/drawing/2018/hyperlinkcolor" val="tx"/>
+                    </a:ext>
+                  </a:extLst>
+                </a:hlinkClick>
+              </a:rPr>
+              <a:t>https://blogs.sas.com/content/iml/2011/10/31/video-calling-r-from-the-sasiml-language.html</a:t>
+            </a:r>
+            <a:endParaRPr sz="2400" dirty="0">
               <a:solidFill>
                 <a:schemeClr val="dk1"/>
               </a:solidFill>
             </a:endParaRPr>
           </a:p>
-        </p:txBody>
-      </p:sp>
-      <p:pic>
-        <p:nvPicPr>
-          <p:cNvPr id="314" name="Google Shape;314;p28"/>
-          <p:cNvPicPr preferRelativeResize="0"/>
-          <p:nvPr/>
-        </p:nvPicPr>
-        <p:blipFill rotWithShape="1">
-          <a:blip r:embed="rId3">
-            <a:alphaModFix/>
-          </a:blip>
-          <a:srcRect l="16023" t="10908" r="20823" b="9394"/>
-          <a:stretch/>
-        </p:blipFill>
-        <p:spPr>
-          <a:xfrm>
-            <a:off x="3369252" y="1901535"/>
-            <a:ext cx="5774749" cy="4099215"/>
-          </a:xfrm>
-          <a:prstGeom prst="rect">
-            <a:avLst/>
-          </a:prstGeom>
-          <a:noFill/>
-          <a:ln>
-            <a:noFill/>
-          </a:ln>
-        </p:spPr>
-      </p:pic>
-      <p:cxnSp>
-        <p:nvCxnSpPr>
-          <p:cNvPr id="315" name="Google Shape;315;p28"/>
-          <p:cNvCxnSpPr/>
-          <p:nvPr/>
-        </p:nvCxnSpPr>
-        <p:spPr>
-          <a:xfrm>
-            <a:off x="2943225" y="3616037"/>
-            <a:ext cx="961159" cy="319520"/>
-          </a:xfrm>
-          <a:prstGeom prst="straightConnector1">
-            <a:avLst/>
-          </a:prstGeom>
-          <a:noFill/>
-          <a:ln w="63500" cap="flat" cmpd="sng">
-            <a:solidFill>
-              <a:srgbClr val="FF0000">
-                <a:alpha val="60000"/>
-              </a:srgbClr>
-            </a:solidFill>
-            <a:prstDash val="solid"/>
-            <a:round/>
-            <a:headEnd type="none" w="sm" len="sm"/>
-            <a:tailEnd type="triangle" w="med" len="med"/>
-          </a:ln>
-        </p:spPr>
-      </p:cxnSp>
-    </p:spTree>
-  </p:cSld>
-  <p:clrMapOvr>
-    <a:masterClrMapping/>
-  </p:clrMapOvr>
-</p:sld>
-</file>
-
-<file path=ppt/slides/slide49.xml><?xml version="1.0" encoding="utf-8"?>
-<p:sld xmlns:a="http://schemas.openxmlformats.org/drawingml/2006/main" xmlns:r="http://schemas.openxmlformats.org/officeDocument/2006/relationships" xmlns:p="http://schemas.openxmlformats.org/presentationml/2006/main">
-  <p:cSld>
-    <p:spTree>
-      <p:nvGrpSpPr>
-        <p:cNvPr id="1" name="Shape 319"/>
-        <p:cNvGrpSpPr/>
-        <p:nvPr/>
-      </p:nvGrpSpPr>
-      <p:grpSpPr>
-        <a:xfrm>
-          <a:off x="0" y="0"/>
-          <a:ext cx="0" cy="0"/>
-          <a:chOff x="0" y="0"/>
-          <a:chExt cx="0" cy="0"/>
-        </a:xfrm>
-      </p:grpSpPr>
-      <p:pic>
-        <p:nvPicPr>
-          <p:cNvPr id="320" name="Google Shape;320;p29"/>
-          <p:cNvPicPr preferRelativeResize="0"/>
-          <p:nvPr/>
-        </p:nvPicPr>
-        <p:blipFill rotWithShape="1">
-          <a:blip r:embed="rId3">
-            <a:alphaModFix/>
-          </a:blip>
-          <a:srcRect t="38636" r="37273" b="10606"/>
-          <a:stretch/>
-        </p:blipFill>
-        <p:spPr>
-          <a:xfrm>
-            <a:off x="3164033" y="2203723"/>
-            <a:ext cx="5735782" cy="2610716"/>
-          </a:xfrm>
-          <a:prstGeom prst="rect">
-            <a:avLst/>
-          </a:prstGeom>
-          <a:noFill/>
-          <a:ln>
-            <a:noFill/>
-          </a:ln>
-        </p:spPr>
-      </p:pic>
-      <p:sp>
-        <p:nvSpPr>
-          <p:cNvPr id="321" name="Google Shape;321;p29"/>
-          <p:cNvSpPr txBox="1">
-            <a:spLocks noGrp="1"/>
-          </p:cNvSpPr>
-          <p:nvPr>
-            <p:ph type="title"/>
-          </p:nvPr>
-        </p:nvSpPr>
-        <p:spPr>
-          <a:xfrm>
-            <a:off x="603174" y="1138180"/>
-            <a:ext cx="7912177" cy="987086"/>
-          </a:xfrm>
-          <a:prstGeom prst="rect">
-            <a:avLst/>
-          </a:prstGeom>
-          <a:noFill/>
-          <a:ln>
-            <a:noFill/>
-          </a:ln>
-        </p:spPr>
-        <p:txBody>
-          <a:bodyPr spcFirstLastPara="1" wrap="square" lIns="68569" tIns="34275" rIns="68569" bIns="34275" anchor="ctr" anchorCtr="0">
-            <a:normAutofit fontScale="90000"/>
-          </a:bodyPr>
-          <a:lstStyle/>
-          <a:p>
-            <a:pPr algn="ctr">
-              <a:spcBef>
-                <a:spcPts val="0"/>
-              </a:spcBef>
-              <a:spcAft>
-                <a:spcPts val="0"/>
-              </a:spcAft>
-              <a:buClr>
-                <a:schemeClr val="lt1"/>
-              </a:buClr>
-              <a:buSzPts val="3600"/>
-            </a:pPr>
-            <a:r>
-              <a:rPr lang="en-US" b="1"/>
-              <a:t>IMPORTANT NOTE ON THE SETUP CHUNK</a:t>
-            </a:r>
-            <a:endParaRPr b="1"/>
-          </a:p>
-        </p:txBody>
-      </p:sp>
-      <p:sp>
-        <p:nvSpPr>
-          <p:cNvPr id="322" name="Google Shape;322;p29"/>
-          <p:cNvSpPr txBox="1">
-            <a:spLocks noGrp="1"/>
-          </p:cNvSpPr>
-          <p:nvPr>
-            <p:ph type="body" idx="1"/>
-          </p:nvPr>
-        </p:nvSpPr>
-        <p:spPr>
-          <a:xfrm>
-            <a:off x="187537" y="2034020"/>
-            <a:ext cx="2755688" cy="2858877"/>
-          </a:xfrm>
-          <a:prstGeom prst="rect">
-            <a:avLst/>
-          </a:prstGeom>
-          <a:noFill/>
-          <a:ln>
-            <a:noFill/>
-          </a:ln>
-        </p:spPr>
-        <p:txBody>
-          <a:bodyPr spcFirstLastPara="1" wrap="square" lIns="68569" tIns="34275" rIns="68569" bIns="34275" anchor="ctr" anchorCtr="0">
-            <a:noAutofit/>
-          </a:bodyPr>
-          <a:lstStyle/>
-          <a:p>
-            <a:pPr marL="214313" indent="-214313">
-              <a:spcBef>
-                <a:spcPts val="0"/>
-              </a:spcBef>
-              <a:spcAft>
-                <a:spcPts val="0"/>
-              </a:spcAft>
-              <a:buSzPts val="2240"/>
-              <a:buChar char="▶"/>
-            </a:pPr>
-            <a:r>
-              <a:rPr lang="en-US" sz="2100" b="1">
-                <a:solidFill>
-                  <a:schemeClr val="dk1"/>
-                </a:solidFill>
-              </a:rPr>
-              <a:t>Setting the SAS option in the setup code chunk will cause knitr means to run *all* code chunks in the document with SAS.  </a:t>
-            </a:r>
-            <a:endParaRPr sz="2100" b="1">
+          <a:p>
+            <a:pPr marL="76200" indent="0">
+              <a:spcBef>
+                <a:spcPts val="750"/>
+              </a:spcBef>
+              <a:spcAft>
+                <a:spcPts val="0"/>
+              </a:spcAft>
+              <a:buSzPts val="1600"/>
+              <a:buNone/>
+            </a:pPr>
+            <a:endParaRPr sz="2400" b="1" dirty="0">
               <a:solidFill>
                 <a:schemeClr val="dk1"/>
               </a:solidFill>
             </a:endParaRPr>
           </a:p>
+          <a:p>
+            <a:pPr marL="76200" indent="0">
+              <a:spcBef>
+                <a:spcPts val="750"/>
+              </a:spcBef>
+              <a:spcAft>
+                <a:spcPts val="0"/>
+              </a:spcAft>
+              <a:buSzPts val="1600"/>
+              <a:buNone/>
+            </a:pPr>
+            <a:endParaRPr sz="2400" b="1" dirty="0">
+              <a:solidFill>
+                <a:schemeClr val="dk1"/>
+              </a:solidFill>
+            </a:endParaRPr>
+          </a:p>
         </p:txBody>
       </p:sp>
-      <p:cxnSp>
-        <p:nvCxnSpPr>
-          <p:cNvPr id="323" name="Google Shape;323;p29"/>
-          <p:cNvCxnSpPr/>
-          <p:nvPr/>
-        </p:nvCxnSpPr>
-        <p:spPr>
-          <a:xfrm>
-            <a:off x="2462646" y="3904385"/>
-            <a:ext cx="961159" cy="319520"/>
-          </a:xfrm>
-          <a:prstGeom prst="straightConnector1">
-            <a:avLst/>
-          </a:prstGeom>
-          <a:noFill/>
-          <a:ln w="63500" cap="flat" cmpd="sng">
-            <a:solidFill>
-              <a:srgbClr val="FF0000">
-                <a:alpha val="60000"/>
-              </a:srgbClr>
-            </a:solidFill>
-            <a:prstDash val="solid"/>
-            <a:round/>
-            <a:headEnd type="none" w="sm" len="sm"/>
-            <a:tailEnd type="triangle" w="med" len="med"/>
-          </a:ln>
-        </p:spPr>
-      </p:cxnSp>
     </p:spTree>
   </p:cSld>
   <p:clrMapOvr>
@@ -21658,7 +20977,7 @@
   <p:cSld>
     <p:spTree>
       <p:nvGrpSpPr>
-        <p:cNvPr id="1" name=""/>
+        <p:cNvPr id="1" name="Shape 344"/>
         <p:cNvGrpSpPr/>
         <p:nvPr/>
       </p:nvGrpSpPr>
@@ -21672,174 +20991,7 @@
       </p:grpSpPr>
       <p:sp>
         <p:nvSpPr>
-          <p:cNvPr id="2" name="Title 1">
-            <a:extLst>
-              <a:ext uri="{FF2B5EF4-FFF2-40B4-BE49-F238E27FC236}">
-                <a16:creationId xmlns:a16="http://schemas.microsoft.com/office/drawing/2014/main" id="{BACFA4CB-7516-43BB-BB55-C3F8D5B840AF}"/>
-              </a:ext>
-            </a:extLst>
-          </p:cNvPr>
-          <p:cNvSpPr>
-            <a:spLocks noGrp="1"/>
-          </p:cNvSpPr>
-          <p:nvPr>
-            <p:ph type="title"/>
-          </p:nvPr>
-        </p:nvSpPr>
-        <p:spPr>
-          <a:xfrm>
-            <a:off x="564776" y="2998695"/>
-            <a:ext cx="8229600" cy="670422"/>
-          </a:xfrm>
-        </p:spPr>
-        <p:txBody>
-          <a:bodyPr>
-            <a:noAutofit/>
-          </a:bodyPr>
-          <a:lstStyle/>
-          <a:p>
-            <a:pPr algn="ctr"/>
-            <a:r>
-              <a:rPr lang="en-US" sz="4800" b="1" dirty="0"/>
-              <a:t>Questions?</a:t>
-            </a:r>
-          </a:p>
-        </p:txBody>
-      </p:sp>
-    </p:spTree>
-    <p:extLst>
-      <p:ext uri="{BB962C8B-B14F-4D97-AF65-F5344CB8AC3E}">
-        <p14:creationId xmlns:p14="http://schemas.microsoft.com/office/powerpoint/2010/main" val="1427623844"/>
-      </p:ext>
-    </p:extLst>
-  </p:cSld>
-  <p:clrMapOvr>
-    <a:masterClrMapping/>
-  </p:clrMapOvr>
-</p:sld>
-</file>
-
-<file path=ppt/slides/slide51.xml><?xml version="1.0" encoding="utf-8"?>
-<p:sld xmlns:a="http://schemas.openxmlformats.org/drawingml/2006/main" xmlns:r="http://schemas.openxmlformats.org/officeDocument/2006/relationships" xmlns:p="http://schemas.openxmlformats.org/presentationml/2006/main">
-  <p:cSld>
-    <p:spTree>
-      <p:nvGrpSpPr>
-        <p:cNvPr id="1" name=""/>
-        <p:cNvGrpSpPr/>
-        <p:nvPr/>
-      </p:nvGrpSpPr>
-      <p:grpSpPr>
-        <a:xfrm>
-          <a:off x="0" y="0"/>
-          <a:ext cx="0" cy="0"/>
-          <a:chOff x="0" y="0"/>
-          <a:chExt cx="0" cy="0"/>
-        </a:xfrm>
-      </p:grpSpPr>
-      <p:sp>
-        <p:nvSpPr>
-          <p:cNvPr id="2" name="Title 1">
-            <a:extLst>
-              <a:ext uri="{FF2B5EF4-FFF2-40B4-BE49-F238E27FC236}">
-                <a16:creationId xmlns:a16="http://schemas.microsoft.com/office/drawing/2014/main" id="{501EDBC2-55D6-41C8-9BCF-E43C5D0CAFB3}"/>
-              </a:ext>
-            </a:extLst>
-          </p:cNvPr>
-          <p:cNvSpPr>
-            <a:spLocks noGrp="1"/>
-          </p:cNvSpPr>
-          <p:nvPr>
-            <p:ph type="ctrTitle"/>
-          </p:nvPr>
-        </p:nvSpPr>
-        <p:spPr/>
-        <p:txBody>
-          <a:bodyPr/>
-          <a:lstStyle/>
-          <a:p>
-            <a:pPr algn="ctr"/>
-            <a:r>
-              <a:rPr lang="en-US" b="1" dirty="0"/>
-              <a:t>Appendices</a:t>
-            </a:r>
-          </a:p>
-        </p:txBody>
-      </p:sp>
-      <p:sp>
-        <p:nvSpPr>
-          <p:cNvPr id="3" name="Subtitle 2">
-            <a:extLst>
-              <a:ext uri="{FF2B5EF4-FFF2-40B4-BE49-F238E27FC236}">
-                <a16:creationId xmlns:a16="http://schemas.microsoft.com/office/drawing/2014/main" id="{0BA9081E-00F9-4AD9-9B1C-16BCD018A229}"/>
-              </a:ext>
-            </a:extLst>
-          </p:cNvPr>
-          <p:cNvSpPr>
-            <a:spLocks noGrp="1"/>
-          </p:cNvSpPr>
-          <p:nvPr>
-            <p:ph type="subTitle" idx="1"/>
-          </p:nvPr>
-        </p:nvSpPr>
-        <p:spPr/>
-        <p:txBody>
-          <a:bodyPr>
-            <a:normAutofit/>
-          </a:bodyPr>
-          <a:lstStyle/>
-          <a:p>
-            <a:r>
-              <a:rPr lang="en-US" sz="2800" b="1" dirty="0"/>
-              <a:t>Appendix A: SAS Documentation</a:t>
-            </a:r>
-          </a:p>
-          <a:p>
-            <a:r>
-              <a:rPr lang="en-US" sz="2800" b="1" dirty="0"/>
-              <a:t>Appendix B: R Documentation</a:t>
-            </a:r>
-          </a:p>
-          <a:p>
-            <a:r>
-              <a:rPr lang="en-US" sz="2800" b="1" dirty="0"/>
-              <a:t>Appendix C: How to get a copy</a:t>
-            </a:r>
-          </a:p>
-        </p:txBody>
-      </p:sp>
-    </p:spTree>
-    <p:extLst>
-      <p:ext uri="{BB962C8B-B14F-4D97-AF65-F5344CB8AC3E}">
-        <p14:creationId xmlns:p14="http://schemas.microsoft.com/office/powerpoint/2010/main" val="976075550"/>
-      </p:ext>
-    </p:extLst>
-  </p:cSld>
-  <p:clrMapOvr>
-    <a:masterClrMapping/>
-  </p:clrMapOvr>
-</p:sld>
-</file>
-
-<file path=ppt/slides/slide52.xml><?xml version="1.0" encoding="utf-8"?>
-<p:sld xmlns:a="http://schemas.openxmlformats.org/drawingml/2006/main" xmlns:r="http://schemas.openxmlformats.org/officeDocument/2006/relationships" xmlns:p="http://schemas.openxmlformats.org/presentationml/2006/main">
-  <p:cSld>
-    <p:spTree>
-      <p:nvGrpSpPr>
-        <p:cNvPr id="1" name="Shape 332"/>
-        <p:cNvGrpSpPr/>
-        <p:nvPr/>
-      </p:nvGrpSpPr>
-      <p:grpSpPr>
-        <a:xfrm>
-          <a:off x="0" y="0"/>
-          <a:ext cx="0" cy="0"/>
-          <a:chOff x="0" y="0"/>
-          <a:chExt cx="0" cy="0"/>
-        </a:xfrm>
-      </p:grpSpPr>
-      <p:sp>
-        <p:nvSpPr>
-          <p:cNvPr id="333" name="Google Shape;333;p31"/>
+          <p:cNvPr id="345" name="Google Shape;345;p33"/>
           <p:cNvSpPr txBox="1">
             <a:spLocks noGrp="1"/>
           </p:cNvSpPr>
@@ -21868,701 +21020,6 @@
           <a:p>
             <a:r>
               <a:rPr lang="en-US" sz="3600" b="1" dirty="0"/>
-              <a:t>Appendix A: SAS Documentation</a:t>
-            </a:r>
-          </a:p>
-        </p:txBody>
-      </p:sp>
-      <p:sp>
-        <p:nvSpPr>
-          <p:cNvPr id="334" name="Google Shape;334;p31"/>
-          <p:cNvSpPr txBox="1">
-            <a:spLocks noGrp="1"/>
-          </p:cNvSpPr>
-          <p:nvPr>
-            <p:ph type="body" idx="1"/>
-          </p:nvPr>
-        </p:nvSpPr>
-        <p:spPr>
-          <a:xfrm>
-            <a:off x="603174" y="2675316"/>
-            <a:ext cx="7912177" cy="2858877"/>
-          </a:xfrm>
-          <a:prstGeom prst="rect">
-            <a:avLst/>
-          </a:prstGeom>
-          <a:noFill/>
-          <a:ln>
-            <a:noFill/>
-          </a:ln>
-        </p:spPr>
-        <p:txBody>
-          <a:bodyPr spcFirstLastPara="1" wrap="square" lIns="68569" tIns="34275" rIns="68569" bIns="34275" anchor="ctr" anchorCtr="0">
-            <a:noAutofit/>
-          </a:bodyPr>
-          <a:lstStyle/>
-          <a:p>
-            <a:pPr>
-              <a:spcBef>
-                <a:spcPts val="0"/>
-              </a:spcBef>
-              <a:spcAft>
-                <a:spcPts val="0"/>
-              </a:spcAft>
-              <a:buSzPts val="1600"/>
-            </a:pPr>
-            <a:r>
-              <a:rPr lang="en-US" sz="2400" b="1" dirty="0">
-                <a:solidFill>
-                  <a:schemeClr val="dk1"/>
-                </a:solidFill>
-              </a:rPr>
-              <a:t>SAS/IML(R) 9.3 User's Guide ‘The RLANG System Option’ </a:t>
-            </a:r>
-            <a:r>
-              <a:rPr lang="en-US" sz="2400" u="sng" dirty="0">
-                <a:solidFill>
-                  <a:schemeClr val="dk1"/>
-                </a:solidFill>
-                <a:hlinkClick r:id="rId3">
-                  <a:extLst>
-                    <a:ext uri="{A12FA001-AC4F-418D-AE19-62706E023703}">
-                      <ahyp:hlinkClr xmlns:ahyp="http://schemas.microsoft.com/office/drawing/2018/hyperlinkcolor" val="tx"/>
-                    </a:ext>
-                  </a:extLst>
-                </a:hlinkClick>
-              </a:rPr>
-              <a:t>http://support.sas.com/documentation/cdl/en/imlug/64248/HTML/default/viewer.htm#imlug_r_sect003.htm</a:t>
-            </a:r>
-            <a:endParaRPr lang="en-US" sz="2400" u="sng" dirty="0">
-              <a:solidFill>
-                <a:schemeClr val="dk1"/>
-              </a:solidFill>
-            </a:endParaRPr>
-          </a:p>
-          <a:p>
-            <a:pPr>
-              <a:spcBef>
-                <a:spcPts val="0"/>
-              </a:spcBef>
-              <a:spcAft>
-                <a:spcPts val="0"/>
-              </a:spcAft>
-              <a:buSzPts val="1600"/>
-            </a:pPr>
-            <a:endParaRPr sz="2400" dirty="0">
-              <a:solidFill>
-                <a:schemeClr val="dk1"/>
-              </a:solidFill>
-            </a:endParaRPr>
-          </a:p>
-          <a:p>
-            <a:pPr>
-              <a:spcBef>
-                <a:spcPts val="750"/>
-              </a:spcBef>
-              <a:spcAft>
-                <a:spcPts val="0"/>
-              </a:spcAft>
-              <a:buSzPts val="1600"/>
-            </a:pPr>
-            <a:r>
-              <a:rPr lang="en-US" sz="2400" b="1" dirty="0">
-                <a:solidFill>
-                  <a:schemeClr val="dk1"/>
-                </a:solidFill>
-              </a:rPr>
-              <a:t>SAS/IML(R) 9.3 User's </a:t>
-            </a:r>
-            <a:r>
-              <a:rPr lang="en-US" sz="2400" b="1" dirty="0" err="1">
-                <a:solidFill>
-                  <a:schemeClr val="dk1"/>
-                </a:solidFill>
-              </a:rPr>
-              <a:t>Guide‘Submit</a:t>
-            </a:r>
-            <a:r>
-              <a:rPr lang="en-US" sz="2400" b="1" dirty="0">
-                <a:solidFill>
-                  <a:schemeClr val="dk1"/>
-                </a:solidFill>
-              </a:rPr>
-              <a:t> R Statements’ </a:t>
-            </a:r>
-            <a:r>
-              <a:rPr lang="en-US" sz="2400" u="sng" dirty="0">
-                <a:solidFill>
-                  <a:schemeClr val="dk1"/>
-                </a:solidFill>
-                <a:hlinkClick r:id="rId4">
-                  <a:extLst>
-                    <a:ext uri="{A12FA001-AC4F-418D-AE19-62706E023703}">
-                      <ahyp:hlinkClr xmlns:ahyp="http://schemas.microsoft.com/office/drawing/2018/hyperlinkcolor" val="tx"/>
-                    </a:ext>
-                  </a:extLst>
-                </a:hlinkClick>
-              </a:rPr>
-              <a:t>http://support.sas.com/documentation/cdl/en/imlug/64248/HTML/default/viewer.htm#imlug_r_sect004.htm</a:t>
-            </a:r>
-            <a:endParaRPr sz="2400" b="1" dirty="0">
-              <a:solidFill>
-                <a:schemeClr val="dk1"/>
-              </a:solidFill>
-            </a:endParaRPr>
-          </a:p>
-          <a:p>
-            <a:pPr marL="533400" indent="-457200">
-              <a:spcBef>
-                <a:spcPts val="750"/>
-              </a:spcBef>
-              <a:spcAft>
-                <a:spcPts val="0"/>
-              </a:spcAft>
-              <a:buSzPts val="1600"/>
-            </a:pPr>
-            <a:endParaRPr sz="2400" b="1" dirty="0">
-              <a:solidFill>
-                <a:schemeClr val="dk1"/>
-              </a:solidFill>
-            </a:endParaRPr>
-          </a:p>
-        </p:txBody>
-      </p:sp>
-    </p:spTree>
-  </p:cSld>
-  <p:clrMapOvr>
-    <a:masterClrMapping/>
-  </p:clrMapOvr>
-</p:sld>
-</file>
-
-<file path=ppt/slides/slide53.xml><?xml version="1.0" encoding="utf-8"?>
-<p:sld xmlns:a="http://schemas.openxmlformats.org/drawingml/2006/main" xmlns:r="http://schemas.openxmlformats.org/officeDocument/2006/relationships" xmlns:p="http://schemas.openxmlformats.org/presentationml/2006/main">
-  <p:cSld>
-    <p:spTree>
-      <p:nvGrpSpPr>
-        <p:cNvPr id="1" name="Shape 332"/>
-        <p:cNvGrpSpPr/>
-        <p:nvPr/>
-      </p:nvGrpSpPr>
-      <p:grpSpPr>
-        <a:xfrm>
-          <a:off x="0" y="0"/>
-          <a:ext cx="0" cy="0"/>
-          <a:chOff x="0" y="0"/>
-          <a:chExt cx="0" cy="0"/>
-        </a:xfrm>
-      </p:grpSpPr>
-      <p:sp>
-        <p:nvSpPr>
-          <p:cNvPr id="333" name="Google Shape;333;p31"/>
-          <p:cNvSpPr txBox="1">
-            <a:spLocks noGrp="1"/>
-          </p:cNvSpPr>
-          <p:nvPr>
-            <p:ph type="title"/>
-          </p:nvPr>
-        </p:nvSpPr>
-        <p:spPr>
-          <a:xfrm>
-            <a:off x="603174" y="1138180"/>
-            <a:ext cx="7912177" cy="987086"/>
-          </a:xfrm>
-          <a:prstGeom prst="rect">
-            <a:avLst/>
-          </a:prstGeom>
-          <a:noFill/>
-          <a:ln>
-            <a:noFill/>
-          </a:ln>
-        </p:spPr>
-        <p:txBody>
-          <a:bodyPr spcFirstLastPara="1" wrap="square" lIns="68569" tIns="34275" rIns="68569" bIns="34275" anchor="ctr" anchorCtr="0">
-            <a:normAutofit/>
-          </a:bodyPr>
-          <a:lstStyle/>
-          <a:p>
-            <a:pPr>
-              <a:spcBef>
-                <a:spcPts val="0"/>
-              </a:spcBef>
-              <a:spcAft>
-                <a:spcPts val="0"/>
-              </a:spcAft>
-              <a:buClr>
-                <a:schemeClr val="lt1"/>
-              </a:buClr>
-              <a:buSzPts val="3600"/>
-            </a:pPr>
-            <a:r>
-              <a:rPr lang="en-US" sz="3600" b="1" dirty="0"/>
-              <a:t>Appendix A (con):</a:t>
-            </a:r>
-            <a:endParaRPr b="1" dirty="0"/>
-          </a:p>
-        </p:txBody>
-      </p:sp>
-      <p:sp>
-        <p:nvSpPr>
-          <p:cNvPr id="334" name="Google Shape;334;p31"/>
-          <p:cNvSpPr txBox="1">
-            <a:spLocks noGrp="1"/>
-          </p:cNvSpPr>
-          <p:nvPr>
-            <p:ph type="body" idx="1"/>
-          </p:nvPr>
-        </p:nvSpPr>
-        <p:spPr>
-          <a:xfrm>
-            <a:off x="603174" y="2675316"/>
-            <a:ext cx="7912177" cy="2858877"/>
-          </a:xfrm>
-          <a:prstGeom prst="rect">
-            <a:avLst/>
-          </a:prstGeom>
-          <a:noFill/>
-          <a:ln>
-            <a:noFill/>
-          </a:ln>
-        </p:spPr>
-        <p:txBody>
-          <a:bodyPr spcFirstLastPara="1" wrap="square" lIns="68569" tIns="34275" rIns="68569" bIns="34275" anchor="ctr" anchorCtr="0">
-            <a:noAutofit/>
-          </a:bodyPr>
-          <a:lstStyle/>
-          <a:p>
-            <a:pPr>
-              <a:spcBef>
-                <a:spcPts val="0"/>
-              </a:spcBef>
-              <a:spcAft>
-                <a:spcPts val="0"/>
-              </a:spcAft>
-              <a:buSzPts val="1600"/>
-            </a:pPr>
-            <a:r>
-              <a:rPr lang="en-US" sz="2400" b="1" dirty="0">
-                <a:solidFill>
-                  <a:schemeClr val="dk1"/>
-                </a:solidFill>
-              </a:rPr>
-              <a:t>SAS/IML(R) 12.1 User's Guide:  EXPORTDATASETTOR Call </a:t>
-            </a:r>
-            <a:r>
-              <a:rPr lang="en-US" sz="2400" u="sng" dirty="0">
-                <a:solidFill>
-                  <a:schemeClr val="dk1"/>
-                </a:solidFill>
-                <a:hlinkClick r:id="rId3">
-                  <a:extLst>
-                    <a:ext uri="{A12FA001-AC4F-418D-AE19-62706E023703}">
-                      <ahyp:hlinkClr xmlns:ahyp="http://schemas.microsoft.com/office/drawing/2018/hyperlinkcolor" val="tx"/>
-                    </a:ext>
-                  </a:extLst>
-                </a:hlinkClick>
-              </a:rPr>
-              <a:t>http://support.sas.com/documentation/cdl/en/imlug/65547/HTML/default/viewer.htm#imlug_langref_sect114.htm</a:t>
-            </a:r>
-            <a:endParaRPr lang="en-US" sz="2400" u="sng" dirty="0">
-              <a:solidFill>
-                <a:schemeClr val="dk1"/>
-              </a:solidFill>
-            </a:endParaRPr>
-          </a:p>
-          <a:p>
-            <a:pPr>
-              <a:spcBef>
-                <a:spcPts val="0"/>
-              </a:spcBef>
-              <a:spcAft>
-                <a:spcPts val="0"/>
-              </a:spcAft>
-              <a:buSzPts val="1600"/>
-            </a:pPr>
-            <a:endParaRPr sz="2400" dirty="0">
-              <a:solidFill>
-                <a:schemeClr val="dk1"/>
-              </a:solidFill>
-            </a:endParaRPr>
-          </a:p>
-          <a:p>
-            <a:pPr>
-              <a:spcBef>
-                <a:spcPts val="750"/>
-              </a:spcBef>
-              <a:spcAft>
-                <a:spcPts val="0"/>
-              </a:spcAft>
-              <a:buSzPts val="1600"/>
-            </a:pPr>
-            <a:r>
-              <a:rPr lang="en-US" sz="2400" b="1" dirty="0">
-                <a:solidFill>
-                  <a:schemeClr val="dk1"/>
-                </a:solidFill>
-              </a:rPr>
-              <a:t>SAS/IML(R) 12.1 User's Guide: IMPORTDATASETFROMR Call </a:t>
-            </a:r>
-            <a:r>
-              <a:rPr lang="en-US" sz="2400" dirty="0">
-                <a:solidFill>
-                  <a:schemeClr val="dk1"/>
-                </a:solidFill>
-              </a:rPr>
-              <a:t>http://support.sas.com/documentation/cdl/en/imlug/65547/HTML/default/viewer.htm#imlug_langref_sect182.htm</a:t>
-            </a:r>
-            <a:endParaRPr sz="2400" dirty="0">
-              <a:solidFill>
-                <a:schemeClr val="dk1"/>
-              </a:solidFill>
-            </a:endParaRPr>
-          </a:p>
-          <a:p>
-            <a:pPr marL="533400" indent="-457200">
-              <a:spcBef>
-                <a:spcPts val="750"/>
-              </a:spcBef>
-              <a:spcAft>
-                <a:spcPts val="0"/>
-              </a:spcAft>
-              <a:buSzPts val="1600"/>
-            </a:pPr>
-            <a:endParaRPr sz="2400" b="1" dirty="0">
-              <a:solidFill>
-                <a:schemeClr val="dk1"/>
-              </a:solidFill>
-            </a:endParaRPr>
-          </a:p>
-          <a:p>
-            <a:pPr marL="533400" indent="-457200">
-              <a:spcBef>
-                <a:spcPts val="750"/>
-              </a:spcBef>
-              <a:spcAft>
-                <a:spcPts val="0"/>
-              </a:spcAft>
-              <a:buSzPts val="1600"/>
-            </a:pPr>
-            <a:endParaRPr sz="2400" b="1" dirty="0">
-              <a:solidFill>
-                <a:schemeClr val="dk1"/>
-              </a:solidFill>
-            </a:endParaRPr>
-          </a:p>
-        </p:txBody>
-      </p:sp>
-    </p:spTree>
-    <p:extLst>
-      <p:ext uri="{BB962C8B-B14F-4D97-AF65-F5344CB8AC3E}">
-        <p14:creationId xmlns:p14="http://schemas.microsoft.com/office/powerpoint/2010/main" val="2958874926"/>
-      </p:ext>
-    </p:extLst>
-  </p:cSld>
-  <p:clrMapOvr>
-    <a:masterClrMapping/>
-  </p:clrMapOvr>
-</p:sld>
-</file>
-
-<file path=ppt/slides/slide54.xml><?xml version="1.0" encoding="utf-8"?>
-<p:sld xmlns:a="http://schemas.openxmlformats.org/drawingml/2006/main" xmlns:r="http://schemas.openxmlformats.org/officeDocument/2006/relationships" xmlns:p="http://schemas.openxmlformats.org/presentationml/2006/main">
-  <p:cSld>
-    <p:spTree>
-      <p:nvGrpSpPr>
-        <p:cNvPr id="1" name="Shape 338"/>
-        <p:cNvGrpSpPr/>
-        <p:nvPr/>
-      </p:nvGrpSpPr>
-      <p:grpSpPr>
-        <a:xfrm>
-          <a:off x="0" y="0"/>
-          <a:ext cx="0" cy="0"/>
-          <a:chOff x="0" y="0"/>
-          <a:chExt cx="0" cy="0"/>
-        </a:xfrm>
-      </p:grpSpPr>
-      <p:sp>
-        <p:nvSpPr>
-          <p:cNvPr id="339" name="Google Shape;339;p32"/>
-          <p:cNvSpPr txBox="1">
-            <a:spLocks noGrp="1"/>
-          </p:cNvSpPr>
-          <p:nvPr>
-            <p:ph type="title"/>
-          </p:nvPr>
-        </p:nvSpPr>
-        <p:spPr>
-          <a:xfrm>
-            <a:off x="603174" y="1138180"/>
-            <a:ext cx="7912177" cy="987086"/>
-          </a:xfrm>
-          <a:prstGeom prst="rect">
-            <a:avLst/>
-          </a:prstGeom>
-          <a:noFill/>
-          <a:ln>
-            <a:noFill/>
-          </a:ln>
-        </p:spPr>
-        <p:txBody>
-          <a:bodyPr spcFirstLastPara="1" wrap="square" lIns="68569" tIns="34275" rIns="68569" bIns="34275" anchor="ctr" anchorCtr="0">
-            <a:normAutofit/>
-          </a:bodyPr>
-          <a:lstStyle/>
-          <a:p>
-            <a:pPr>
-              <a:spcBef>
-                <a:spcPts val="0"/>
-              </a:spcBef>
-              <a:spcAft>
-                <a:spcPts val="0"/>
-              </a:spcAft>
-              <a:buClr>
-                <a:schemeClr val="lt1"/>
-              </a:buClr>
-              <a:buSzPts val="3600"/>
-            </a:pPr>
-            <a:r>
-              <a:rPr lang="en-US" sz="3600" b="1" dirty="0"/>
-              <a:t>Appendix A (con):</a:t>
-            </a:r>
-            <a:endParaRPr b="1" dirty="0"/>
-          </a:p>
-        </p:txBody>
-      </p:sp>
-      <p:sp>
-        <p:nvSpPr>
-          <p:cNvPr id="340" name="Google Shape;340;p32"/>
-          <p:cNvSpPr txBox="1">
-            <a:spLocks noGrp="1"/>
-          </p:cNvSpPr>
-          <p:nvPr>
-            <p:ph type="body" idx="1"/>
-          </p:nvPr>
-        </p:nvSpPr>
-        <p:spPr>
-          <a:xfrm>
-            <a:off x="694938" y="2503582"/>
-            <a:ext cx="7534662" cy="3663041"/>
-          </a:xfrm>
-          <a:prstGeom prst="rect">
-            <a:avLst/>
-          </a:prstGeom>
-          <a:noFill/>
-          <a:ln>
-            <a:noFill/>
-          </a:ln>
-        </p:spPr>
-        <p:txBody>
-          <a:bodyPr spcFirstLastPara="1" wrap="square" lIns="68569" tIns="34275" rIns="68569" bIns="34275" anchor="ctr" anchorCtr="0">
-            <a:normAutofit/>
-          </a:bodyPr>
-          <a:lstStyle/>
-          <a:p>
-            <a:pPr marL="0" indent="0">
-              <a:spcBef>
-                <a:spcPts val="0"/>
-              </a:spcBef>
-              <a:spcAft>
-                <a:spcPts val="0"/>
-              </a:spcAft>
-              <a:buSzPts val="1600"/>
-              <a:buNone/>
-            </a:pPr>
-            <a:r>
-              <a:rPr lang="en-US" sz="2400" dirty="0">
-                <a:solidFill>
-                  <a:schemeClr val="dk1"/>
-                </a:solidFill>
-              </a:rPr>
-              <a:t>‘</a:t>
-            </a:r>
-            <a:r>
-              <a:rPr lang="en-US" sz="2400" b="1" dirty="0">
-                <a:solidFill>
-                  <a:schemeClr val="dk1"/>
-                </a:solidFill>
-              </a:rPr>
-              <a:t>Run R code inside SAS easily’ SAS/IML(R) 9.3 User's Guide </a:t>
-            </a:r>
-            <a:r>
-              <a:rPr lang="en-US" sz="2400" dirty="0">
-                <a:solidFill>
-                  <a:schemeClr val="dk1"/>
-                </a:solidFill>
-              </a:rPr>
-              <a:t>‘</a:t>
-            </a:r>
-            <a:r>
-              <a:rPr lang="en-US" sz="2400" b="1" dirty="0">
-                <a:solidFill>
-                  <a:schemeClr val="dk1"/>
-                </a:solidFill>
-              </a:rPr>
-              <a:t>EXPORTDATASETTOR Call’ </a:t>
-            </a:r>
-            <a:r>
-              <a:rPr lang="en-US" sz="2400" u="sng" dirty="0">
-                <a:solidFill>
-                  <a:schemeClr val="dk1"/>
-                </a:solidFill>
-                <a:hlinkClick r:id="rId3">
-                  <a:extLst>
-                    <a:ext uri="{A12FA001-AC4F-418D-AE19-62706E023703}">
-                      <ahyp:hlinkClr xmlns:ahyp="http://schemas.microsoft.com/office/drawing/2018/hyperlinkcolor" val="tx"/>
-                    </a:ext>
-                  </a:extLst>
-                </a:hlinkClick>
-              </a:rPr>
-              <a:t>http://support.sas.com/documentation/cdl/en/imlug/65547/HTML/default/viewer.htm#imlug_langref_sect114.htm</a:t>
-            </a:r>
-            <a:endParaRPr sz="2400" dirty="0">
-              <a:solidFill>
-                <a:schemeClr val="dk1"/>
-              </a:solidFill>
-            </a:endParaRPr>
-          </a:p>
-          <a:p>
-            <a:pPr marL="0" indent="0">
-              <a:spcBef>
-                <a:spcPts val="750"/>
-              </a:spcBef>
-              <a:spcAft>
-                <a:spcPts val="0"/>
-              </a:spcAft>
-              <a:buSzPts val="1600"/>
-              <a:buNone/>
-            </a:pPr>
-            <a:r>
-              <a:rPr lang="en-US" sz="2400" b="1" dirty="0">
-                <a:solidFill>
-                  <a:schemeClr val="dk1"/>
-                </a:solidFill>
-              </a:rPr>
-              <a:t>SAS Blogs:  Video: Calling R from the SAS/IML Language</a:t>
-            </a:r>
-            <a:r>
-              <a:rPr lang="en-US" sz="2400" dirty="0">
-                <a:solidFill>
-                  <a:schemeClr val="dk1"/>
-                </a:solidFill>
-              </a:rPr>
-              <a:t> </a:t>
-            </a:r>
-            <a:r>
-              <a:rPr lang="en-US" sz="2400" u="sng" dirty="0">
-                <a:solidFill>
-                  <a:schemeClr val="dk1"/>
-                </a:solidFill>
-                <a:hlinkClick r:id="rId4">
-                  <a:extLst>
-                    <a:ext uri="{A12FA001-AC4F-418D-AE19-62706E023703}">
-                      <ahyp:hlinkClr xmlns:ahyp="http://schemas.microsoft.com/office/drawing/2018/hyperlinkcolor" val="tx"/>
-                    </a:ext>
-                  </a:extLst>
-                </a:hlinkClick>
-              </a:rPr>
-              <a:t>https://blogs.sas.com/content/iml/2011/10/31/video-calling-r-from-the-sasiml-language.html</a:t>
-            </a:r>
-            <a:endParaRPr sz="2400" dirty="0">
-              <a:solidFill>
-                <a:schemeClr val="dk1"/>
-              </a:solidFill>
-            </a:endParaRPr>
-          </a:p>
-          <a:p>
-            <a:pPr marL="76200" indent="0">
-              <a:spcBef>
-                <a:spcPts val="750"/>
-              </a:spcBef>
-              <a:spcAft>
-                <a:spcPts val="0"/>
-              </a:spcAft>
-              <a:buSzPts val="1600"/>
-              <a:buNone/>
-            </a:pPr>
-            <a:endParaRPr sz="2400" b="1" dirty="0">
-              <a:solidFill>
-                <a:schemeClr val="dk1"/>
-              </a:solidFill>
-            </a:endParaRPr>
-          </a:p>
-          <a:p>
-            <a:pPr marL="76200" indent="0">
-              <a:spcBef>
-                <a:spcPts val="750"/>
-              </a:spcBef>
-              <a:spcAft>
-                <a:spcPts val="0"/>
-              </a:spcAft>
-              <a:buSzPts val="1600"/>
-              <a:buNone/>
-            </a:pPr>
-            <a:endParaRPr sz="2400" b="1" dirty="0">
-              <a:solidFill>
-                <a:schemeClr val="dk1"/>
-              </a:solidFill>
-            </a:endParaRPr>
-          </a:p>
-        </p:txBody>
-      </p:sp>
-    </p:spTree>
-  </p:cSld>
-  <p:clrMapOvr>
-    <a:masterClrMapping/>
-  </p:clrMapOvr>
-</p:sld>
-</file>
-
-<file path=ppt/slides/slide55.xml><?xml version="1.0" encoding="utf-8"?>
-<p:sld xmlns:a="http://schemas.openxmlformats.org/drawingml/2006/main" xmlns:r="http://schemas.openxmlformats.org/officeDocument/2006/relationships" xmlns:p="http://schemas.openxmlformats.org/presentationml/2006/main">
-  <p:cSld>
-    <p:spTree>
-      <p:nvGrpSpPr>
-        <p:cNvPr id="1" name="Shape 344"/>
-        <p:cNvGrpSpPr/>
-        <p:nvPr/>
-      </p:nvGrpSpPr>
-      <p:grpSpPr>
-        <a:xfrm>
-          <a:off x="0" y="0"/>
-          <a:ext cx="0" cy="0"/>
-          <a:chOff x="0" y="0"/>
-          <a:chExt cx="0" cy="0"/>
-        </a:xfrm>
-      </p:grpSpPr>
-      <p:sp>
-        <p:nvSpPr>
-          <p:cNvPr id="345" name="Google Shape;345;p33"/>
-          <p:cNvSpPr txBox="1">
-            <a:spLocks noGrp="1"/>
-          </p:cNvSpPr>
-          <p:nvPr>
-            <p:ph type="title"/>
-          </p:nvPr>
-        </p:nvSpPr>
-        <p:spPr>
-          <a:xfrm>
-            <a:off x="603174" y="1138180"/>
-            <a:ext cx="7912177" cy="987086"/>
-          </a:xfrm>
-          <a:prstGeom prst="rect">
-            <a:avLst/>
-          </a:prstGeom>
-          <a:noFill/>
-          <a:ln>
-            <a:noFill/>
-          </a:ln>
-        </p:spPr>
-        <p:txBody>
-          <a:bodyPr spcFirstLastPara="1" wrap="square" lIns="68569" tIns="34275" rIns="68569" bIns="34275" anchor="ctr" anchorCtr="0">
-            <a:normAutofit/>
-          </a:bodyPr>
-          <a:lstStyle/>
-          <a:p>
-            <a:r>
-              <a:rPr lang="en-US" sz="3600" b="1" dirty="0"/>
               <a:t>Appendix B: R Documentation</a:t>
             </a:r>
           </a:p>
@@ -22858,7 +21315,7 @@
 </p:sld>
 </file>
 
-<file path=ppt/slides/slide56.xml><?xml version="1.0" encoding="utf-8"?>
+<file path=ppt/slides/slide51.xml><?xml version="1.0" encoding="utf-8"?>
 <p:sld xmlns:a="http://schemas.openxmlformats.org/drawingml/2006/main" xmlns:r="http://schemas.openxmlformats.org/officeDocument/2006/relationships" xmlns:p="http://schemas.openxmlformats.org/presentationml/2006/main">
   <p:cSld>
     <p:spTree>

</xml_diff>